<commit_message>
update scripts and pictures, add analysis for 10th turn pulsing 2016
</commit_message>
<xml_diff>
--- a/Pictures.pptx
+++ b/Pictures.pptx
@@ -5,10 +5,13 @@
     <p:sldMasterId id="2147483648" r:id="rId1"/>
   </p:sldMasterIdLst>
   <p:notesMasterIdLst>
-    <p:notesMasterId r:id="rId3"/>
+    <p:notesMasterId r:id="rId6"/>
   </p:notesMasterIdLst>
   <p:sldIdLst>
     <p:sldId id="257" r:id="rId2"/>
+    <p:sldId id="258" r:id="rId3"/>
+    <p:sldId id="260" r:id="rId4"/>
+    <p:sldId id="261" r:id="rId5"/>
   </p:sldIdLst>
   <p:sldSz cx="12192000" cy="6858000"/>
   <p:notesSz cx="6858000" cy="9144000"/>
@@ -197,7 +200,7 @@
           <a:p>
             <a:fld id="{1B490EBA-BA3E-344A-8EE1-AF7B8F6FD65C}" type="datetimeFigureOut">
               <a:rPr lang="en-US" smtClean="0"/>
-              <a:t>12/5/17</a:t>
+              <a:t>12/21/17</a:t>
             </a:fld>
             <a:endParaRPr lang="en-US"/>
           </a:p>
@@ -563,6 +566,300 @@
 </p:notes>
 </file>
 
+<file path=ppt/notesSlides/notesSlide2.xml><?xml version="1.0" encoding="utf-8"?>
+<p:notes xmlns:a="http://schemas.openxmlformats.org/drawingml/2006/main" xmlns:r="http://schemas.openxmlformats.org/officeDocument/2006/relationships" xmlns:p="http://schemas.openxmlformats.org/presentationml/2006/main">
+  <p:cSld>
+    <p:spTree>
+      <p:nvGrpSpPr>
+        <p:cNvPr id="1" name=""/>
+        <p:cNvGrpSpPr/>
+        <p:nvPr/>
+      </p:nvGrpSpPr>
+      <p:grpSpPr>
+        <a:xfrm>
+          <a:off x="0" y="0"/>
+          <a:ext cx="0" cy="0"/>
+          <a:chOff x="0" y="0"/>
+          <a:chExt cx="0" cy="0"/>
+        </a:xfrm>
+      </p:grpSpPr>
+      <p:sp>
+        <p:nvSpPr>
+          <p:cNvPr id="2" name="Slide Image Placeholder 1"/>
+          <p:cNvSpPr>
+            <a:spLocks noGrp="1" noRot="1" noChangeAspect="1"/>
+          </p:cNvSpPr>
+          <p:nvPr>
+            <p:ph type="sldImg"/>
+          </p:nvPr>
+        </p:nvSpPr>
+        <p:spPr/>
+      </p:sp>
+      <p:sp>
+        <p:nvSpPr>
+          <p:cNvPr id="3" name="Notes Placeholder 2"/>
+          <p:cNvSpPr>
+            <a:spLocks noGrp="1"/>
+          </p:cNvSpPr>
+          <p:nvPr>
+            <p:ph type="body" idx="1"/>
+          </p:nvPr>
+        </p:nvSpPr>
+        <p:spPr/>
+        <p:txBody>
+          <a:bodyPr/>
+          <a:lstStyle/>
+          <a:p>
+            <a:r>
+              <a:rPr lang="en-US" dirty="0" smtClean="0"/>
+              <a:t>solenoid field has to be &gt; 0.2 T in order to confine beam</a:t>
+            </a:r>
+            <a:r>
+              <a:rPr lang="en-US" baseline="0" dirty="0" smtClean="0"/>
+              <a:t> against space charge forces</a:t>
+            </a:r>
+            <a:endParaRPr lang="en-US" dirty="0"/>
+          </a:p>
+        </p:txBody>
+      </p:sp>
+      <p:sp>
+        <p:nvSpPr>
+          <p:cNvPr id="4" name="Slide Number Placeholder 3"/>
+          <p:cNvSpPr>
+            <a:spLocks noGrp="1"/>
+          </p:cNvSpPr>
+          <p:nvPr>
+            <p:ph type="sldNum" sz="quarter" idx="10"/>
+          </p:nvPr>
+        </p:nvSpPr>
+        <p:spPr/>
+        <p:txBody>
+          <a:bodyPr/>
+          <a:lstStyle/>
+          <a:p>
+            <a:pPr>
+              <a:defRPr/>
+            </a:pPr>
+            <a:fld id="{CAD08E57-B576-F641-BEA6-C3D752DF7F66}" type="slidenum">
+              <a:rPr lang="en-US" smtClean="0"/>
+              <a:pPr>
+                <a:defRPr/>
+              </a:pPr>
+              <a:t>2</a:t>
+            </a:fld>
+            <a:endParaRPr lang="en-US"/>
+          </a:p>
+        </p:txBody>
+      </p:sp>
+    </p:spTree>
+    <p:extLst>
+      <p:ext uri="{BB962C8B-B14F-4D97-AF65-F5344CB8AC3E}">
+        <p14:creationId xmlns:p14="http://schemas.microsoft.com/office/powerpoint/2010/main" val="790550780"/>
+      </p:ext>
+    </p:extLst>
+  </p:cSld>
+  <p:clrMapOvr>
+    <a:masterClrMapping/>
+  </p:clrMapOvr>
+</p:notes>
+</file>
+
+<file path=ppt/notesSlides/notesSlide3.xml><?xml version="1.0" encoding="utf-8"?>
+<p:notes xmlns:a="http://schemas.openxmlformats.org/drawingml/2006/main" xmlns:r="http://schemas.openxmlformats.org/officeDocument/2006/relationships" xmlns:p="http://schemas.openxmlformats.org/presentationml/2006/main">
+  <p:cSld>
+    <p:spTree>
+      <p:nvGrpSpPr>
+        <p:cNvPr id="1" name=""/>
+        <p:cNvGrpSpPr/>
+        <p:nvPr/>
+      </p:nvGrpSpPr>
+      <p:grpSpPr>
+        <a:xfrm>
+          <a:off x="0" y="0"/>
+          <a:ext cx="0" cy="0"/>
+          <a:chOff x="0" y="0"/>
+          <a:chExt cx="0" cy="0"/>
+        </a:xfrm>
+      </p:grpSpPr>
+      <p:sp>
+        <p:nvSpPr>
+          <p:cNvPr id="2" name="Slide Image Placeholder 1"/>
+          <p:cNvSpPr>
+            <a:spLocks noGrp="1" noRot="1" noChangeAspect="1"/>
+          </p:cNvSpPr>
+          <p:nvPr>
+            <p:ph type="sldImg"/>
+          </p:nvPr>
+        </p:nvSpPr>
+        <p:spPr/>
+      </p:sp>
+      <p:sp>
+        <p:nvSpPr>
+          <p:cNvPr id="3" name="Notes Placeholder 2"/>
+          <p:cNvSpPr>
+            <a:spLocks noGrp="1"/>
+          </p:cNvSpPr>
+          <p:nvPr>
+            <p:ph type="body" idx="1"/>
+          </p:nvPr>
+        </p:nvSpPr>
+        <p:spPr/>
+        <p:txBody>
+          <a:bodyPr/>
+          <a:lstStyle/>
+          <a:p>
+            <a:r>
+              <a:rPr lang="en-US" dirty="0" smtClean="0"/>
+              <a:t>solenoid field has to be &gt; 0.2 T in order to confine beam</a:t>
+            </a:r>
+            <a:r>
+              <a:rPr lang="en-US" baseline="0" dirty="0" smtClean="0"/>
+              <a:t> against space charge forces</a:t>
+            </a:r>
+            <a:endParaRPr lang="en-US" dirty="0"/>
+          </a:p>
+        </p:txBody>
+      </p:sp>
+      <p:sp>
+        <p:nvSpPr>
+          <p:cNvPr id="4" name="Slide Number Placeholder 3"/>
+          <p:cNvSpPr>
+            <a:spLocks noGrp="1"/>
+          </p:cNvSpPr>
+          <p:nvPr>
+            <p:ph type="sldNum" sz="quarter" idx="10"/>
+          </p:nvPr>
+        </p:nvSpPr>
+        <p:spPr/>
+        <p:txBody>
+          <a:bodyPr/>
+          <a:lstStyle/>
+          <a:p>
+            <a:pPr>
+              <a:defRPr/>
+            </a:pPr>
+            <a:fld id="{CAD08E57-B576-F641-BEA6-C3D752DF7F66}" type="slidenum">
+              <a:rPr lang="en-US" smtClean="0"/>
+              <a:pPr>
+                <a:defRPr/>
+              </a:pPr>
+              <a:t>3</a:t>
+            </a:fld>
+            <a:endParaRPr lang="en-US"/>
+          </a:p>
+        </p:txBody>
+      </p:sp>
+    </p:spTree>
+    <p:extLst>
+      <p:ext uri="{BB962C8B-B14F-4D97-AF65-F5344CB8AC3E}">
+        <p14:creationId xmlns:p14="http://schemas.microsoft.com/office/powerpoint/2010/main" val="1119527768"/>
+      </p:ext>
+    </p:extLst>
+  </p:cSld>
+  <p:clrMapOvr>
+    <a:masterClrMapping/>
+  </p:clrMapOvr>
+</p:notes>
+</file>
+
+<file path=ppt/notesSlides/notesSlide4.xml><?xml version="1.0" encoding="utf-8"?>
+<p:notes xmlns:a="http://schemas.openxmlformats.org/drawingml/2006/main" xmlns:r="http://schemas.openxmlformats.org/officeDocument/2006/relationships" xmlns:p="http://schemas.openxmlformats.org/presentationml/2006/main">
+  <p:cSld>
+    <p:spTree>
+      <p:nvGrpSpPr>
+        <p:cNvPr id="1" name=""/>
+        <p:cNvGrpSpPr/>
+        <p:nvPr/>
+      </p:nvGrpSpPr>
+      <p:grpSpPr>
+        <a:xfrm>
+          <a:off x="0" y="0"/>
+          <a:ext cx="0" cy="0"/>
+          <a:chOff x="0" y="0"/>
+          <a:chExt cx="0" cy="0"/>
+        </a:xfrm>
+      </p:grpSpPr>
+      <p:sp>
+        <p:nvSpPr>
+          <p:cNvPr id="2" name="Slide Image Placeholder 1"/>
+          <p:cNvSpPr>
+            <a:spLocks noGrp="1" noRot="1" noChangeAspect="1"/>
+          </p:cNvSpPr>
+          <p:nvPr>
+            <p:ph type="sldImg"/>
+          </p:nvPr>
+        </p:nvSpPr>
+        <p:spPr/>
+      </p:sp>
+      <p:sp>
+        <p:nvSpPr>
+          <p:cNvPr id="3" name="Notes Placeholder 2"/>
+          <p:cNvSpPr>
+            <a:spLocks noGrp="1"/>
+          </p:cNvSpPr>
+          <p:nvPr>
+            <p:ph type="body" idx="1"/>
+          </p:nvPr>
+        </p:nvSpPr>
+        <p:spPr/>
+        <p:txBody>
+          <a:bodyPr/>
+          <a:lstStyle/>
+          <a:p>
+            <a:r>
+              <a:rPr lang="en-US" dirty="0" smtClean="0"/>
+              <a:t>solenoid field has to be &gt; 0.2 T in order to confine beam</a:t>
+            </a:r>
+            <a:r>
+              <a:rPr lang="en-US" baseline="0" dirty="0" smtClean="0"/>
+              <a:t> against space charge forces</a:t>
+            </a:r>
+            <a:endParaRPr lang="en-US" dirty="0"/>
+          </a:p>
+        </p:txBody>
+      </p:sp>
+      <p:sp>
+        <p:nvSpPr>
+          <p:cNvPr id="4" name="Slide Number Placeholder 3"/>
+          <p:cNvSpPr>
+            <a:spLocks noGrp="1"/>
+          </p:cNvSpPr>
+          <p:nvPr>
+            <p:ph type="sldNum" sz="quarter" idx="10"/>
+          </p:nvPr>
+        </p:nvSpPr>
+        <p:spPr/>
+        <p:txBody>
+          <a:bodyPr/>
+          <a:lstStyle/>
+          <a:p>
+            <a:pPr>
+              <a:defRPr/>
+            </a:pPr>
+            <a:fld id="{CAD08E57-B576-F641-BEA6-C3D752DF7F66}" type="slidenum">
+              <a:rPr lang="en-US" smtClean="0"/>
+              <a:pPr>
+                <a:defRPr/>
+              </a:pPr>
+              <a:t>4</a:t>
+            </a:fld>
+            <a:endParaRPr lang="en-US"/>
+          </a:p>
+        </p:txBody>
+      </p:sp>
+    </p:spTree>
+    <p:extLst>
+      <p:ext uri="{BB962C8B-B14F-4D97-AF65-F5344CB8AC3E}">
+        <p14:creationId xmlns:p14="http://schemas.microsoft.com/office/powerpoint/2010/main" val="1120972287"/>
+      </p:ext>
+    </p:extLst>
+  </p:cSld>
+  <p:clrMapOvr>
+    <a:masterClrMapping/>
+  </p:clrMapOvr>
+</p:notes>
+</file>
+
 <file path=ppt/slideLayouts/slideLayout1.xml><?xml version="1.0" encoding="utf-8"?>
 <p:sldLayout xmlns:a="http://schemas.openxmlformats.org/drawingml/2006/main" xmlns:r="http://schemas.openxmlformats.org/officeDocument/2006/relationships" xmlns:p="http://schemas.openxmlformats.org/presentationml/2006/main" type="title" preserve="1">
   <p:cSld name="Title Slide">
@@ -694,7 +991,7 @@
           <a:p>
             <a:fld id="{5849364A-029B-874F-B228-FB2A7A8248D3}" type="datetimeFigureOut">
               <a:rPr lang="en-US" smtClean="0"/>
-              <a:t>12/5/17</a:t>
+              <a:t>12/21/17</a:t>
             </a:fld>
             <a:endParaRPr lang="en-US"/>
           </a:p>
@@ -864,7 +1161,7 @@
           <a:p>
             <a:fld id="{5849364A-029B-874F-B228-FB2A7A8248D3}" type="datetimeFigureOut">
               <a:rPr lang="en-US" smtClean="0"/>
-              <a:t>12/5/17</a:t>
+              <a:t>12/21/17</a:t>
             </a:fld>
             <a:endParaRPr lang="en-US"/>
           </a:p>
@@ -1044,7 +1341,7 @@
           <a:p>
             <a:fld id="{5849364A-029B-874F-B228-FB2A7A8248D3}" type="datetimeFigureOut">
               <a:rPr lang="en-US" smtClean="0"/>
-              <a:t>12/5/17</a:t>
+              <a:t>12/21/17</a:t>
             </a:fld>
             <a:endParaRPr lang="en-US"/>
           </a:p>
@@ -1575,7 +1872,7 @@
           <a:p>
             <a:fld id="{5849364A-029B-874F-B228-FB2A7A8248D3}" type="datetimeFigureOut">
               <a:rPr lang="en-US" smtClean="0"/>
-              <a:t>12/5/17</a:t>
+              <a:t>12/21/17</a:t>
             </a:fld>
             <a:endParaRPr lang="en-US"/>
           </a:p>
@@ -1821,7 +2118,7 @@
           <a:p>
             <a:fld id="{5849364A-029B-874F-B228-FB2A7A8248D3}" type="datetimeFigureOut">
               <a:rPr lang="en-US" smtClean="0"/>
-              <a:t>12/5/17</a:t>
+              <a:t>12/21/17</a:t>
             </a:fld>
             <a:endParaRPr lang="en-US"/>
           </a:p>
@@ -2053,7 +2350,7 @@
           <a:p>
             <a:fld id="{5849364A-029B-874F-B228-FB2A7A8248D3}" type="datetimeFigureOut">
               <a:rPr lang="en-US" smtClean="0"/>
-              <a:t>12/5/17</a:t>
+              <a:t>12/21/17</a:t>
             </a:fld>
             <a:endParaRPr lang="en-US"/>
           </a:p>
@@ -2420,7 +2717,7 @@
           <a:p>
             <a:fld id="{5849364A-029B-874F-B228-FB2A7A8248D3}" type="datetimeFigureOut">
               <a:rPr lang="en-US" smtClean="0"/>
-              <a:t>12/5/17</a:t>
+              <a:t>12/21/17</a:t>
             </a:fld>
             <a:endParaRPr lang="en-US"/>
           </a:p>
@@ -2538,7 +2835,7 @@
           <a:p>
             <a:fld id="{5849364A-029B-874F-B228-FB2A7A8248D3}" type="datetimeFigureOut">
               <a:rPr lang="en-US" smtClean="0"/>
-              <a:t>12/5/17</a:t>
+              <a:t>12/21/17</a:t>
             </a:fld>
             <a:endParaRPr lang="en-US"/>
           </a:p>
@@ -2633,7 +2930,7 @@
           <a:p>
             <a:fld id="{5849364A-029B-874F-B228-FB2A7A8248D3}" type="datetimeFigureOut">
               <a:rPr lang="en-US" smtClean="0"/>
-              <a:t>12/5/17</a:t>
+              <a:t>12/21/17</a:t>
             </a:fld>
             <a:endParaRPr lang="en-US"/>
           </a:p>
@@ -2910,7 +3207,7 @@
           <a:p>
             <a:fld id="{5849364A-029B-874F-B228-FB2A7A8248D3}" type="datetimeFigureOut">
               <a:rPr lang="en-US" smtClean="0"/>
-              <a:t>12/5/17</a:t>
+              <a:t>12/21/17</a:t>
             </a:fld>
             <a:endParaRPr lang="en-US"/>
           </a:p>
@@ -3163,7 +3460,7 @@
           <a:p>
             <a:fld id="{5849364A-029B-874F-B228-FB2A7A8248D3}" type="datetimeFigureOut">
               <a:rPr lang="en-US" smtClean="0"/>
-              <a:t>12/5/17</a:t>
+              <a:t>12/21/17</a:t>
             </a:fld>
             <a:endParaRPr lang="en-US"/>
           </a:p>
@@ -3376,7 +3673,7 @@
           <a:p>
             <a:fld id="{5849364A-029B-874F-B228-FB2A7A8248D3}" type="datetimeFigureOut">
               <a:rPr lang="en-US" smtClean="0"/>
-              <a:t>12/5/17</a:t>
+              <a:t>12/21/17</a:t>
             </a:fld>
             <a:endParaRPr lang="en-US"/>
           </a:p>
@@ -4390,6 +4687,939 @@
     <p:extLst>
       <p:ext uri="{BB962C8B-B14F-4D97-AF65-F5344CB8AC3E}">
         <p14:creationId xmlns:p14="http://schemas.microsoft.com/office/powerpoint/2010/main" val="1644605856"/>
+      </p:ext>
+    </p:extLst>
+  </p:cSld>
+  <p:clrMapOvr>
+    <a:masterClrMapping/>
+  </p:clrMapOvr>
+  <mc:AlternateContent xmlns:mc="http://schemas.openxmlformats.org/markup-compatibility/2006" xmlns:p14="http://schemas.microsoft.com/office/powerpoint/2010/main">
+    <mc:Choice Requires="p14">
+      <p:transition spd="slow" p14:dur="2000" advTm="39496"/>
+    </mc:Choice>
+    <mc:Fallback xmlns="">
+      <p:transition spd="slow" advTm="39496"/>
+    </mc:Fallback>
+  </mc:AlternateContent>
+  <p:timing>
+    <p:tnLst>
+      <p:par>
+        <p:cTn id="1" dur="indefinite" restart="never" nodeType="tmRoot"/>
+      </p:par>
+    </p:tnLst>
+  </p:timing>
+</p:sld>
+</file>
+
+<file path=ppt/slides/slide2.xml><?xml version="1.0" encoding="utf-8"?>
+<p:sld xmlns:a="http://schemas.openxmlformats.org/drawingml/2006/main" xmlns:r="http://schemas.openxmlformats.org/officeDocument/2006/relationships" xmlns:p="http://schemas.openxmlformats.org/presentationml/2006/main">
+  <p:cSld>
+    <p:spTree>
+      <p:nvGrpSpPr>
+        <p:cNvPr id="1" name=""/>
+        <p:cNvGrpSpPr/>
+        <p:nvPr/>
+      </p:nvGrpSpPr>
+      <p:grpSpPr>
+        <a:xfrm>
+          <a:off x="0" y="0"/>
+          <a:ext cx="0" cy="0"/>
+          <a:chOff x="0" y="0"/>
+          <a:chExt cx="0" cy="0"/>
+        </a:xfrm>
+      </p:grpSpPr>
+      <p:sp>
+        <p:nvSpPr>
+          <p:cNvPr id="4" name="Date Placeholder 3"/>
+          <p:cNvSpPr>
+            <a:spLocks noGrp="1"/>
+          </p:cNvSpPr>
+          <p:nvPr>
+            <p:ph type="dt" sz="half" idx="2"/>
+          </p:nvPr>
+        </p:nvSpPr>
+        <p:spPr/>
+        <p:txBody>
+          <a:bodyPr/>
+          <a:lstStyle/>
+          <a:p>
+            <a:pPr>
+              <a:defRPr/>
+            </a:pPr>
+            <a:r>
+              <a:rPr lang="en-US" smtClean="0"/>
+              <a:t>17/05/2017</a:t>
+            </a:r>
+            <a:endParaRPr lang="en-US" dirty="0"/>
+          </a:p>
+        </p:txBody>
+      </p:sp>
+      <p:sp>
+        <p:nvSpPr>
+          <p:cNvPr id="5" name="Footer Placeholder 4"/>
+          <p:cNvSpPr>
+            <a:spLocks noGrp="1"/>
+          </p:cNvSpPr>
+          <p:nvPr>
+            <p:ph type="ftr" sz="quarter" idx="3"/>
+          </p:nvPr>
+        </p:nvSpPr>
+        <p:spPr/>
+        <p:txBody>
+          <a:bodyPr/>
+          <a:lstStyle/>
+          <a:p>
+            <a:pPr>
+              <a:defRPr/>
+            </a:pPr>
+            <a:r>
+              <a:rPr lang="en-US" smtClean="0"/>
+              <a:t>M. Fitterer | Hollow Electron Beam Collimation for HL-LHC - Effects on the Beam Core | IPAC’17</a:t>
+            </a:r>
+            <a:endParaRPr lang="en-US" b="1" dirty="0"/>
+          </a:p>
+        </p:txBody>
+      </p:sp>
+      <p:sp>
+        <p:nvSpPr>
+          <p:cNvPr id="6" name="Slide Number Placeholder 5"/>
+          <p:cNvSpPr>
+            <a:spLocks noGrp="1"/>
+          </p:cNvSpPr>
+          <p:nvPr>
+            <p:ph type="sldNum" sz="quarter" idx="4"/>
+          </p:nvPr>
+        </p:nvSpPr>
+        <p:spPr/>
+        <p:txBody>
+          <a:bodyPr/>
+          <a:lstStyle/>
+          <a:p>
+            <a:pPr>
+              <a:defRPr/>
+            </a:pPr>
+            <a:fld id="{148C009B-CB69-E04A-B9B3-34B26D69E9CF}" type="slidenum">
+              <a:rPr lang="en-US" smtClean="0"/>
+              <a:pPr>
+                <a:defRPr/>
+              </a:pPr>
+              <a:t>2</a:t>
+            </a:fld>
+            <a:endParaRPr lang="en-US" dirty="0"/>
+          </a:p>
+        </p:txBody>
+      </p:sp>
+      <p:grpSp>
+        <p:nvGrpSpPr>
+          <p:cNvPr id="23" name="Group 22"/>
+          <p:cNvGrpSpPr/>
+          <p:nvPr/>
+        </p:nvGrpSpPr>
+        <p:grpSpPr>
+          <a:xfrm>
+            <a:off x="3479800" y="1261674"/>
+            <a:ext cx="5212080" cy="4160210"/>
+            <a:chOff x="3479800" y="1261674"/>
+            <a:chExt cx="5212080" cy="4160210"/>
+          </a:xfrm>
+        </p:grpSpPr>
+        <p:pic>
+          <p:nvPicPr>
+            <p:cNvPr id="19" name="Picture 18"/>
+            <p:cNvPicPr>
+              <a:picLocks noChangeAspect="1"/>
+            </p:cNvPicPr>
+            <p:nvPr/>
+          </p:nvPicPr>
+          <p:blipFill>
+            <a:blip r:embed="rId3">
+              <a:extLst>
+                <a:ext uri="{28A0092B-C50C-407E-A947-70E740481C1C}">
+                  <a14:useLocalDpi xmlns:a14="http://schemas.microsoft.com/office/drawing/2010/main" val="0"/>
+                </a:ext>
+              </a:extLst>
+            </a:blip>
+            <a:stretch>
+              <a:fillRect/>
+            </a:stretch>
+          </p:blipFill>
+          <p:spPr>
+            <a:xfrm>
+              <a:off x="3479800" y="1435100"/>
+              <a:ext cx="5212080" cy="3986784"/>
+            </a:xfrm>
+            <a:prstGeom prst="rect">
+              <a:avLst/>
+            </a:prstGeom>
+          </p:spPr>
+        </p:pic>
+        <p:sp>
+          <p:nvSpPr>
+            <p:cNvPr id="27" name="Title 6"/>
+            <p:cNvSpPr txBox="1">
+              <a:spLocks/>
+            </p:cNvSpPr>
+            <p:nvPr/>
+          </p:nvSpPr>
+          <p:spPr>
+            <a:xfrm rot="16200000">
+              <a:off x="4873831" y="1822619"/>
+              <a:ext cx="1549768" cy="427877"/>
+            </a:xfrm>
+            <a:prstGeom prst="rect">
+              <a:avLst/>
+            </a:prstGeom>
+          </p:spPr>
+          <p:txBody>
+            <a:bodyPr vert="horz" lIns="0" tIns="0" rIns="0" bIns="0" rtlCol="0" anchor="b" anchorCtr="0">
+              <a:normAutofit/>
+            </a:bodyPr>
+            <a:lstStyle>
+              <a:lvl1pPr algn="l" defTabSz="914400" rtl="0" eaLnBrk="1" latinLnBrk="0" hangingPunct="1">
+                <a:lnSpc>
+                  <a:spcPct val="90000"/>
+                </a:lnSpc>
+                <a:spcBef>
+                  <a:spcPct val="0"/>
+                </a:spcBef>
+                <a:buNone/>
+                <a:defRPr sz="2800" kern="1200">
+                  <a:solidFill>
+                    <a:srgbClr val="004C97"/>
+                  </a:solidFill>
+                  <a:latin typeface="+mj-lt"/>
+                  <a:ea typeface="+mj-ea"/>
+                  <a:cs typeface="+mj-cs"/>
+                </a:defRPr>
+              </a:lvl1pPr>
+            </a:lstStyle>
+            <a:p>
+              <a:r>
+                <a:rPr lang="en-US" sz="1400" dirty="0" smtClean="0">
+                  <a:solidFill>
+                    <a:schemeClr val="accent1">
+                      <a:lumMod val="75000"/>
+                    </a:schemeClr>
+                  </a:solidFill>
+                  <a:latin typeface="PT Sans" charset="-52"/>
+                  <a:ea typeface="PT Sans" charset="-52"/>
+                  <a:cs typeface="PT Sans" charset="-52"/>
+                </a:rPr>
+                <a:t>fast adjustment</a:t>
+              </a:r>
+              <a:endParaRPr lang="en-US" sz="1400" dirty="0">
+                <a:solidFill>
+                  <a:schemeClr val="accent1">
+                    <a:lumMod val="75000"/>
+                  </a:schemeClr>
+                </a:solidFill>
+                <a:latin typeface="PT Sans" charset="-52"/>
+                <a:ea typeface="PT Sans" charset="-52"/>
+                <a:cs typeface="PT Sans" charset="-52"/>
+              </a:endParaRPr>
+            </a:p>
+          </p:txBody>
+        </p:sp>
+        <p:sp>
+          <p:nvSpPr>
+            <p:cNvPr id="29" name="Title 6"/>
+            <p:cNvSpPr txBox="1">
+              <a:spLocks/>
+            </p:cNvSpPr>
+            <p:nvPr/>
+          </p:nvSpPr>
+          <p:spPr>
+            <a:xfrm rot="16200000">
+              <a:off x="5580640" y="1933403"/>
+              <a:ext cx="1549768" cy="427877"/>
+            </a:xfrm>
+            <a:prstGeom prst="rect">
+              <a:avLst/>
+            </a:prstGeom>
+          </p:spPr>
+          <p:txBody>
+            <a:bodyPr vert="horz" lIns="0" tIns="0" rIns="0" bIns="0" rtlCol="0" anchor="b" anchorCtr="0">
+              <a:normAutofit/>
+            </a:bodyPr>
+            <a:lstStyle>
+              <a:lvl1pPr algn="l" defTabSz="914400" rtl="0" eaLnBrk="1" latinLnBrk="0" hangingPunct="1">
+                <a:lnSpc>
+                  <a:spcPct val="90000"/>
+                </a:lnSpc>
+                <a:spcBef>
+                  <a:spcPct val="0"/>
+                </a:spcBef>
+                <a:buNone/>
+                <a:defRPr sz="2800" kern="1200">
+                  <a:solidFill>
+                    <a:srgbClr val="004C97"/>
+                  </a:solidFill>
+                  <a:latin typeface="+mj-lt"/>
+                  <a:ea typeface="+mj-ea"/>
+                  <a:cs typeface="+mj-cs"/>
+                </a:defRPr>
+              </a:lvl1pPr>
+            </a:lstStyle>
+            <a:p>
+              <a:r>
+                <a:rPr lang="en-US" sz="1400" dirty="0" smtClean="0">
+                  <a:solidFill>
+                    <a:schemeClr val="tx1"/>
+                  </a:solidFill>
+                  <a:latin typeface="PT Sans" charset="-52"/>
+                  <a:ea typeface="PT Sans" charset="-52"/>
+                  <a:cs typeface="PT Sans" charset="-52"/>
+                </a:rPr>
+                <a:t>equilibrium state</a:t>
+              </a:r>
+              <a:endParaRPr lang="en-US" sz="1400" dirty="0">
+                <a:solidFill>
+                  <a:schemeClr val="tx1"/>
+                </a:solidFill>
+                <a:latin typeface="PT Sans" charset="-52"/>
+                <a:ea typeface="PT Sans" charset="-52"/>
+                <a:cs typeface="PT Sans" charset="-52"/>
+              </a:endParaRPr>
+            </a:p>
+          </p:txBody>
+        </p:sp>
+      </p:grpSp>
+    </p:spTree>
+    <p:extLst>
+      <p:ext uri="{BB962C8B-B14F-4D97-AF65-F5344CB8AC3E}">
+        <p14:creationId xmlns:p14="http://schemas.microsoft.com/office/powerpoint/2010/main" val="462713681"/>
+      </p:ext>
+    </p:extLst>
+  </p:cSld>
+  <p:clrMapOvr>
+    <a:masterClrMapping/>
+  </p:clrMapOvr>
+  <mc:AlternateContent xmlns:mc="http://schemas.openxmlformats.org/markup-compatibility/2006" xmlns:p14="http://schemas.microsoft.com/office/powerpoint/2010/main">
+    <mc:Choice Requires="p14">
+      <p:transition spd="slow" p14:dur="2000" advTm="39496"/>
+    </mc:Choice>
+    <mc:Fallback xmlns="">
+      <p:transition spd="slow" advTm="39496"/>
+    </mc:Fallback>
+  </mc:AlternateContent>
+  <p:timing>
+    <p:tnLst>
+      <p:par>
+        <p:cTn id="1" dur="indefinite" restart="never" nodeType="tmRoot"/>
+      </p:par>
+    </p:tnLst>
+  </p:timing>
+</p:sld>
+</file>
+
+<file path=ppt/slides/slide3.xml><?xml version="1.0" encoding="utf-8"?>
+<p:sld xmlns:a="http://schemas.openxmlformats.org/drawingml/2006/main" xmlns:r="http://schemas.openxmlformats.org/officeDocument/2006/relationships" xmlns:p="http://schemas.openxmlformats.org/presentationml/2006/main">
+  <p:cSld>
+    <p:spTree>
+      <p:nvGrpSpPr>
+        <p:cNvPr id="1" name=""/>
+        <p:cNvGrpSpPr/>
+        <p:nvPr/>
+      </p:nvGrpSpPr>
+      <p:grpSpPr>
+        <a:xfrm>
+          <a:off x="0" y="0"/>
+          <a:ext cx="0" cy="0"/>
+          <a:chOff x="0" y="0"/>
+          <a:chExt cx="0" cy="0"/>
+        </a:xfrm>
+      </p:grpSpPr>
+      <p:sp>
+        <p:nvSpPr>
+          <p:cNvPr id="4" name="Date Placeholder 3"/>
+          <p:cNvSpPr>
+            <a:spLocks noGrp="1"/>
+          </p:cNvSpPr>
+          <p:nvPr>
+            <p:ph type="dt" sz="half" idx="2"/>
+          </p:nvPr>
+        </p:nvSpPr>
+        <p:spPr/>
+        <p:txBody>
+          <a:bodyPr/>
+          <a:lstStyle/>
+          <a:p>
+            <a:pPr>
+              <a:defRPr/>
+            </a:pPr>
+            <a:r>
+              <a:rPr lang="en-US" smtClean="0"/>
+              <a:t>17/05/2017</a:t>
+            </a:r>
+            <a:endParaRPr lang="en-US" dirty="0"/>
+          </a:p>
+        </p:txBody>
+      </p:sp>
+      <p:sp>
+        <p:nvSpPr>
+          <p:cNvPr id="5" name="Footer Placeholder 4"/>
+          <p:cNvSpPr>
+            <a:spLocks noGrp="1"/>
+          </p:cNvSpPr>
+          <p:nvPr>
+            <p:ph type="ftr" sz="quarter" idx="3"/>
+          </p:nvPr>
+        </p:nvSpPr>
+        <p:spPr/>
+        <p:txBody>
+          <a:bodyPr/>
+          <a:lstStyle/>
+          <a:p>
+            <a:pPr>
+              <a:defRPr/>
+            </a:pPr>
+            <a:r>
+              <a:rPr lang="en-US" smtClean="0"/>
+              <a:t>M. Fitterer | Hollow Electron Beam Collimation for HL-LHC - Effects on the Beam Core | IPAC’17</a:t>
+            </a:r>
+            <a:endParaRPr lang="en-US" b="1" dirty="0"/>
+          </a:p>
+        </p:txBody>
+      </p:sp>
+      <p:sp>
+        <p:nvSpPr>
+          <p:cNvPr id="6" name="Slide Number Placeholder 5"/>
+          <p:cNvSpPr>
+            <a:spLocks noGrp="1"/>
+          </p:cNvSpPr>
+          <p:nvPr>
+            <p:ph type="sldNum" sz="quarter" idx="4"/>
+          </p:nvPr>
+        </p:nvSpPr>
+        <p:spPr/>
+        <p:txBody>
+          <a:bodyPr/>
+          <a:lstStyle/>
+          <a:p>
+            <a:pPr>
+              <a:defRPr/>
+            </a:pPr>
+            <a:fld id="{148C009B-CB69-E04A-B9B3-34B26D69E9CF}" type="slidenum">
+              <a:rPr lang="en-US" smtClean="0"/>
+              <a:pPr>
+                <a:defRPr/>
+              </a:pPr>
+              <a:t>3</a:t>
+            </a:fld>
+            <a:endParaRPr lang="en-US" dirty="0"/>
+          </a:p>
+        </p:txBody>
+      </p:sp>
+      <p:grpSp>
+        <p:nvGrpSpPr>
+          <p:cNvPr id="3" name="Group 2"/>
+          <p:cNvGrpSpPr/>
+          <p:nvPr/>
+        </p:nvGrpSpPr>
+        <p:grpSpPr>
+          <a:xfrm>
+            <a:off x="3337545" y="1261674"/>
+            <a:ext cx="5340096" cy="4149616"/>
+            <a:chOff x="3337545" y="1261674"/>
+            <a:chExt cx="5340096" cy="4149616"/>
+          </a:xfrm>
+        </p:grpSpPr>
+        <p:pic>
+          <p:nvPicPr>
+            <p:cNvPr id="2" name="Picture 1"/>
+            <p:cNvPicPr>
+              <a:picLocks noChangeAspect="1"/>
+            </p:cNvPicPr>
+            <p:nvPr/>
+          </p:nvPicPr>
+          <p:blipFill>
+            <a:blip r:embed="rId3">
+              <a:extLst>
+                <a:ext uri="{28A0092B-C50C-407E-A947-70E740481C1C}">
+                  <a14:useLocalDpi xmlns:a14="http://schemas.microsoft.com/office/drawing/2010/main" val="0"/>
+                </a:ext>
+              </a:extLst>
+            </a:blip>
+            <a:stretch>
+              <a:fillRect/>
+            </a:stretch>
+          </p:blipFill>
+          <p:spPr>
+            <a:xfrm>
+              <a:off x="3337545" y="1424506"/>
+              <a:ext cx="5340096" cy="3986784"/>
+            </a:xfrm>
+            <a:prstGeom prst="rect">
+              <a:avLst/>
+            </a:prstGeom>
+          </p:spPr>
+        </p:pic>
+        <p:grpSp>
+          <p:nvGrpSpPr>
+            <p:cNvPr id="23" name="Group 22"/>
+            <p:cNvGrpSpPr/>
+            <p:nvPr/>
+          </p:nvGrpSpPr>
+          <p:grpSpPr>
+            <a:xfrm>
+              <a:off x="5434776" y="1261674"/>
+              <a:ext cx="1134686" cy="1660552"/>
+              <a:chOff x="5434776" y="1261674"/>
+              <a:chExt cx="1134686" cy="1660552"/>
+            </a:xfrm>
+          </p:grpSpPr>
+          <p:sp>
+            <p:nvSpPr>
+              <p:cNvPr id="27" name="Title 6"/>
+              <p:cNvSpPr txBox="1">
+                <a:spLocks/>
+              </p:cNvSpPr>
+              <p:nvPr/>
+            </p:nvSpPr>
+            <p:spPr>
+              <a:xfrm rot="16200000">
+                <a:off x="4873831" y="1822619"/>
+                <a:ext cx="1549768" cy="427877"/>
+              </a:xfrm>
+              <a:prstGeom prst="rect">
+                <a:avLst/>
+              </a:prstGeom>
+            </p:spPr>
+            <p:txBody>
+              <a:bodyPr vert="horz" lIns="0" tIns="0" rIns="0" bIns="0" rtlCol="0" anchor="b" anchorCtr="0">
+                <a:normAutofit/>
+              </a:bodyPr>
+              <a:lstStyle>
+                <a:lvl1pPr algn="l" defTabSz="914400" rtl="0" eaLnBrk="1" latinLnBrk="0" hangingPunct="1">
+                  <a:lnSpc>
+                    <a:spcPct val="90000"/>
+                  </a:lnSpc>
+                  <a:spcBef>
+                    <a:spcPct val="0"/>
+                  </a:spcBef>
+                  <a:buNone/>
+                  <a:defRPr sz="2800" kern="1200">
+                    <a:solidFill>
+                      <a:srgbClr val="004C97"/>
+                    </a:solidFill>
+                    <a:latin typeface="+mj-lt"/>
+                    <a:ea typeface="+mj-ea"/>
+                    <a:cs typeface="+mj-cs"/>
+                  </a:defRPr>
+                </a:lvl1pPr>
+              </a:lstStyle>
+              <a:p>
+                <a:r>
+                  <a:rPr lang="en-US" sz="1400" dirty="0" smtClean="0">
+                    <a:solidFill>
+                      <a:schemeClr val="accent1">
+                        <a:lumMod val="75000"/>
+                      </a:schemeClr>
+                    </a:solidFill>
+                    <a:latin typeface="PT Sans" charset="-52"/>
+                    <a:ea typeface="PT Sans" charset="-52"/>
+                    <a:cs typeface="PT Sans" charset="-52"/>
+                  </a:rPr>
+                  <a:t>fast adjustment</a:t>
+                </a:r>
+                <a:endParaRPr lang="en-US" sz="1400" dirty="0">
+                  <a:solidFill>
+                    <a:schemeClr val="accent1">
+                      <a:lumMod val="75000"/>
+                    </a:schemeClr>
+                  </a:solidFill>
+                  <a:latin typeface="PT Sans" charset="-52"/>
+                  <a:ea typeface="PT Sans" charset="-52"/>
+                  <a:cs typeface="PT Sans" charset="-52"/>
+                </a:endParaRPr>
+              </a:p>
+            </p:txBody>
+          </p:sp>
+          <p:sp>
+            <p:nvSpPr>
+              <p:cNvPr id="29" name="Title 6"/>
+              <p:cNvSpPr txBox="1">
+                <a:spLocks/>
+              </p:cNvSpPr>
+              <p:nvPr/>
+            </p:nvSpPr>
+            <p:spPr>
+              <a:xfrm rot="16200000">
+                <a:off x="5580640" y="1933403"/>
+                <a:ext cx="1549768" cy="427877"/>
+              </a:xfrm>
+              <a:prstGeom prst="rect">
+                <a:avLst/>
+              </a:prstGeom>
+            </p:spPr>
+            <p:txBody>
+              <a:bodyPr vert="horz" lIns="0" tIns="0" rIns="0" bIns="0" rtlCol="0" anchor="b" anchorCtr="0">
+                <a:normAutofit/>
+              </a:bodyPr>
+              <a:lstStyle>
+                <a:lvl1pPr algn="l" defTabSz="914400" rtl="0" eaLnBrk="1" latinLnBrk="0" hangingPunct="1">
+                  <a:lnSpc>
+                    <a:spcPct val="90000"/>
+                  </a:lnSpc>
+                  <a:spcBef>
+                    <a:spcPct val="0"/>
+                  </a:spcBef>
+                  <a:buNone/>
+                  <a:defRPr sz="2800" kern="1200">
+                    <a:solidFill>
+                      <a:srgbClr val="004C97"/>
+                    </a:solidFill>
+                    <a:latin typeface="+mj-lt"/>
+                    <a:ea typeface="+mj-ea"/>
+                    <a:cs typeface="+mj-cs"/>
+                  </a:defRPr>
+                </a:lvl1pPr>
+              </a:lstStyle>
+              <a:p>
+                <a:r>
+                  <a:rPr lang="en-US" sz="1400" dirty="0" smtClean="0">
+                    <a:solidFill>
+                      <a:schemeClr val="tx1"/>
+                    </a:solidFill>
+                    <a:latin typeface="PT Sans" charset="-52"/>
+                    <a:ea typeface="PT Sans" charset="-52"/>
+                    <a:cs typeface="PT Sans" charset="-52"/>
+                  </a:rPr>
+                  <a:t>equilibrium state</a:t>
+                </a:r>
+                <a:endParaRPr lang="en-US" sz="1400" dirty="0">
+                  <a:solidFill>
+                    <a:schemeClr val="tx1"/>
+                  </a:solidFill>
+                  <a:latin typeface="PT Sans" charset="-52"/>
+                  <a:ea typeface="PT Sans" charset="-52"/>
+                  <a:cs typeface="PT Sans" charset="-52"/>
+                </a:endParaRPr>
+              </a:p>
+            </p:txBody>
+          </p:sp>
+        </p:grpSp>
+      </p:grpSp>
+    </p:spTree>
+    <p:extLst>
+      <p:ext uri="{BB962C8B-B14F-4D97-AF65-F5344CB8AC3E}">
+        <p14:creationId xmlns:p14="http://schemas.microsoft.com/office/powerpoint/2010/main" val="2036387601"/>
+      </p:ext>
+    </p:extLst>
+  </p:cSld>
+  <p:clrMapOvr>
+    <a:masterClrMapping/>
+  </p:clrMapOvr>
+  <mc:AlternateContent xmlns:mc="http://schemas.openxmlformats.org/markup-compatibility/2006" xmlns:p14="http://schemas.microsoft.com/office/powerpoint/2010/main">
+    <mc:Choice Requires="p14">
+      <p:transition spd="slow" p14:dur="2000" advTm="39496"/>
+    </mc:Choice>
+    <mc:Fallback xmlns="">
+      <p:transition spd="slow" advTm="39496"/>
+    </mc:Fallback>
+  </mc:AlternateContent>
+  <p:timing>
+    <p:tnLst>
+      <p:par>
+        <p:cTn id="1" dur="indefinite" restart="never" nodeType="tmRoot"/>
+      </p:par>
+    </p:tnLst>
+  </p:timing>
+</p:sld>
+</file>
+
+<file path=ppt/slides/slide4.xml><?xml version="1.0" encoding="utf-8"?>
+<p:sld xmlns:a="http://schemas.openxmlformats.org/drawingml/2006/main" xmlns:r="http://schemas.openxmlformats.org/officeDocument/2006/relationships" xmlns:p="http://schemas.openxmlformats.org/presentationml/2006/main">
+  <p:cSld>
+    <p:spTree>
+      <p:nvGrpSpPr>
+        <p:cNvPr id="1" name=""/>
+        <p:cNvGrpSpPr/>
+        <p:nvPr/>
+      </p:nvGrpSpPr>
+      <p:grpSpPr>
+        <a:xfrm>
+          <a:off x="0" y="0"/>
+          <a:ext cx="0" cy="0"/>
+          <a:chOff x="0" y="0"/>
+          <a:chExt cx="0" cy="0"/>
+        </a:xfrm>
+      </p:grpSpPr>
+      <p:sp>
+        <p:nvSpPr>
+          <p:cNvPr id="4" name="Date Placeholder 3"/>
+          <p:cNvSpPr>
+            <a:spLocks noGrp="1"/>
+          </p:cNvSpPr>
+          <p:nvPr>
+            <p:ph type="dt" sz="half" idx="2"/>
+          </p:nvPr>
+        </p:nvSpPr>
+        <p:spPr/>
+        <p:txBody>
+          <a:bodyPr/>
+          <a:lstStyle/>
+          <a:p>
+            <a:pPr>
+              <a:defRPr/>
+            </a:pPr>
+            <a:r>
+              <a:rPr lang="en-US" smtClean="0"/>
+              <a:t>17/05/2017</a:t>
+            </a:r>
+            <a:endParaRPr lang="en-US" dirty="0"/>
+          </a:p>
+        </p:txBody>
+      </p:sp>
+      <p:sp>
+        <p:nvSpPr>
+          <p:cNvPr id="5" name="Footer Placeholder 4"/>
+          <p:cNvSpPr>
+            <a:spLocks noGrp="1"/>
+          </p:cNvSpPr>
+          <p:nvPr>
+            <p:ph type="ftr" sz="quarter" idx="3"/>
+          </p:nvPr>
+        </p:nvSpPr>
+        <p:spPr/>
+        <p:txBody>
+          <a:bodyPr/>
+          <a:lstStyle/>
+          <a:p>
+            <a:pPr>
+              <a:defRPr/>
+            </a:pPr>
+            <a:r>
+              <a:rPr lang="en-US" smtClean="0"/>
+              <a:t>M. Fitterer | Hollow Electron Beam Collimation for HL-LHC - Effects on the Beam Core | IPAC’17</a:t>
+            </a:r>
+            <a:endParaRPr lang="en-US" b="1" dirty="0"/>
+          </a:p>
+        </p:txBody>
+      </p:sp>
+      <p:sp>
+        <p:nvSpPr>
+          <p:cNvPr id="6" name="Slide Number Placeholder 5"/>
+          <p:cNvSpPr>
+            <a:spLocks noGrp="1"/>
+          </p:cNvSpPr>
+          <p:nvPr>
+            <p:ph type="sldNum" sz="quarter" idx="4"/>
+          </p:nvPr>
+        </p:nvSpPr>
+        <p:spPr/>
+        <p:txBody>
+          <a:bodyPr/>
+          <a:lstStyle/>
+          <a:p>
+            <a:pPr>
+              <a:defRPr/>
+            </a:pPr>
+            <a:fld id="{148C009B-CB69-E04A-B9B3-34B26D69E9CF}" type="slidenum">
+              <a:rPr lang="en-US" smtClean="0"/>
+              <a:pPr>
+                <a:defRPr/>
+              </a:pPr>
+              <a:t>4</a:t>
+            </a:fld>
+            <a:endParaRPr lang="en-US" dirty="0"/>
+          </a:p>
+        </p:txBody>
+      </p:sp>
+      <p:grpSp>
+        <p:nvGrpSpPr>
+          <p:cNvPr id="8" name="Group 7"/>
+          <p:cNvGrpSpPr/>
+          <p:nvPr/>
+        </p:nvGrpSpPr>
+        <p:grpSpPr>
+          <a:xfrm>
+            <a:off x="3454400" y="1261674"/>
+            <a:ext cx="5266944" cy="4160210"/>
+            <a:chOff x="3454400" y="1261674"/>
+            <a:chExt cx="5266944" cy="4160210"/>
+          </a:xfrm>
+        </p:grpSpPr>
+        <p:pic>
+          <p:nvPicPr>
+            <p:cNvPr id="7" name="Picture 6"/>
+            <p:cNvPicPr>
+              <a:picLocks noChangeAspect="1"/>
+            </p:cNvPicPr>
+            <p:nvPr/>
+          </p:nvPicPr>
+          <p:blipFill>
+            <a:blip r:embed="rId3">
+              <a:extLst>
+                <a:ext uri="{28A0092B-C50C-407E-A947-70E740481C1C}">
+                  <a14:useLocalDpi xmlns:a14="http://schemas.microsoft.com/office/drawing/2010/main" val="0"/>
+                </a:ext>
+              </a:extLst>
+            </a:blip>
+            <a:stretch>
+              <a:fillRect/>
+            </a:stretch>
+          </p:blipFill>
+          <p:spPr>
+            <a:xfrm>
+              <a:off x="3454400" y="1435100"/>
+              <a:ext cx="5266944" cy="3986784"/>
+            </a:xfrm>
+            <a:prstGeom prst="rect">
+              <a:avLst/>
+            </a:prstGeom>
+          </p:spPr>
+        </p:pic>
+        <p:grpSp>
+          <p:nvGrpSpPr>
+            <p:cNvPr id="23" name="Group 22"/>
+            <p:cNvGrpSpPr/>
+            <p:nvPr/>
+          </p:nvGrpSpPr>
+          <p:grpSpPr>
+            <a:xfrm>
+              <a:off x="5434776" y="1261674"/>
+              <a:ext cx="1134686" cy="1660552"/>
+              <a:chOff x="5434776" y="1261674"/>
+              <a:chExt cx="1134686" cy="1660552"/>
+            </a:xfrm>
+          </p:grpSpPr>
+          <p:sp>
+            <p:nvSpPr>
+              <p:cNvPr id="27" name="Title 6"/>
+              <p:cNvSpPr txBox="1">
+                <a:spLocks/>
+              </p:cNvSpPr>
+              <p:nvPr/>
+            </p:nvSpPr>
+            <p:spPr>
+              <a:xfrm rot="16200000">
+                <a:off x="4873831" y="1822619"/>
+                <a:ext cx="1549768" cy="427877"/>
+              </a:xfrm>
+              <a:prstGeom prst="rect">
+                <a:avLst/>
+              </a:prstGeom>
+            </p:spPr>
+            <p:txBody>
+              <a:bodyPr vert="horz" lIns="0" tIns="0" rIns="0" bIns="0" rtlCol="0" anchor="b" anchorCtr="0">
+                <a:normAutofit/>
+              </a:bodyPr>
+              <a:lstStyle>
+                <a:lvl1pPr algn="l" defTabSz="914400" rtl="0" eaLnBrk="1" latinLnBrk="0" hangingPunct="1">
+                  <a:lnSpc>
+                    <a:spcPct val="90000"/>
+                  </a:lnSpc>
+                  <a:spcBef>
+                    <a:spcPct val="0"/>
+                  </a:spcBef>
+                  <a:buNone/>
+                  <a:defRPr sz="2800" kern="1200">
+                    <a:solidFill>
+                      <a:srgbClr val="004C97"/>
+                    </a:solidFill>
+                    <a:latin typeface="+mj-lt"/>
+                    <a:ea typeface="+mj-ea"/>
+                    <a:cs typeface="+mj-cs"/>
+                  </a:defRPr>
+                </a:lvl1pPr>
+              </a:lstStyle>
+              <a:p>
+                <a:r>
+                  <a:rPr lang="en-US" sz="1400" dirty="0" smtClean="0">
+                    <a:solidFill>
+                      <a:schemeClr val="accent1">
+                        <a:lumMod val="75000"/>
+                      </a:schemeClr>
+                    </a:solidFill>
+                    <a:latin typeface="PT Sans" charset="-52"/>
+                    <a:ea typeface="PT Sans" charset="-52"/>
+                    <a:cs typeface="PT Sans" charset="-52"/>
+                  </a:rPr>
+                  <a:t>fast adjustment</a:t>
+                </a:r>
+                <a:endParaRPr lang="en-US" sz="1400" dirty="0">
+                  <a:solidFill>
+                    <a:schemeClr val="accent1">
+                      <a:lumMod val="75000"/>
+                    </a:schemeClr>
+                  </a:solidFill>
+                  <a:latin typeface="PT Sans" charset="-52"/>
+                  <a:ea typeface="PT Sans" charset="-52"/>
+                  <a:cs typeface="PT Sans" charset="-52"/>
+                </a:endParaRPr>
+              </a:p>
+            </p:txBody>
+          </p:sp>
+          <p:sp>
+            <p:nvSpPr>
+              <p:cNvPr id="29" name="Title 6"/>
+              <p:cNvSpPr txBox="1">
+                <a:spLocks/>
+              </p:cNvSpPr>
+              <p:nvPr/>
+            </p:nvSpPr>
+            <p:spPr>
+              <a:xfrm rot="16200000">
+                <a:off x="5580640" y="1933403"/>
+                <a:ext cx="1549768" cy="427877"/>
+              </a:xfrm>
+              <a:prstGeom prst="rect">
+                <a:avLst/>
+              </a:prstGeom>
+            </p:spPr>
+            <p:txBody>
+              <a:bodyPr vert="horz" lIns="0" tIns="0" rIns="0" bIns="0" rtlCol="0" anchor="b" anchorCtr="0">
+                <a:normAutofit/>
+              </a:bodyPr>
+              <a:lstStyle>
+                <a:lvl1pPr algn="l" defTabSz="914400" rtl="0" eaLnBrk="1" latinLnBrk="0" hangingPunct="1">
+                  <a:lnSpc>
+                    <a:spcPct val="90000"/>
+                  </a:lnSpc>
+                  <a:spcBef>
+                    <a:spcPct val="0"/>
+                  </a:spcBef>
+                  <a:buNone/>
+                  <a:defRPr sz="2800" kern="1200">
+                    <a:solidFill>
+                      <a:srgbClr val="004C97"/>
+                    </a:solidFill>
+                    <a:latin typeface="+mj-lt"/>
+                    <a:ea typeface="+mj-ea"/>
+                    <a:cs typeface="+mj-cs"/>
+                  </a:defRPr>
+                </a:lvl1pPr>
+              </a:lstStyle>
+              <a:p>
+                <a:r>
+                  <a:rPr lang="en-US" sz="1400" dirty="0" smtClean="0">
+                    <a:solidFill>
+                      <a:schemeClr val="tx1"/>
+                    </a:solidFill>
+                    <a:latin typeface="PT Sans" charset="-52"/>
+                    <a:ea typeface="PT Sans" charset="-52"/>
+                    <a:cs typeface="PT Sans" charset="-52"/>
+                  </a:rPr>
+                  <a:t>equilibrium state</a:t>
+                </a:r>
+                <a:endParaRPr lang="en-US" sz="1400" dirty="0">
+                  <a:solidFill>
+                    <a:schemeClr val="tx1"/>
+                  </a:solidFill>
+                  <a:latin typeface="PT Sans" charset="-52"/>
+                  <a:ea typeface="PT Sans" charset="-52"/>
+                  <a:cs typeface="PT Sans" charset="-52"/>
+                </a:endParaRPr>
+              </a:p>
+            </p:txBody>
+          </p:sp>
+        </p:grpSp>
+      </p:grpSp>
+    </p:spTree>
+    <p:extLst>
+      <p:ext uri="{BB962C8B-B14F-4D97-AF65-F5344CB8AC3E}">
+        <p14:creationId xmlns:p14="http://schemas.microsoft.com/office/powerpoint/2010/main" val="303144653"/>
       </p:ext>
     </p:extLst>
   </p:cSld>

</xml_diff>

<commit_message>
add hel residual field part from Giulio
</commit_message>
<xml_diff>
--- a/Pictures.pptx
+++ b/Pictures.pptx
@@ -5,13 +5,12 @@
     <p:sldMasterId id="2147483648" r:id="rId1"/>
   </p:sldMasterIdLst>
   <p:notesMasterIdLst>
-    <p:notesMasterId r:id="rId6"/>
+    <p:notesMasterId r:id="rId5"/>
   </p:notesMasterIdLst>
   <p:sldIdLst>
     <p:sldId id="257" r:id="rId2"/>
     <p:sldId id="258" r:id="rId3"/>
-    <p:sldId id="260" r:id="rId4"/>
-    <p:sldId id="261" r:id="rId5"/>
+    <p:sldId id="259" r:id="rId4"/>
   </p:sldIdLst>
   <p:sldSz cx="12192000" cy="6858000"/>
   <p:notesSz cx="6858000" cy="9144000"/>
@@ -200,7 +199,7 @@
           <a:p>
             <a:fld id="{1B490EBA-BA3E-344A-8EE1-AF7B8F6FD65C}" type="datetimeFigureOut">
               <a:rPr lang="en-US" smtClean="0"/>
-              <a:t>12/21/17</a:t>
+              <a:t>1/29/18</a:t>
             </a:fld>
             <a:endParaRPr lang="en-US"/>
           </a:p>
@@ -264,38 +263,37 @@
           <a:p>
             <a:pPr lvl="0"/>
             <a:r>
-              <a:rPr lang="en-US" smtClean="0"/>
+              <a:rPr lang="en-US"/>
               <a:t>Click to edit Master text styles</a:t>
             </a:r>
           </a:p>
           <a:p>
             <a:pPr lvl="1"/>
             <a:r>
-              <a:rPr lang="en-US" smtClean="0"/>
+              <a:rPr lang="en-US"/>
               <a:t>Second level</a:t>
             </a:r>
           </a:p>
           <a:p>
             <a:pPr lvl="2"/>
             <a:r>
-              <a:rPr lang="en-US" smtClean="0"/>
+              <a:rPr lang="en-US"/>
               <a:t>Third level</a:t>
             </a:r>
           </a:p>
           <a:p>
             <a:pPr lvl="3"/>
             <a:r>
-              <a:rPr lang="en-US" smtClean="0"/>
+              <a:rPr lang="en-US"/>
               <a:t>Fourth level</a:t>
             </a:r>
           </a:p>
           <a:p>
             <a:pPr lvl="4"/>
             <a:r>
-              <a:rPr lang="en-US" smtClean="0"/>
+              <a:rPr lang="en-US"/>
               <a:t>Fifth level</a:t>
             </a:r>
-            <a:endParaRPr lang="en-US"/>
           </a:p>
         </p:txBody>
       </p:sp>
@@ -513,11 +511,11 @@
           <a:lstStyle/>
           <a:p>
             <a:r>
-              <a:rPr lang="en-US" dirty="0" smtClean="0"/>
+              <a:rPr lang="en-US" dirty="0"/>
               <a:t>solenoid field has to be &gt; 0.2 T in order to confine beam</a:t>
             </a:r>
             <a:r>
-              <a:rPr lang="en-US" baseline="0" dirty="0" smtClean="0"/>
+              <a:rPr lang="en-US" baseline="0" dirty="0"/>
               <a:t> against space charge forces</a:t>
             </a:r>
             <a:endParaRPr lang="en-US" dirty="0"/>
@@ -611,110 +609,12 @@
           <a:lstStyle/>
           <a:p>
             <a:r>
-              <a:rPr lang="en-US" dirty="0" smtClean="0"/>
-              <a:t>solenoid field has to be &gt; 0.2 T in order to confine beam</a:t>
-            </a:r>
-            <a:r>
-              <a:rPr lang="en-US" baseline="0" dirty="0" smtClean="0"/>
-              <a:t> against space charge forces</a:t>
-            </a:r>
-            <a:endParaRPr lang="en-US" dirty="0"/>
-          </a:p>
-        </p:txBody>
-      </p:sp>
-      <p:sp>
-        <p:nvSpPr>
-          <p:cNvPr id="4" name="Slide Number Placeholder 3"/>
-          <p:cNvSpPr>
-            <a:spLocks noGrp="1"/>
-          </p:cNvSpPr>
-          <p:nvPr>
-            <p:ph type="sldNum" sz="quarter" idx="10"/>
-          </p:nvPr>
-        </p:nvSpPr>
-        <p:spPr/>
-        <p:txBody>
-          <a:bodyPr/>
-          <a:lstStyle/>
-          <a:p>
-            <a:pPr>
-              <a:defRPr/>
-            </a:pPr>
-            <a:fld id="{CAD08E57-B576-F641-BEA6-C3D752DF7F66}" type="slidenum">
-              <a:rPr lang="en-US" smtClean="0"/>
-              <a:pPr>
-                <a:defRPr/>
-              </a:pPr>
-              <a:t>2</a:t>
-            </a:fld>
-            <a:endParaRPr lang="en-US"/>
-          </a:p>
-        </p:txBody>
-      </p:sp>
-    </p:spTree>
-    <p:extLst>
-      <p:ext uri="{BB962C8B-B14F-4D97-AF65-F5344CB8AC3E}">
-        <p14:creationId xmlns:p14="http://schemas.microsoft.com/office/powerpoint/2010/main" val="790550780"/>
-      </p:ext>
-    </p:extLst>
-  </p:cSld>
-  <p:clrMapOvr>
-    <a:masterClrMapping/>
-  </p:clrMapOvr>
-</p:notes>
-</file>
-
-<file path=ppt/notesSlides/notesSlide3.xml><?xml version="1.0" encoding="utf-8"?>
-<p:notes xmlns:a="http://schemas.openxmlformats.org/drawingml/2006/main" xmlns:r="http://schemas.openxmlformats.org/officeDocument/2006/relationships" xmlns:p="http://schemas.openxmlformats.org/presentationml/2006/main">
-  <p:cSld>
-    <p:spTree>
-      <p:nvGrpSpPr>
-        <p:cNvPr id="1" name=""/>
-        <p:cNvGrpSpPr/>
-        <p:nvPr/>
-      </p:nvGrpSpPr>
-      <p:grpSpPr>
-        <a:xfrm>
-          <a:off x="0" y="0"/>
-          <a:ext cx="0" cy="0"/>
-          <a:chOff x="0" y="0"/>
-          <a:chExt cx="0" cy="0"/>
-        </a:xfrm>
-      </p:grpSpPr>
-      <p:sp>
-        <p:nvSpPr>
-          <p:cNvPr id="2" name="Slide Image Placeholder 1"/>
-          <p:cNvSpPr>
-            <a:spLocks noGrp="1" noRot="1" noChangeAspect="1"/>
-          </p:cNvSpPr>
-          <p:nvPr>
-            <p:ph type="sldImg"/>
-          </p:nvPr>
-        </p:nvSpPr>
-        <p:spPr/>
-      </p:sp>
-      <p:sp>
-        <p:nvSpPr>
-          <p:cNvPr id="3" name="Notes Placeholder 2"/>
-          <p:cNvSpPr>
-            <a:spLocks noGrp="1"/>
-          </p:cNvSpPr>
-          <p:nvPr>
-            <p:ph type="body" idx="1"/>
-          </p:nvPr>
-        </p:nvSpPr>
-        <p:spPr/>
-        <p:txBody>
-          <a:bodyPr/>
-          <a:lstStyle/>
-          <a:p>
-            <a:r>
-              <a:rPr lang="en-US" dirty="0" smtClean="0"/>
-              <a:t>solenoid field has to be &gt; 0.2 T in order to confine beam</a:t>
-            </a:r>
-            <a:r>
-              <a:rPr lang="en-US" baseline="0" dirty="0" smtClean="0"/>
-              <a:t> against space charge forces</a:t>
+              <a:rPr lang="en-US" dirty="0"/>
+              <a:t>- actively control</a:t>
+            </a:r>
+            <a:r>
+              <a:rPr lang="en-US" baseline="0" dirty="0"/>
+              <a:t> diffusion speed of the halo particles</a:t>
             </a:r>
             <a:endParaRPr lang="en-US" dirty="0"/>
           </a:p>
@@ -752,105 +652,7 @@
     </p:spTree>
     <p:extLst>
       <p:ext uri="{BB962C8B-B14F-4D97-AF65-F5344CB8AC3E}">
-        <p14:creationId xmlns:p14="http://schemas.microsoft.com/office/powerpoint/2010/main" val="1119527768"/>
-      </p:ext>
-    </p:extLst>
-  </p:cSld>
-  <p:clrMapOvr>
-    <a:masterClrMapping/>
-  </p:clrMapOvr>
-</p:notes>
-</file>
-
-<file path=ppt/notesSlides/notesSlide4.xml><?xml version="1.0" encoding="utf-8"?>
-<p:notes xmlns:a="http://schemas.openxmlformats.org/drawingml/2006/main" xmlns:r="http://schemas.openxmlformats.org/officeDocument/2006/relationships" xmlns:p="http://schemas.openxmlformats.org/presentationml/2006/main">
-  <p:cSld>
-    <p:spTree>
-      <p:nvGrpSpPr>
-        <p:cNvPr id="1" name=""/>
-        <p:cNvGrpSpPr/>
-        <p:nvPr/>
-      </p:nvGrpSpPr>
-      <p:grpSpPr>
-        <a:xfrm>
-          <a:off x="0" y="0"/>
-          <a:ext cx="0" cy="0"/>
-          <a:chOff x="0" y="0"/>
-          <a:chExt cx="0" cy="0"/>
-        </a:xfrm>
-      </p:grpSpPr>
-      <p:sp>
-        <p:nvSpPr>
-          <p:cNvPr id="2" name="Slide Image Placeholder 1"/>
-          <p:cNvSpPr>
-            <a:spLocks noGrp="1" noRot="1" noChangeAspect="1"/>
-          </p:cNvSpPr>
-          <p:nvPr>
-            <p:ph type="sldImg"/>
-          </p:nvPr>
-        </p:nvSpPr>
-        <p:spPr/>
-      </p:sp>
-      <p:sp>
-        <p:nvSpPr>
-          <p:cNvPr id="3" name="Notes Placeholder 2"/>
-          <p:cNvSpPr>
-            <a:spLocks noGrp="1"/>
-          </p:cNvSpPr>
-          <p:nvPr>
-            <p:ph type="body" idx="1"/>
-          </p:nvPr>
-        </p:nvSpPr>
-        <p:spPr/>
-        <p:txBody>
-          <a:bodyPr/>
-          <a:lstStyle/>
-          <a:p>
-            <a:r>
-              <a:rPr lang="en-US" dirty="0" smtClean="0"/>
-              <a:t>solenoid field has to be &gt; 0.2 T in order to confine beam</a:t>
-            </a:r>
-            <a:r>
-              <a:rPr lang="en-US" baseline="0" dirty="0" smtClean="0"/>
-              <a:t> against space charge forces</a:t>
-            </a:r>
-            <a:endParaRPr lang="en-US" dirty="0"/>
-          </a:p>
-        </p:txBody>
-      </p:sp>
-      <p:sp>
-        <p:nvSpPr>
-          <p:cNvPr id="4" name="Slide Number Placeholder 3"/>
-          <p:cNvSpPr>
-            <a:spLocks noGrp="1"/>
-          </p:cNvSpPr>
-          <p:nvPr>
-            <p:ph type="sldNum" sz="quarter" idx="10"/>
-          </p:nvPr>
-        </p:nvSpPr>
-        <p:spPr/>
-        <p:txBody>
-          <a:bodyPr/>
-          <a:lstStyle/>
-          <a:p>
-            <a:pPr>
-              <a:defRPr/>
-            </a:pPr>
-            <a:fld id="{CAD08E57-B576-F641-BEA6-C3D752DF7F66}" type="slidenum">
-              <a:rPr lang="en-US" smtClean="0"/>
-              <a:pPr>
-                <a:defRPr/>
-              </a:pPr>
-              <a:t>4</a:t>
-            </a:fld>
-            <a:endParaRPr lang="en-US"/>
-          </a:p>
-        </p:txBody>
-      </p:sp>
-    </p:spTree>
-    <p:extLst>
-      <p:ext uri="{BB962C8B-B14F-4D97-AF65-F5344CB8AC3E}">
-        <p14:creationId xmlns:p14="http://schemas.microsoft.com/office/powerpoint/2010/main" val="1120972287"/>
+        <p14:creationId xmlns:p14="http://schemas.microsoft.com/office/powerpoint/2010/main" val="2238214039"/>
       </p:ext>
     </p:extLst>
   </p:cSld>
@@ -902,10 +704,9 @@
           </a:lstStyle>
           <a:p>
             <a:r>
-              <a:rPr lang="en-US" smtClean="0"/>
+              <a:rPr lang="en-US"/>
               <a:t>Click to edit Master title style</a:t>
             </a:r>
-            <a:endParaRPr lang="en-US"/>
           </a:p>
         </p:txBody>
       </p:sp>
@@ -967,10 +768,9 @@
           </a:lstStyle>
           <a:p>
             <a:r>
-              <a:rPr lang="en-US" smtClean="0"/>
+              <a:rPr lang="en-US"/>
               <a:t>Click to edit Master subtitle style</a:t>
             </a:r>
-            <a:endParaRPr lang="en-US"/>
           </a:p>
         </p:txBody>
       </p:sp>
@@ -991,7 +791,7 @@
           <a:p>
             <a:fld id="{5849364A-029B-874F-B228-FB2A7A8248D3}" type="datetimeFigureOut">
               <a:rPr lang="en-US" smtClean="0"/>
-              <a:t>12/21/17</a:t>
+              <a:t>1/29/18</a:t>
             </a:fld>
             <a:endParaRPr lang="en-US"/>
           </a:p>
@@ -1085,10 +885,9 @@
           <a:lstStyle/>
           <a:p>
             <a:r>
-              <a:rPr lang="en-US" smtClean="0"/>
+              <a:rPr lang="en-US"/>
               <a:t>Click to edit Master title style</a:t>
             </a:r>
-            <a:endParaRPr lang="en-US"/>
           </a:p>
         </p:txBody>
       </p:sp>
@@ -1109,38 +908,37 @@
           <a:p>
             <a:pPr lvl="0"/>
             <a:r>
-              <a:rPr lang="en-US" smtClean="0"/>
+              <a:rPr lang="en-US"/>
               <a:t>Click to edit Master text styles</a:t>
             </a:r>
           </a:p>
           <a:p>
             <a:pPr lvl="1"/>
             <a:r>
-              <a:rPr lang="en-US" smtClean="0"/>
+              <a:rPr lang="en-US"/>
               <a:t>Second level</a:t>
             </a:r>
           </a:p>
           <a:p>
             <a:pPr lvl="2"/>
             <a:r>
-              <a:rPr lang="en-US" smtClean="0"/>
+              <a:rPr lang="en-US"/>
               <a:t>Third level</a:t>
             </a:r>
           </a:p>
           <a:p>
             <a:pPr lvl="3"/>
             <a:r>
-              <a:rPr lang="en-US" smtClean="0"/>
+              <a:rPr lang="en-US"/>
               <a:t>Fourth level</a:t>
             </a:r>
           </a:p>
           <a:p>
             <a:pPr lvl="4"/>
             <a:r>
-              <a:rPr lang="en-US" smtClean="0"/>
+              <a:rPr lang="en-US"/>
               <a:t>Fifth level</a:t>
             </a:r>
-            <a:endParaRPr lang="en-US"/>
           </a:p>
         </p:txBody>
       </p:sp>
@@ -1161,7 +959,7 @@
           <a:p>
             <a:fld id="{5849364A-029B-874F-B228-FB2A7A8248D3}" type="datetimeFigureOut">
               <a:rPr lang="en-US" smtClean="0"/>
-              <a:t>12/21/17</a:t>
+              <a:t>1/29/18</a:t>
             </a:fld>
             <a:endParaRPr lang="en-US"/>
           </a:p>
@@ -1260,10 +1058,9 @@
           <a:lstStyle/>
           <a:p>
             <a:r>
-              <a:rPr lang="en-US" smtClean="0"/>
+              <a:rPr lang="en-US"/>
               <a:t>Click to edit Master title style</a:t>
             </a:r>
-            <a:endParaRPr lang="en-US"/>
           </a:p>
         </p:txBody>
       </p:sp>
@@ -1289,38 +1086,37 @@
           <a:p>
             <a:pPr lvl="0"/>
             <a:r>
-              <a:rPr lang="en-US" smtClean="0"/>
+              <a:rPr lang="en-US"/>
               <a:t>Click to edit Master text styles</a:t>
             </a:r>
           </a:p>
           <a:p>
             <a:pPr lvl="1"/>
             <a:r>
-              <a:rPr lang="en-US" smtClean="0"/>
+              <a:rPr lang="en-US"/>
               <a:t>Second level</a:t>
             </a:r>
           </a:p>
           <a:p>
             <a:pPr lvl="2"/>
             <a:r>
-              <a:rPr lang="en-US" smtClean="0"/>
+              <a:rPr lang="en-US"/>
               <a:t>Third level</a:t>
             </a:r>
           </a:p>
           <a:p>
             <a:pPr lvl="3"/>
             <a:r>
-              <a:rPr lang="en-US" smtClean="0"/>
+              <a:rPr lang="en-US"/>
               <a:t>Fourth level</a:t>
             </a:r>
           </a:p>
           <a:p>
             <a:pPr lvl="4"/>
             <a:r>
-              <a:rPr lang="en-US" smtClean="0"/>
+              <a:rPr lang="en-US"/>
               <a:t>Fifth level</a:t>
             </a:r>
-            <a:endParaRPr lang="en-US"/>
           </a:p>
         </p:txBody>
       </p:sp>
@@ -1341,7 +1137,7 @@
           <a:p>
             <a:fld id="{5849364A-029B-874F-B228-FB2A7A8248D3}" type="datetimeFigureOut">
               <a:rPr lang="en-US" smtClean="0"/>
-              <a:t>12/21/17</a:t>
+              <a:t>1/29/18</a:t>
             </a:fld>
             <a:endParaRPr lang="en-US"/>
           </a:p>
@@ -1461,7 +1257,7 @@
           </a:lstStyle>
           <a:p>
             <a:r>
-              <a:rPr lang="en-US" smtClean="0"/>
+              <a:rPr lang="en-US"/>
               <a:t>Click to edit Master title style</a:t>
             </a:r>
             <a:endParaRPr lang="en-US" dirty="0"/>
@@ -1531,35 +1327,35 @@
           <a:p>
             <a:pPr lvl="0"/>
             <a:r>
-              <a:rPr lang="en-US" smtClean="0"/>
+              <a:rPr lang="en-US"/>
               <a:t>Click to edit Master text styles</a:t>
             </a:r>
           </a:p>
           <a:p>
             <a:pPr lvl="1"/>
             <a:r>
-              <a:rPr lang="en-US" smtClean="0"/>
+              <a:rPr lang="en-US"/>
               <a:t>Second level</a:t>
             </a:r>
           </a:p>
           <a:p>
             <a:pPr lvl="2"/>
             <a:r>
-              <a:rPr lang="en-US" smtClean="0"/>
+              <a:rPr lang="en-US"/>
               <a:t>Third level</a:t>
             </a:r>
           </a:p>
           <a:p>
             <a:pPr lvl="3"/>
             <a:r>
-              <a:rPr lang="en-US" smtClean="0"/>
+              <a:rPr lang="en-US"/>
               <a:t>Fourth level</a:t>
             </a:r>
           </a:p>
           <a:p>
             <a:pPr lvl="4"/>
             <a:r>
-              <a:rPr lang="en-US" smtClean="0"/>
+              <a:rPr lang="en-US"/>
               <a:t>Fifth level</a:t>
             </a:r>
             <a:endParaRPr lang="en-US" dirty="0"/>
@@ -1643,7 +1439,7 @@
               <a:defRPr/>
             </a:pPr>
             <a:r>
-              <a:rPr lang="en-US" smtClean="0"/>
+              <a:rPr lang="en-US"/>
               <a:t>17/05/2017</a:t>
             </a:r>
             <a:endParaRPr lang="en-US" dirty="0"/>
@@ -1685,10 +1481,9 @@
           </a:lstStyle>
           <a:p>
             <a:r>
-              <a:rPr lang="en-US" dirty="0" smtClean="0"/>
+              <a:rPr lang="en-US" dirty="0"/>
               <a:t>M. Fitterer | Hollow Electron Beam Collimation for HL-LHC - Effects on the Beam Core | IPAC’17</a:t>
             </a:r>
-            <a:endParaRPr lang="en-US" dirty="0"/>
           </a:p>
         </p:txBody>
       </p:sp>
@@ -1753,13 +1548,6 @@
   <p:clrMapOvr>
     <a:masterClrMapping/>
   </p:clrMapOvr>
-  <p:timing>
-    <p:tnLst>
-      <p:par>
-        <p:cTn id="1" dur="indefinite" restart="never" nodeType="tmRoot"/>
-      </p:par>
-    </p:tnLst>
-  </p:timing>
 </p:sldLayout>
 </file>
 
@@ -1796,10 +1584,9 @@
           <a:lstStyle/>
           <a:p>
             <a:r>
-              <a:rPr lang="en-US" smtClean="0"/>
+              <a:rPr lang="en-US"/>
               <a:t>Click to edit Master title style</a:t>
             </a:r>
-            <a:endParaRPr lang="en-US"/>
           </a:p>
         </p:txBody>
       </p:sp>
@@ -1820,38 +1607,37 @@
           <a:p>
             <a:pPr lvl="0"/>
             <a:r>
-              <a:rPr lang="en-US" smtClean="0"/>
+              <a:rPr lang="en-US"/>
               <a:t>Click to edit Master text styles</a:t>
             </a:r>
           </a:p>
           <a:p>
             <a:pPr lvl="1"/>
             <a:r>
-              <a:rPr lang="en-US" smtClean="0"/>
+              <a:rPr lang="en-US"/>
               <a:t>Second level</a:t>
             </a:r>
           </a:p>
           <a:p>
             <a:pPr lvl="2"/>
             <a:r>
-              <a:rPr lang="en-US" smtClean="0"/>
+              <a:rPr lang="en-US"/>
               <a:t>Third level</a:t>
             </a:r>
           </a:p>
           <a:p>
             <a:pPr lvl="3"/>
             <a:r>
-              <a:rPr lang="en-US" smtClean="0"/>
+              <a:rPr lang="en-US"/>
               <a:t>Fourth level</a:t>
             </a:r>
           </a:p>
           <a:p>
             <a:pPr lvl="4"/>
             <a:r>
-              <a:rPr lang="en-US" smtClean="0"/>
+              <a:rPr lang="en-US"/>
               <a:t>Fifth level</a:t>
             </a:r>
-            <a:endParaRPr lang="en-US"/>
           </a:p>
         </p:txBody>
       </p:sp>
@@ -1872,7 +1658,7 @@
           <a:p>
             <a:fld id="{5849364A-029B-874F-B228-FB2A7A8248D3}" type="datetimeFigureOut">
               <a:rPr lang="en-US" smtClean="0"/>
-              <a:t>12/21/17</a:t>
+              <a:t>1/29/18</a:t>
             </a:fld>
             <a:endParaRPr lang="en-US"/>
           </a:p>
@@ -1975,10 +1761,9 @@
           </a:lstStyle>
           <a:p>
             <a:r>
-              <a:rPr lang="en-US" smtClean="0"/>
+              <a:rPr lang="en-US"/>
               <a:t>Click to edit Master title style</a:t>
             </a:r>
-            <a:endParaRPr lang="en-US"/>
           </a:p>
         </p:txBody>
       </p:sp>
@@ -2095,7 +1880,7 @@
           <a:p>
             <a:pPr lvl="0"/>
             <a:r>
-              <a:rPr lang="en-US" smtClean="0"/>
+              <a:rPr lang="en-US"/>
               <a:t>Click to edit Master text styles</a:t>
             </a:r>
           </a:p>
@@ -2118,7 +1903,7 @@
           <a:p>
             <a:fld id="{5849364A-029B-874F-B228-FB2A7A8248D3}" type="datetimeFigureOut">
               <a:rPr lang="en-US" smtClean="0"/>
-              <a:t>12/21/17</a:t>
+              <a:t>1/29/18</a:t>
             </a:fld>
             <a:endParaRPr lang="en-US"/>
           </a:p>
@@ -2212,10 +1997,9 @@
           <a:lstStyle/>
           <a:p>
             <a:r>
-              <a:rPr lang="en-US" smtClean="0"/>
+              <a:rPr lang="en-US"/>
               <a:t>Click to edit Master title style</a:t>
             </a:r>
-            <a:endParaRPr lang="en-US"/>
           </a:p>
         </p:txBody>
       </p:sp>
@@ -2241,38 +2025,37 @@
           <a:p>
             <a:pPr lvl="0"/>
             <a:r>
-              <a:rPr lang="en-US" smtClean="0"/>
+              <a:rPr lang="en-US"/>
               <a:t>Click to edit Master text styles</a:t>
             </a:r>
           </a:p>
           <a:p>
             <a:pPr lvl="1"/>
             <a:r>
-              <a:rPr lang="en-US" smtClean="0"/>
+              <a:rPr lang="en-US"/>
               <a:t>Second level</a:t>
             </a:r>
           </a:p>
           <a:p>
             <a:pPr lvl="2"/>
             <a:r>
-              <a:rPr lang="en-US" smtClean="0"/>
+              <a:rPr lang="en-US"/>
               <a:t>Third level</a:t>
             </a:r>
           </a:p>
           <a:p>
             <a:pPr lvl="3"/>
             <a:r>
-              <a:rPr lang="en-US" smtClean="0"/>
+              <a:rPr lang="en-US"/>
               <a:t>Fourth level</a:t>
             </a:r>
           </a:p>
           <a:p>
             <a:pPr lvl="4"/>
             <a:r>
-              <a:rPr lang="en-US" smtClean="0"/>
+              <a:rPr lang="en-US"/>
               <a:t>Fifth level</a:t>
             </a:r>
-            <a:endParaRPr lang="en-US"/>
           </a:p>
         </p:txBody>
       </p:sp>
@@ -2298,38 +2081,37 @@
           <a:p>
             <a:pPr lvl="0"/>
             <a:r>
-              <a:rPr lang="en-US" smtClean="0"/>
+              <a:rPr lang="en-US"/>
               <a:t>Click to edit Master text styles</a:t>
             </a:r>
           </a:p>
           <a:p>
             <a:pPr lvl="1"/>
             <a:r>
-              <a:rPr lang="en-US" smtClean="0"/>
+              <a:rPr lang="en-US"/>
               <a:t>Second level</a:t>
             </a:r>
           </a:p>
           <a:p>
             <a:pPr lvl="2"/>
             <a:r>
-              <a:rPr lang="en-US" smtClean="0"/>
+              <a:rPr lang="en-US"/>
               <a:t>Third level</a:t>
             </a:r>
           </a:p>
           <a:p>
             <a:pPr lvl="3"/>
             <a:r>
-              <a:rPr lang="en-US" smtClean="0"/>
+              <a:rPr lang="en-US"/>
               <a:t>Fourth level</a:t>
             </a:r>
           </a:p>
           <a:p>
             <a:pPr lvl="4"/>
             <a:r>
-              <a:rPr lang="en-US" smtClean="0"/>
+              <a:rPr lang="en-US"/>
               <a:t>Fifth level</a:t>
             </a:r>
-            <a:endParaRPr lang="en-US"/>
           </a:p>
         </p:txBody>
       </p:sp>
@@ -2350,7 +2132,7 @@
           <a:p>
             <a:fld id="{5849364A-029B-874F-B228-FB2A7A8248D3}" type="datetimeFigureOut">
               <a:rPr lang="en-US" smtClean="0"/>
-              <a:t>12/21/17</a:t>
+              <a:t>1/29/18</a:t>
             </a:fld>
             <a:endParaRPr lang="en-US"/>
           </a:p>
@@ -2449,10 +2231,9 @@
           <a:lstStyle/>
           <a:p>
             <a:r>
-              <a:rPr lang="en-US" smtClean="0"/>
+              <a:rPr lang="en-US"/>
               <a:t>Click to edit Master title style</a:t>
             </a:r>
-            <a:endParaRPr lang="en-US"/>
           </a:p>
         </p:txBody>
       </p:sp>
@@ -2515,7 +2296,7 @@
           <a:p>
             <a:pPr lvl="0"/>
             <a:r>
-              <a:rPr lang="en-US" smtClean="0"/>
+              <a:rPr lang="en-US"/>
               <a:t>Click to edit Master text styles</a:t>
             </a:r>
           </a:p>
@@ -2543,38 +2324,37 @@
           <a:p>
             <a:pPr lvl="0"/>
             <a:r>
-              <a:rPr lang="en-US" smtClean="0"/>
+              <a:rPr lang="en-US"/>
               <a:t>Click to edit Master text styles</a:t>
             </a:r>
           </a:p>
           <a:p>
             <a:pPr lvl="1"/>
             <a:r>
-              <a:rPr lang="en-US" smtClean="0"/>
+              <a:rPr lang="en-US"/>
               <a:t>Second level</a:t>
             </a:r>
           </a:p>
           <a:p>
             <a:pPr lvl="2"/>
             <a:r>
-              <a:rPr lang="en-US" smtClean="0"/>
+              <a:rPr lang="en-US"/>
               <a:t>Third level</a:t>
             </a:r>
           </a:p>
           <a:p>
             <a:pPr lvl="3"/>
             <a:r>
-              <a:rPr lang="en-US" smtClean="0"/>
+              <a:rPr lang="en-US"/>
               <a:t>Fourth level</a:t>
             </a:r>
           </a:p>
           <a:p>
             <a:pPr lvl="4"/>
             <a:r>
-              <a:rPr lang="en-US" smtClean="0"/>
+              <a:rPr lang="en-US"/>
               <a:t>Fifth level</a:t>
             </a:r>
-            <a:endParaRPr lang="en-US"/>
           </a:p>
         </p:txBody>
       </p:sp>
@@ -2637,7 +2417,7 @@
           <a:p>
             <a:pPr lvl="0"/>
             <a:r>
-              <a:rPr lang="en-US" smtClean="0"/>
+              <a:rPr lang="en-US"/>
               <a:t>Click to edit Master text styles</a:t>
             </a:r>
           </a:p>
@@ -2665,38 +2445,37 @@
           <a:p>
             <a:pPr lvl="0"/>
             <a:r>
-              <a:rPr lang="en-US" smtClean="0"/>
+              <a:rPr lang="en-US"/>
               <a:t>Click to edit Master text styles</a:t>
             </a:r>
           </a:p>
           <a:p>
             <a:pPr lvl="1"/>
             <a:r>
-              <a:rPr lang="en-US" smtClean="0"/>
+              <a:rPr lang="en-US"/>
               <a:t>Second level</a:t>
             </a:r>
           </a:p>
           <a:p>
             <a:pPr lvl="2"/>
             <a:r>
-              <a:rPr lang="en-US" smtClean="0"/>
+              <a:rPr lang="en-US"/>
               <a:t>Third level</a:t>
             </a:r>
           </a:p>
           <a:p>
             <a:pPr lvl="3"/>
             <a:r>
-              <a:rPr lang="en-US" smtClean="0"/>
+              <a:rPr lang="en-US"/>
               <a:t>Fourth level</a:t>
             </a:r>
           </a:p>
           <a:p>
             <a:pPr lvl="4"/>
             <a:r>
-              <a:rPr lang="en-US" smtClean="0"/>
+              <a:rPr lang="en-US"/>
               <a:t>Fifth level</a:t>
             </a:r>
-            <a:endParaRPr lang="en-US"/>
           </a:p>
         </p:txBody>
       </p:sp>
@@ -2717,7 +2496,7 @@
           <a:p>
             <a:fld id="{5849364A-029B-874F-B228-FB2A7A8248D3}" type="datetimeFigureOut">
               <a:rPr lang="en-US" smtClean="0"/>
-              <a:t>12/21/17</a:t>
+              <a:t>1/29/18</a:t>
             </a:fld>
             <a:endParaRPr lang="en-US"/>
           </a:p>
@@ -2811,10 +2590,9 @@
           <a:lstStyle/>
           <a:p>
             <a:r>
-              <a:rPr lang="en-US" smtClean="0"/>
+              <a:rPr lang="en-US"/>
               <a:t>Click to edit Master title style</a:t>
             </a:r>
-            <a:endParaRPr lang="en-US"/>
           </a:p>
         </p:txBody>
       </p:sp>
@@ -2835,7 +2613,7 @@
           <a:p>
             <a:fld id="{5849364A-029B-874F-B228-FB2A7A8248D3}" type="datetimeFigureOut">
               <a:rPr lang="en-US" smtClean="0"/>
-              <a:t>12/21/17</a:t>
+              <a:t>1/29/18</a:t>
             </a:fld>
             <a:endParaRPr lang="en-US"/>
           </a:p>
@@ -2930,7 +2708,7 @@
           <a:p>
             <a:fld id="{5849364A-029B-874F-B228-FB2A7A8248D3}" type="datetimeFigureOut">
               <a:rPr lang="en-US" smtClean="0"/>
-              <a:t>12/21/17</a:t>
+              <a:t>1/29/18</a:t>
             </a:fld>
             <a:endParaRPr lang="en-US"/>
           </a:p>
@@ -3033,10 +2811,9 @@
           </a:lstStyle>
           <a:p>
             <a:r>
-              <a:rPr lang="en-US" smtClean="0"/>
+              <a:rPr lang="en-US"/>
               <a:t>Click to edit Master title style</a:t>
             </a:r>
-            <a:endParaRPr lang="en-US"/>
           </a:p>
         </p:txBody>
       </p:sp>
@@ -3090,38 +2867,37 @@
           <a:p>
             <a:pPr lvl="0"/>
             <a:r>
-              <a:rPr lang="en-US" smtClean="0"/>
+              <a:rPr lang="en-US"/>
               <a:t>Click to edit Master text styles</a:t>
             </a:r>
           </a:p>
           <a:p>
             <a:pPr lvl="1"/>
             <a:r>
-              <a:rPr lang="en-US" smtClean="0"/>
+              <a:rPr lang="en-US"/>
               <a:t>Second level</a:t>
             </a:r>
           </a:p>
           <a:p>
             <a:pPr lvl="2"/>
             <a:r>
-              <a:rPr lang="en-US" smtClean="0"/>
+              <a:rPr lang="en-US"/>
               <a:t>Third level</a:t>
             </a:r>
           </a:p>
           <a:p>
             <a:pPr lvl="3"/>
             <a:r>
-              <a:rPr lang="en-US" smtClean="0"/>
+              <a:rPr lang="en-US"/>
               <a:t>Fourth level</a:t>
             </a:r>
           </a:p>
           <a:p>
             <a:pPr lvl="4"/>
             <a:r>
-              <a:rPr lang="en-US" smtClean="0"/>
+              <a:rPr lang="en-US"/>
               <a:t>Fifth level</a:t>
             </a:r>
-            <a:endParaRPr lang="en-US"/>
           </a:p>
         </p:txBody>
       </p:sp>
@@ -3184,7 +2960,7 @@
           <a:p>
             <a:pPr lvl="0"/>
             <a:r>
-              <a:rPr lang="en-US" smtClean="0"/>
+              <a:rPr lang="en-US"/>
               <a:t>Click to edit Master text styles</a:t>
             </a:r>
           </a:p>
@@ -3207,7 +2983,7 @@
           <a:p>
             <a:fld id="{5849364A-029B-874F-B228-FB2A7A8248D3}" type="datetimeFigureOut">
               <a:rPr lang="en-US" smtClean="0"/>
-              <a:t>12/21/17</a:t>
+              <a:t>1/29/18</a:t>
             </a:fld>
             <a:endParaRPr lang="en-US"/>
           </a:p>
@@ -3310,10 +3086,9 @@
           </a:lstStyle>
           <a:p>
             <a:r>
-              <a:rPr lang="en-US" smtClean="0"/>
+              <a:rPr lang="en-US"/>
               <a:t>Click to edit Master title style</a:t>
             </a:r>
-            <a:endParaRPr lang="en-US"/>
           </a:p>
         </p:txBody>
       </p:sp>
@@ -3437,7 +3212,7 @@
           <a:p>
             <a:pPr lvl="0"/>
             <a:r>
-              <a:rPr lang="en-US" smtClean="0"/>
+              <a:rPr lang="en-US"/>
               <a:t>Click to edit Master text styles</a:t>
             </a:r>
           </a:p>
@@ -3460,7 +3235,7 @@
           <a:p>
             <a:fld id="{5849364A-029B-874F-B228-FB2A7A8248D3}" type="datetimeFigureOut">
               <a:rPr lang="en-US" smtClean="0"/>
-              <a:t>12/21/17</a:t>
+              <a:t>1/29/18</a:t>
             </a:fld>
             <a:endParaRPr lang="en-US"/>
           </a:p>
@@ -3569,10 +3344,9 @@
           <a:lstStyle/>
           <a:p>
             <a:r>
-              <a:rPr lang="en-US" smtClean="0"/>
+              <a:rPr lang="en-US"/>
               <a:t>Click to edit Master title style</a:t>
             </a:r>
-            <a:endParaRPr lang="en-US"/>
           </a:p>
         </p:txBody>
       </p:sp>
@@ -3603,38 +3377,37 @@
           <a:p>
             <a:pPr lvl="0"/>
             <a:r>
-              <a:rPr lang="en-US" smtClean="0"/>
+              <a:rPr lang="en-US"/>
               <a:t>Click to edit Master text styles</a:t>
             </a:r>
           </a:p>
           <a:p>
             <a:pPr lvl="1"/>
             <a:r>
-              <a:rPr lang="en-US" smtClean="0"/>
+              <a:rPr lang="en-US"/>
               <a:t>Second level</a:t>
             </a:r>
           </a:p>
           <a:p>
             <a:pPr lvl="2"/>
             <a:r>
-              <a:rPr lang="en-US" smtClean="0"/>
+              <a:rPr lang="en-US"/>
               <a:t>Third level</a:t>
             </a:r>
           </a:p>
           <a:p>
             <a:pPr lvl="3"/>
             <a:r>
-              <a:rPr lang="en-US" smtClean="0"/>
+              <a:rPr lang="en-US"/>
               <a:t>Fourth level</a:t>
             </a:r>
           </a:p>
           <a:p>
             <a:pPr lvl="4"/>
             <a:r>
-              <a:rPr lang="en-US" smtClean="0"/>
+              <a:rPr lang="en-US"/>
               <a:t>Fifth level</a:t>
             </a:r>
-            <a:endParaRPr lang="en-US"/>
           </a:p>
         </p:txBody>
       </p:sp>
@@ -3673,7 +3446,7 @@
           <a:p>
             <a:fld id="{5849364A-029B-874F-B228-FB2A7A8248D3}" type="datetimeFigureOut">
               <a:rPr lang="en-US" smtClean="0"/>
-              <a:t>12/21/17</a:t>
+              <a:t>1/29/18</a:t>
             </a:fld>
             <a:endParaRPr lang="en-US"/>
           </a:p>
@@ -4095,10 +3868,9 @@
           <a:lstStyle/>
           <a:p>
             <a:r>
-              <a:rPr lang="en-US" dirty="0" smtClean="0"/>
+              <a:rPr lang="en-US" dirty="0"/>
               <a:t>What is an electron lenses?</a:t>
             </a:r>
-            <a:endParaRPr lang="en-US" dirty="0"/>
           </a:p>
         </p:txBody>
       </p:sp>
@@ -4119,11 +3891,13 @@
           </a:xfrm>
         </p:spPr>
         <p:txBody>
-          <a:bodyPr/>
+          <a:bodyPr>
+            <a:normAutofit lnSpcReduction="10000"/>
+          </a:bodyPr>
           <a:lstStyle/>
           <a:p>
             <a:r>
-              <a:rPr lang="en-US" dirty="0" smtClean="0">
+              <a:rPr lang="en-US" dirty="0">
                 <a:solidFill>
                   <a:schemeClr val="accent6"/>
                 </a:solidFill>
@@ -4133,7 +3907,7 @@
           </a:p>
           <a:p>
             <a:r>
-              <a:rPr lang="en-US" dirty="0" smtClean="0">
+              <a:rPr lang="en-US" dirty="0">
                 <a:solidFill>
                   <a:schemeClr val="accent6"/>
                 </a:solidFill>
@@ -4143,18 +3917,13 @@
           </a:p>
           <a:p>
             <a:r>
-              <a:rPr lang="en-US" dirty="0" smtClean="0">
+              <a:rPr lang="en-US" dirty="0">
                 <a:solidFill>
                   <a:schemeClr val="accent6"/>
                 </a:solidFill>
               </a:rPr>
               <a:t>e-beam confined and guided by strong solenoids</a:t>
             </a:r>
-            <a:endParaRPr lang="en-US" dirty="0">
-              <a:solidFill>
-                <a:schemeClr val="accent6"/>
-              </a:solidFill>
-            </a:endParaRPr>
           </a:p>
         </p:txBody>
       </p:sp>
@@ -4177,7 +3946,7 @@
               <a:defRPr/>
             </a:pPr>
             <a:r>
-              <a:rPr lang="en-US" smtClean="0"/>
+              <a:rPr lang="en-US"/>
               <a:t>17/05/2017</a:t>
             </a:r>
             <a:endParaRPr lang="en-US" dirty="0"/>
@@ -4203,7 +3972,7 @@
               <a:defRPr/>
             </a:pPr>
             <a:r>
-              <a:rPr lang="en-US" smtClean="0"/>
+              <a:rPr lang="en-US"/>
               <a:t>M. Fitterer | Hollow Electron Beam Collimation for HL-LHC - Effects on the Beam Core | IPAC’17</a:t>
             </a:r>
             <a:endParaRPr lang="en-US" b="1" dirty="0"/>
@@ -4667,18 +4436,13 @@
             <a:lstStyle/>
             <a:p>
               <a:r>
-                <a:rPr lang="en-US" smtClean="0">
+                <a:rPr lang="en-US">
                   <a:latin typeface="Calibri" charset="0"/>
                   <a:ea typeface="Calibri" charset="0"/>
                   <a:cs typeface="Calibri" charset="0"/>
                 </a:rPr>
                 <a:t>Courtesy of CERN EN-MME group</a:t>
               </a:r>
-              <a:endParaRPr lang="en-US">
-                <a:latin typeface="Calibri" charset="0"/>
-                <a:ea typeface="Calibri" charset="0"/>
-                <a:cs typeface="Calibri" charset="0"/>
-              </a:endParaRPr>
             </a:p>
           </p:txBody>
         </p:sp>
@@ -4701,13 +4465,6 @@
       <p:transition spd="slow" advTm="39496"/>
     </mc:Fallback>
   </mc:AlternateContent>
-  <p:timing>
-    <p:tnLst>
-      <p:par>
-        <p:cTn id="1" dur="indefinite" restart="never" nodeType="tmRoot"/>
-      </p:par>
-    </p:tnLst>
-  </p:timing>
 </p:sld>
 </file>
 
@@ -4730,6 +4487,28 @@
       </p:grpSpPr>
       <p:sp>
         <p:nvSpPr>
+          <p:cNvPr id="7" name="Title 6"/>
+          <p:cNvSpPr>
+            <a:spLocks noGrp="1"/>
+          </p:cNvSpPr>
+          <p:nvPr>
+            <p:ph type="title"/>
+          </p:nvPr>
+        </p:nvSpPr>
+        <p:spPr/>
+        <p:txBody>
+          <a:bodyPr/>
+          <a:lstStyle/>
+          <a:p>
+            <a:r>
+              <a:rPr lang="en-US" dirty="0"/>
+              <a:t>What is active halo control?</a:t>
+            </a:r>
+          </a:p>
+        </p:txBody>
+      </p:sp>
+      <p:sp>
+        <p:nvSpPr>
           <p:cNvPr id="4" name="Date Placeholder 3"/>
           <p:cNvSpPr>
             <a:spLocks noGrp="1"/>
@@ -4747,7 +4526,7 @@
               <a:defRPr/>
             </a:pPr>
             <a:r>
-              <a:rPr lang="en-US" smtClean="0"/>
+              <a:rPr lang="en-US"/>
               <a:t>17/05/2017</a:t>
             </a:r>
             <a:endParaRPr lang="en-US" dirty="0"/>
@@ -4773,7 +4552,7 @@
               <a:defRPr/>
             </a:pPr>
             <a:r>
-              <a:rPr lang="en-US" smtClean="0"/>
+              <a:rPr lang="en-US"/>
               <a:t>M. Fitterer | Hollow Electron Beam Collimation for HL-LHC - Effects on the Beam Core | IPAC’17</a:t>
             </a:r>
             <a:endParaRPr lang="en-US" b="1" dirty="0"/>
@@ -4811,175 +4590,1256 @@
       </p:sp>
       <p:grpSp>
         <p:nvGrpSpPr>
-          <p:cNvPr id="23" name="Group 22"/>
+          <p:cNvPr id="9" name="Group 8"/>
           <p:cNvGrpSpPr/>
           <p:nvPr/>
         </p:nvGrpSpPr>
         <p:grpSpPr>
           <a:xfrm>
-            <a:off x="3479800" y="1261674"/>
-            <a:ext cx="5212080" cy="4160210"/>
-            <a:chOff x="3479800" y="1261674"/>
-            <a:chExt cx="5212080" cy="4160210"/>
+            <a:off x="1992193" y="1137486"/>
+            <a:ext cx="7880647" cy="4027650"/>
+            <a:chOff x="468192" y="1137486"/>
+            <a:chExt cx="7880647" cy="4027650"/>
           </a:xfrm>
         </p:grpSpPr>
-        <p:pic>
-          <p:nvPicPr>
-            <p:cNvPr id="19" name="Picture 18"/>
-            <p:cNvPicPr>
-              <a:picLocks noChangeAspect="1"/>
-            </p:cNvPicPr>
+        <p:sp>
+          <p:nvSpPr>
+            <p:cNvPr id="59" name="Right Arrow 58"/>
+            <p:cNvSpPr/>
             <p:nvPr/>
-          </p:nvPicPr>
-          <p:blipFill>
-            <a:blip r:embed="rId3">
-              <a:extLst>
-                <a:ext uri="{28A0092B-C50C-407E-A947-70E740481C1C}">
-                  <a14:useLocalDpi xmlns:a14="http://schemas.microsoft.com/office/drawing/2010/main" val="0"/>
-                </a:ext>
-              </a:extLst>
-            </a:blip>
-            <a:stretch>
-              <a:fillRect/>
-            </a:stretch>
-          </p:blipFill>
+          </p:nvSpPr>
           <p:spPr>
             <a:xfrm>
-              <a:off x="3479800" y="1435100"/>
-              <a:ext cx="5212080" cy="3986784"/>
+              <a:off x="558854" y="3422894"/>
+              <a:ext cx="1894994" cy="1742242"/>
+            </a:xfrm>
+            <a:prstGeom prst="rightArrow">
+              <a:avLst>
+                <a:gd name="adj1" fmla="val 72672"/>
+                <a:gd name="adj2" fmla="val 34945"/>
+              </a:avLst>
+            </a:prstGeom>
+            <a:gradFill flip="none" rotWithShape="1">
+              <a:gsLst>
+                <a:gs pos="0">
+                  <a:srgbClr val="FF0000">
+                    <a:alpha val="0"/>
+                  </a:srgbClr>
+                </a:gs>
+                <a:gs pos="68000">
+                  <a:srgbClr val="FF0000">
+                    <a:alpha val="48000"/>
+                  </a:srgbClr>
+                </a:gs>
+                <a:gs pos="52000">
+                  <a:srgbClr val="FF0000"/>
+                </a:gs>
+                <a:gs pos="34000">
+                  <a:srgbClr val="FF0000">
+                    <a:alpha val="48000"/>
+                  </a:srgbClr>
+                </a:gs>
+                <a:gs pos="100000">
+                  <a:srgbClr val="FF0000">
+                    <a:alpha val="0"/>
+                  </a:srgbClr>
+                </a:gs>
+              </a:gsLst>
+              <a:lin ang="5400000" scaled="0"/>
+              <a:tileRect/>
+            </a:gradFill>
+            <a:ln>
+              <a:solidFill>
+                <a:schemeClr val="bg2">
+                  <a:alpha val="0"/>
+                </a:schemeClr>
+              </a:solidFill>
+            </a:ln>
+            <a:effectLst/>
+          </p:spPr>
+          <p:style>
+            <a:lnRef idx="1">
+              <a:schemeClr val="accent1"/>
+            </a:lnRef>
+            <a:fillRef idx="3">
+              <a:schemeClr val="accent1"/>
+            </a:fillRef>
+            <a:effectRef idx="2">
+              <a:schemeClr val="accent1"/>
+            </a:effectRef>
+            <a:fontRef idx="minor">
+              <a:schemeClr val="lt1"/>
+            </a:fontRef>
+          </p:style>
+          <p:txBody>
+            <a:bodyPr rtlCol="0" anchor="ctr"/>
+            <a:lstStyle/>
+            <a:p>
+              <a:pPr algn="ctr"/>
+              <a:endParaRPr lang="en-US"/>
+            </a:p>
+          </p:txBody>
+        </p:sp>
+        <p:cxnSp>
+          <p:nvCxnSpPr>
+            <p:cNvPr id="63" name="Straight Connector 62"/>
+            <p:cNvCxnSpPr/>
+            <p:nvPr/>
+          </p:nvCxnSpPr>
+          <p:spPr>
+            <a:xfrm flipV="1">
+              <a:off x="2534571" y="1142299"/>
+              <a:ext cx="9078" cy="3462604"/>
+            </a:xfrm>
+            <a:prstGeom prst="line">
+              <a:avLst/>
+            </a:prstGeom>
+            <a:ln>
+              <a:solidFill>
+                <a:schemeClr val="accent6">
+                  <a:lumMod val="50000"/>
+                </a:schemeClr>
+              </a:solidFill>
+              <a:prstDash val="sysDot"/>
+            </a:ln>
+            <a:effectLst/>
+          </p:spPr>
+          <p:style>
+            <a:lnRef idx="2">
+              <a:schemeClr val="accent1"/>
+            </a:lnRef>
+            <a:fillRef idx="0">
+              <a:schemeClr val="accent1"/>
+            </a:fillRef>
+            <a:effectRef idx="1">
+              <a:schemeClr val="accent1"/>
+            </a:effectRef>
+            <a:fontRef idx="minor">
+              <a:schemeClr val="tx1"/>
+            </a:fontRef>
+          </p:style>
+        </p:cxnSp>
+        <p:cxnSp>
+          <p:nvCxnSpPr>
+            <p:cNvPr id="66" name="Straight Connector 65"/>
+            <p:cNvCxnSpPr/>
+            <p:nvPr/>
+          </p:nvCxnSpPr>
+          <p:spPr>
+            <a:xfrm flipV="1">
+              <a:off x="6711530" y="1137486"/>
+              <a:ext cx="9078" cy="3462604"/>
+            </a:xfrm>
+            <a:prstGeom prst="line">
+              <a:avLst/>
+            </a:prstGeom>
+            <a:ln>
+              <a:solidFill>
+                <a:schemeClr val="accent6">
+                  <a:lumMod val="50000"/>
+                </a:schemeClr>
+              </a:solidFill>
+              <a:prstDash val="sysDot"/>
+            </a:ln>
+            <a:effectLst/>
+          </p:spPr>
+          <p:style>
+            <a:lnRef idx="2">
+              <a:schemeClr val="accent1"/>
+            </a:lnRef>
+            <a:fillRef idx="0">
+              <a:schemeClr val="accent1"/>
+            </a:fillRef>
+            <a:effectRef idx="1">
+              <a:schemeClr val="accent1"/>
+            </a:effectRef>
+            <a:fontRef idx="minor">
+              <a:schemeClr val="tx1"/>
+            </a:fontRef>
+          </p:style>
+        </p:cxnSp>
+        <p:sp>
+          <p:nvSpPr>
+            <p:cNvPr id="19" name="Rectangle 18"/>
+            <p:cNvSpPr/>
+            <p:nvPr/>
+          </p:nvSpPr>
+          <p:spPr>
+            <a:xfrm>
+              <a:off x="2956555" y="1966442"/>
+              <a:ext cx="330667" cy="1494017"/>
             </a:xfrm>
             <a:prstGeom prst="rect">
               <a:avLst/>
             </a:prstGeom>
+            <a:solidFill>
+              <a:schemeClr val="tx1">
+                <a:lumMod val="75000"/>
+                <a:lumOff val="25000"/>
+              </a:schemeClr>
+            </a:solidFill>
+            <a:ln>
+              <a:solidFill>
+                <a:schemeClr val="tx1">
+                  <a:lumMod val="75000"/>
+                  <a:lumOff val="25000"/>
+                </a:schemeClr>
+              </a:solidFill>
+            </a:ln>
+            <a:effectLst/>
           </p:spPr>
-        </p:pic>
-        <p:sp>
-          <p:nvSpPr>
-            <p:cNvPr id="27" name="Title 6"/>
-            <p:cNvSpPr txBox="1">
-              <a:spLocks/>
-            </p:cNvSpPr>
-            <p:nvPr/>
-          </p:nvSpPr>
-          <p:spPr>
-            <a:xfrm rot="16200000">
-              <a:off x="4873831" y="1822619"/>
-              <a:ext cx="1549768" cy="427877"/>
-            </a:xfrm>
-            <a:prstGeom prst="rect">
-              <a:avLst/>
-            </a:prstGeom>
-          </p:spPr>
+          <p:style>
+            <a:lnRef idx="1">
+              <a:schemeClr val="accent1"/>
+            </a:lnRef>
+            <a:fillRef idx="3">
+              <a:schemeClr val="accent1"/>
+            </a:fillRef>
+            <a:effectRef idx="2">
+              <a:schemeClr val="accent1"/>
+            </a:effectRef>
+            <a:fontRef idx="minor">
+              <a:schemeClr val="lt1"/>
+            </a:fontRef>
+          </p:style>
           <p:txBody>
-            <a:bodyPr vert="horz" lIns="0" tIns="0" rIns="0" bIns="0" rtlCol="0" anchor="b" anchorCtr="0">
-              <a:normAutofit/>
-            </a:bodyPr>
-            <a:lstStyle>
-              <a:lvl1pPr algn="l" defTabSz="914400" rtl="0" eaLnBrk="1" latinLnBrk="0" hangingPunct="1">
-                <a:lnSpc>
-                  <a:spcPct val="90000"/>
-                </a:lnSpc>
-                <a:spcBef>
-                  <a:spcPct val="0"/>
-                </a:spcBef>
-                <a:buNone/>
-                <a:defRPr sz="2800" kern="1200">
-                  <a:solidFill>
-                    <a:srgbClr val="004C97"/>
-                  </a:solidFill>
-                  <a:latin typeface="+mj-lt"/>
-                  <a:ea typeface="+mj-ea"/>
-                  <a:cs typeface="+mj-cs"/>
-                </a:defRPr>
-              </a:lvl1pPr>
-            </a:lstStyle>
+            <a:bodyPr rtlCol="0" anchor="ctr"/>
+            <a:lstStyle/>
             <a:p>
-              <a:r>
-                <a:rPr lang="en-US" sz="1400" dirty="0" smtClean="0">
-                  <a:solidFill>
-                    <a:schemeClr val="accent1">
-                      <a:lumMod val="75000"/>
-                    </a:schemeClr>
-                  </a:solidFill>
-                  <a:latin typeface="PT Sans" charset="-52"/>
-                  <a:ea typeface="PT Sans" charset="-52"/>
-                  <a:cs typeface="PT Sans" charset="-52"/>
-                </a:rPr>
-                <a:t>fast adjustment</a:t>
-              </a:r>
-              <a:endParaRPr lang="en-US" sz="1400" dirty="0">
-                <a:solidFill>
-                  <a:schemeClr val="accent1">
-                    <a:lumMod val="75000"/>
-                  </a:schemeClr>
-                </a:solidFill>
-                <a:latin typeface="PT Sans" charset="-52"/>
-                <a:ea typeface="PT Sans" charset="-52"/>
-                <a:cs typeface="PT Sans" charset="-52"/>
-              </a:endParaRPr>
+              <a:pPr algn="ctr"/>
+              <a:endParaRPr lang="en-US"/>
             </a:p>
           </p:txBody>
         </p:sp>
         <p:sp>
           <p:nvSpPr>
-            <p:cNvPr id="29" name="Title 6"/>
-            <p:cNvSpPr txBox="1">
-              <a:spLocks/>
-            </p:cNvSpPr>
+            <p:cNvPr id="20" name="Rectangle 19"/>
+            <p:cNvSpPr/>
             <p:nvPr/>
           </p:nvSpPr>
           <p:spPr>
-            <a:xfrm rot="16200000">
-              <a:off x="5580640" y="1933403"/>
-              <a:ext cx="1549768" cy="427877"/>
+            <a:xfrm>
+              <a:off x="3809079" y="1972846"/>
+              <a:ext cx="609713" cy="1217279"/>
             </a:xfrm>
             <a:prstGeom prst="rect">
               <a:avLst/>
             </a:prstGeom>
+            <a:solidFill>
+              <a:schemeClr val="tx1">
+                <a:lumMod val="50000"/>
+                <a:lumOff val="50000"/>
+              </a:schemeClr>
+            </a:solidFill>
+            <a:ln>
+              <a:solidFill>
+                <a:schemeClr val="tx1">
+                  <a:lumMod val="50000"/>
+                  <a:lumOff val="50000"/>
+                </a:schemeClr>
+              </a:solidFill>
+            </a:ln>
+            <a:effectLst/>
+          </p:spPr>
+          <p:style>
+            <a:lnRef idx="1">
+              <a:schemeClr val="accent1"/>
+            </a:lnRef>
+            <a:fillRef idx="3">
+              <a:schemeClr val="accent1"/>
+            </a:fillRef>
+            <a:effectRef idx="2">
+              <a:schemeClr val="accent1"/>
+            </a:effectRef>
+            <a:fontRef idx="minor">
+              <a:schemeClr val="lt1"/>
+            </a:fontRef>
+          </p:style>
+          <p:txBody>
+            <a:bodyPr rtlCol="0" anchor="ctr"/>
+            <a:lstStyle/>
+            <a:p>
+              <a:pPr algn="ctr"/>
+              <a:endParaRPr lang="en-US"/>
+            </a:p>
+          </p:txBody>
+        </p:sp>
+        <p:sp>
+          <p:nvSpPr>
+            <p:cNvPr id="21" name="Rectangle 20"/>
+            <p:cNvSpPr/>
+            <p:nvPr/>
+          </p:nvSpPr>
+          <p:spPr>
+            <a:xfrm>
+              <a:off x="4645719" y="1972846"/>
+              <a:ext cx="609713" cy="1217278"/>
+            </a:xfrm>
+            <a:prstGeom prst="rect">
+              <a:avLst/>
+            </a:prstGeom>
+            <a:solidFill>
+              <a:schemeClr val="tx1">
+                <a:lumMod val="50000"/>
+                <a:lumOff val="50000"/>
+              </a:schemeClr>
+            </a:solidFill>
+            <a:ln>
+              <a:solidFill>
+                <a:schemeClr val="tx1">
+                  <a:lumMod val="50000"/>
+                  <a:lumOff val="50000"/>
+                </a:schemeClr>
+              </a:solidFill>
+            </a:ln>
+            <a:effectLst/>
+          </p:spPr>
+          <p:style>
+            <a:lnRef idx="1">
+              <a:schemeClr val="accent1"/>
+            </a:lnRef>
+            <a:fillRef idx="3">
+              <a:schemeClr val="accent1"/>
+            </a:fillRef>
+            <a:effectRef idx="2">
+              <a:schemeClr val="accent1"/>
+            </a:effectRef>
+            <a:fontRef idx="minor">
+              <a:schemeClr val="lt1"/>
+            </a:fontRef>
+          </p:style>
+          <p:txBody>
+            <a:bodyPr rtlCol="0" anchor="ctr"/>
+            <a:lstStyle/>
+            <a:p>
+              <a:pPr algn="ctr"/>
+              <a:endParaRPr lang="en-US"/>
+            </a:p>
+          </p:txBody>
+        </p:sp>
+        <p:sp>
+          <p:nvSpPr>
+            <p:cNvPr id="22" name="Rectangle 21"/>
+            <p:cNvSpPr/>
+            <p:nvPr/>
+          </p:nvSpPr>
+          <p:spPr>
+            <a:xfrm>
+              <a:off x="5784951" y="1972493"/>
+              <a:ext cx="588372" cy="565449"/>
+            </a:xfrm>
+            <a:prstGeom prst="rect">
+              <a:avLst/>
+            </a:prstGeom>
+            <a:solidFill>
+              <a:schemeClr val="bg2"/>
+            </a:solidFill>
+            <a:ln>
+              <a:solidFill>
+                <a:schemeClr val="bg2"/>
+              </a:solidFill>
+            </a:ln>
+            <a:effectLst/>
+          </p:spPr>
+          <p:style>
+            <a:lnRef idx="1">
+              <a:schemeClr val="accent1"/>
+            </a:lnRef>
+            <a:fillRef idx="3">
+              <a:schemeClr val="accent1"/>
+            </a:fillRef>
+            <a:effectRef idx="2">
+              <a:schemeClr val="accent1"/>
+            </a:effectRef>
+            <a:fontRef idx="minor">
+              <a:schemeClr val="lt1"/>
+            </a:fontRef>
+          </p:style>
+          <p:txBody>
+            <a:bodyPr rtlCol="0" anchor="ctr"/>
+            <a:lstStyle/>
+            <a:p>
+              <a:pPr algn="ctr"/>
+              <a:endParaRPr lang="en-US"/>
+            </a:p>
+          </p:txBody>
+        </p:sp>
+        <p:sp>
+          <p:nvSpPr>
+            <p:cNvPr id="3" name="Rectangle 2"/>
+            <p:cNvSpPr/>
+            <p:nvPr/>
+          </p:nvSpPr>
+          <p:spPr>
+            <a:xfrm>
+              <a:off x="932641" y="1897862"/>
+              <a:ext cx="1600291" cy="68580"/>
+            </a:xfrm>
+            <a:prstGeom prst="rect">
+              <a:avLst/>
+            </a:prstGeom>
+            <a:solidFill>
+              <a:srgbClr val="0070C0"/>
+            </a:solidFill>
+            <a:ln>
+              <a:solidFill>
+                <a:srgbClr val="0070C0"/>
+              </a:solidFill>
+            </a:ln>
+            <a:effectLst/>
+          </p:spPr>
+          <p:style>
+            <a:lnRef idx="1">
+              <a:schemeClr val="accent1"/>
+            </a:lnRef>
+            <a:fillRef idx="3">
+              <a:schemeClr val="accent1"/>
+            </a:fillRef>
+            <a:effectRef idx="2">
+              <a:schemeClr val="accent1"/>
+            </a:effectRef>
+            <a:fontRef idx="minor">
+              <a:schemeClr val="lt1"/>
+            </a:fontRef>
+          </p:style>
+          <p:txBody>
+            <a:bodyPr rtlCol="0" anchor="ctr"/>
+            <a:lstStyle/>
+            <a:p>
+              <a:pPr algn="ctr"/>
+              <a:endParaRPr lang="en-US"/>
+            </a:p>
+          </p:txBody>
+        </p:sp>
+        <p:sp>
+          <p:nvSpPr>
+            <p:cNvPr id="17" name="Rectangle 16"/>
+            <p:cNvSpPr/>
+            <p:nvPr/>
+          </p:nvSpPr>
+          <p:spPr>
+            <a:xfrm>
+              <a:off x="2532932" y="1897862"/>
+              <a:ext cx="4168853" cy="68580"/>
+            </a:xfrm>
+            <a:prstGeom prst="rect">
+              <a:avLst/>
+            </a:prstGeom>
+            <a:solidFill>
+              <a:srgbClr val="FF0000"/>
+            </a:solidFill>
+            <a:ln>
+              <a:solidFill>
+                <a:srgbClr val="FF0000"/>
+              </a:solidFill>
+            </a:ln>
+            <a:effectLst/>
+          </p:spPr>
+          <p:style>
+            <a:lnRef idx="1">
+              <a:schemeClr val="accent1"/>
+            </a:lnRef>
+            <a:fillRef idx="3">
+              <a:schemeClr val="accent1"/>
+            </a:fillRef>
+            <a:effectRef idx="2">
+              <a:schemeClr val="accent1"/>
+            </a:effectRef>
+            <a:fontRef idx="minor">
+              <a:schemeClr val="lt1"/>
+            </a:fontRef>
+          </p:style>
+          <p:txBody>
+            <a:bodyPr rtlCol="0" anchor="ctr"/>
+            <a:lstStyle/>
+            <a:p>
+              <a:pPr algn="ctr"/>
+              <a:endParaRPr lang="en-US"/>
+            </a:p>
+          </p:txBody>
+        </p:sp>
+        <p:sp>
+          <p:nvSpPr>
+            <p:cNvPr id="18" name="Rectangle 17"/>
+            <p:cNvSpPr/>
+            <p:nvPr/>
+          </p:nvSpPr>
+          <p:spPr>
+            <a:xfrm>
+              <a:off x="6713215" y="1897862"/>
+              <a:ext cx="1600291" cy="68580"/>
+            </a:xfrm>
+            <a:prstGeom prst="rect">
+              <a:avLst/>
+            </a:prstGeom>
+            <a:solidFill>
+              <a:srgbClr val="0070C0"/>
+            </a:solidFill>
+            <a:ln>
+              <a:solidFill>
+                <a:srgbClr val="0070C0"/>
+              </a:solidFill>
+            </a:ln>
+            <a:effectLst/>
+          </p:spPr>
+          <p:style>
+            <a:lnRef idx="1">
+              <a:schemeClr val="accent1"/>
+            </a:lnRef>
+            <a:fillRef idx="3">
+              <a:schemeClr val="accent1"/>
+            </a:fillRef>
+            <a:effectRef idx="2">
+              <a:schemeClr val="accent1"/>
+            </a:effectRef>
+            <a:fontRef idx="minor">
+              <a:schemeClr val="lt1"/>
+            </a:fontRef>
+          </p:style>
+          <p:txBody>
+            <a:bodyPr rtlCol="0" anchor="ctr"/>
+            <a:lstStyle/>
+            <a:p>
+              <a:pPr algn="ctr"/>
+              <a:endParaRPr lang="en-US"/>
+            </a:p>
+          </p:txBody>
+        </p:sp>
+        <p:cxnSp>
+          <p:nvCxnSpPr>
+            <p:cNvPr id="10" name="Straight Arrow Connector 9"/>
+            <p:cNvCxnSpPr/>
+            <p:nvPr/>
+          </p:nvCxnSpPr>
+          <p:spPr>
+            <a:xfrm flipV="1">
+              <a:off x="3378662" y="2755112"/>
+              <a:ext cx="342900" cy="435012"/>
+            </a:xfrm>
+            <a:prstGeom prst="straightConnector1">
+              <a:avLst/>
+            </a:prstGeom>
+            <a:ln>
+              <a:solidFill>
+                <a:srgbClr val="00B050"/>
+              </a:solidFill>
+              <a:tailEnd type="triangle"/>
+            </a:ln>
+            <a:effectLst/>
+          </p:spPr>
+          <p:style>
+            <a:lnRef idx="2">
+              <a:schemeClr val="accent1"/>
+            </a:lnRef>
+            <a:fillRef idx="0">
+              <a:schemeClr val="accent1"/>
+            </a:fillRef>
+            <a:effectRef idx="1">
+              <a:schemeClr val="accent1"/>
+            </a:effectRef>
+            <a:fontRef idx="minor">
+              <a:schemeClr val="tx1"/>
+            </a:fontRef>
+          </p:style>
+        </p:cxnSp>
+        <p:cxnSp>
+          <p:nvCxnSpPr>
+            <p:cNvPr id="23" name="Straight Arrow Connector 22"/>
+            <p:cNvCxnSpPr/>
+            <p:nvPr/>
+          </p:nvCxnSpPr>
+          <p:spPr>
+            <a:xfrm flipV="1">
+              <a:off x="3367945" y="2972618"/>
+              <a:ext cx="427075" cy="265183"/>
+            </a:xfrm>
+            <a:prstGeom prst="straightConnector1">
+              <a:avLst/>
+            </a:prstGeom>
+            <a:ln>
+              <a:solidFill>
+                <a:srgbClr val="00B050"/>
+              </a:solidFill>
+              <a:tailEnd type="triangle"/>
+            </a:ln>
+            <a:effectLst/>
+          </p:spPr>
+          <p:style>
+            <a:lnRef idx="2">
+              <a:schemeClr val="accent1"/>
+            </a:lnRef>
+            <a:fillRef idx="0">
+              <a:schemeClr val="accent1"/>
+            </a:fillRef>
+            <a:effectRef idx="1">
+              <a:schemeClr val="accent1"/>
+            </a:effectRef>
+            <a:fontRef idx="minor">
+              <a:schemeClr val="tx1"/>
+            </a:fontRef>
+          </p:style>
+        </p:cxnSp>
+        <p:cxnSp>
+          <p:nvCxnSpPr>
+            <p:cNvPr id="25" name="Straight Arrow Connector 24"/>
+            <p:cNvCxnSpPr/>
+            <p:nvPr/>
+          </p:nvCxnSpPr>
+          <p:spPr>
+            <a:xfrm flipV="1">
+              <a:off x="3325858" y="3178022"/>
+              <a:ext cx="384987" cy="168533"/>
+            </a:xfrm>
+            <a:prstGeom prst="straightConnector1">
+              <a:avLst/>
+            </a:prstGeom>
+            <a:ln>
+              <a:solidFill>
+                <a:srgbClr val="00B050"/>
+              </a:solidFill>
+              <a:tailEnd type="triangle"/>
+            </a:ln>
+            <a:effectLst/>
+          </p:spPr>
+          <p:style>
+            <a:lnRef idx="2">
+              <a:schemeClr val="accent1"/>
+            </a:lnRef>
+            <a:fillRef idx="0">
+              <a:schemeClr val="accent1"/>
+            </a:fillRef>
+            <a:effectRef idx="1">
+              <a:schemeClr val="accent1"/>
+            </a:effectRef>
+            <a:fontRef idx="minor">
+              <a:schemeClr val="tx1"/>
+            </a:fontRef>
+          </p:style>
+        </p:cxnSp>
+        <p:cxnSp>
+          <p:nvCxnSpPr>
+            <p:cNvPr id="27" name="Straight Arrow Connector 26"/>
+            <p:cNvCxnSpPr/>
+            <p:nvPr/>
+          </p:nvCxnSpPr>
+          <p:spPr>
+            <a:xfrm flipV="1">
+              <a:off x="4994744" y="2069000"/>
+              <a:ext cx="342900" cy="435012"/>
+            </a:xfrm>
+            <a:prstGeom prst="straightConnector1">
+              <a:avLst/>
+            </a:prstGeom>
+            <a:ln>
+              <a:solidFill>
+                <a:srgbClr val="00B050"/>
+              </a:solidFill>
+              <a:tailEnd type="triangle"/>
+            </a:ln>
+            <a:effectLst/>
+          </p:spPr>
+          <p:style>
+            <a:lnRef idx="2">
+              <a:schemeClr val="accent1"/>
+            </a:lnRef>
+            <a:fillRef idx="0">
+              <a:schemeClr val="accent1"/>
+            </a:fillRef>
+            <a:effectRef idx="1">
+              <a:schemeClr val="accent1"/>
+            </a:effectRef>
+            <a:fontRef idx="minor">
+              <a:schemeClr val="tx1"/>
+            </a:fontRef>
+          </p:style>
+        </p:cxnSp>
+        <p:cxnSp>
+          <p:nvCxnSpPr>
+            <p:cNvPr id="28" name="Straight Arrow Connector 27"/>
+            <p:cNvCxnSpPr/>
+            <p:nvPr/>
+          </p:nvCxnSpPr>
+          <p:spPr>
+            <a:xfrm flipV="1">
+              <a:off x="4984027" y="2286506"/>
+              <a:ext cx="427075" cy="265183"/>
+            </a:xfrm>
+            <a:prstGeom prst="straightConnector1">
+              <a:avLst/>
+            </a:prstGeom>
+            <a:ln>
+              <a:solidFill>
+                <a:srgbClr val="00B050"/>
+              </a:solidFill>
+              <a:tailEnd type="triangle"/>
+            </a:ln>
+            <a:effectLst/>
+          </p:spPr>
+          <p:style>
+            <a:lnRef idx="2">
+              <a:schemeClr val="accent1"/>
+            </a:lnRef>
+            <a:fillRef idx="0">
+              <a:schemeClr val="accent1"/>
+            </a:fillRef>
+            <a:effectRef idx="1">
+              <a:schemeClr val="accent1"/>
+            </a:effectRef>
+            <a:fontRef idx="minor">
+              <a:schemeClr val="tx1"/>
+            </a:fontRef>
+          </p:style>
+        </p:cxnSp>
+        <p:cxnSp>
+          <p:nvCxnSpPr>
+            <p:cNvPr id="29" name="Straight Arrow Connector 28"/>
+            <p:cNvCxnSpPr/>
+            <p:nvPr/>
+          </p:nvCxnSpPr>
+          <p:spPr>
+            <a:xfrm flipV="1">
+              <a:off x="4941940" y="2491910"/>
+              <a:ext cx="384987" cy="168533"/>
+            </a:xfrm>
+            <a:prstGeom prst="straightConnector1">
+              <a:avLst/>
+            </a:prstGeom>
+            <a:ln>
+              <a:solidFill>
+                <a:srgbClr val="00B050"/>
+              </a:solidFill>
+              <a:tailEnd type="triangle"/>
+            </a:ln>
+            <a:effectLst/>
+          </p:spPr>
+          <p:style>
+            <a:lnRef idx="2">
+              <a:schemeClr val="accent1"/>
+            </a:lnRef>
+            <a:fillRef idx="0">
+              <a:schemeClr val="accent1"/>
+            </a:fillRef>
+            <a:effectRef idx="1">
+              <a:schemeClr val="accent1"/>
+            </a:effectRef>
+            <a:fontRef idx="minor">
+              <a:schemeClr val="tx1"/>
+            </a:fontRef>
+          </p:style>
+        </p:cxnSp>
+        <p:cxnSp>
+          <p:nvCxnSpPr>
+            <p:cNvPr id="30" name="Straight Arrow Connector 29"/>
+            <p:cNvCxnSpPr/>
+            <p:nvPr/>
+          </p:nvCxnSpPr>
+          <p:spPr>
+            <a:xfrm flipV="1">
+              <a:off x="5375485" y="2267398"/>
+              <a:ext cx="342900" cy="435012"/>
+            </a:xfrm>
+            <a:prstGeom prst="straightConnector1">
+              <a:avLst/>
+            </a:prstGeom>
+            <a:ln>
+              <a:solidFill>
+                <a:srgbClr val="00B050"/>
+              </a:solidFill>
+              <a:tailEnd type="triangle"/>
+            </a:ln>
+            <a:effectLst/>
+          </p:spPr>
+          <p:style>
+            <a:lnRef idx="2">
+              <a:schemeClr val="accent1"/>
+            </a:lnRef>
+            <a:fillRef idx="0">
+              <a:schemeClr val="accent1"/>
+            </a:fillRef>
+            <a:effectRef idx="1">
+              <a:schemeClr val="accent1"/>
+            </a:effectRef>
+            <a:fontRef idx="minor">
+              <a:schemeClr val="tx1"/>
+            </a:fontRef>
+          </p:style>
+        </p:cxnSp>
+        <p:cxnSp>
+          <p:nvCxnSpPr>
+            <p:cNvPr id="31" name="Straight Arrow Connector 30"/>
+            <p:cNvCxnSpPr/>
+            <p:nvPr/>
+          </p:nvCxnSpPr>
+          <p:spPr>
+            <a:xfrm flipV="1">
+              <a:off x="5364768" y="2484904"/>
+              <a:ext cx="427075" cy="265183"/>
+            </a:xfrm>
+            <a:prstGeom prst="straightConnector1">
+              <a:avLst/>
+            </a:prstGeom>
+            <a:ln>
+              <a:solidFill>
+                <a:srgbClr val="00B050"/>
+              </a:solidFill>
+              <a:tailEnd type="triangle"/>
+            </a:ln>
+            <a:effectLst/>
+          </p:spPr>
+          <p:style>
+            <a:lnRef idx="2">
+              <a:schemeClr val="accent1"/>
+            </a:lnRef>
+            <a:fillRef idx="0">
+              <a:schemeClr val="accent1"/>
+            </a:fillRef>
+            <a:effectRef idx="1">
+              <a:schemeClr val="accent1"/>
+            </a:effectRef>
+            <a:fontRef idx="minor">
+              <a:schemeClr val="tx1"/>
+            </a:fontRef>
+          </p:style>
+        </p:cxnSp>
+        <p:cxnSp>
+          <p:nvCxnSpPr>
+            <p:cNvPr id="32" name="Straight Arrow Connector 31"/>
+            <p:cNvCxnSpPr/>
+            <p:nvPr/>
+          </p:nvCxnSpPr>
+          <p:spPr>
+            <a:xfrm flipV="1">
+              <a:off x="5322681" y="2690308"/>
+              <a:ext cx="384987" cy="168533"/>
+            </a:xfrm>
+            <a:prstGeom prst="straightConnector1">
+              <a:avLst/>
+            </a:prstGeom>
+            <a:ln>
+              <a:solidFill>
+                <a:srgbClr val="00B050"/>
+              </a:solidFill>
+              <a:tailEnd type="triangle"/>
+            </a:ln>
+            <a:effectLst/>
+          </p:spPr>
+          <p:style>
+            <a:lnRef idx="2">
+              <a:schemeClr val="accent1"/>
+            </a:lnRef>
+            <a:fillRef idx="0">
+              <a:schemeClr val="accent1"/>
+            </a:fillRef>
+            <a:effectRef idx="1">
+              <a:schemeClr val="accent1"/>
+            </a:effectRef>
+            <a:fontRef idx="minor">
+              <a:schemeClr val="tx1"/>
+            </a:fontRef>
+          </p:style>
+        </p:cxnSp>
+        <p:cxnSp>
+          <p:nvCxnSpPr>
+            <p:cNvPr id="33" name="Straight Arrow Connector 32"/>
+            <p:cNvCxnSpPr/>
+            <p:nvPr/>
+          </p:nvCxnSpPr>
+          <p:spPr>
+            <a:xfrm flipV="1">
+              <a:off x="3335338" y="3262288"/>
+              <a:ext cx="717726" cy="208891"/>
+            </a:xfrm>
+            <a:prstGeom prst="straightConnector1">
+              <a:avLst/>
+            </a:prstGeom>
+            <a:ln>
+              <a:solidFill>
+                <a:srgbClr val="7030A0"/>
+              </a:solidFill>
+              <a:tailEnd type="stealth" w="lg" len="lg"/>
+            </a:ln>
+            <a:effectLst/>
+          </p:spPr>
+          <p:style>
+            <a:lnRef idx="2">
+              <a:schemeClr val="accent1"/>
+            </a:lnRef>
+            <a:fillRef idx="0">
+              <a:schemeClr val="accent1"/>
+            </a:fillRef>
+            <a:effectRef idx="1">
+              <a:schemeClr val="accent1"/>
+            </a:effectRef>
+            <a:fontRef idx="minor">
+              <a:schemeClr val="tx1"/>
+            </a:fontRef>
+          </p:style>
+        </p:cxnSp>
+        <p:cxnSp>
+          <p:nvCxnSpPr>
+            <p:cNvPr id="35" name="Straight Arrow Connector 34"/>
+            <p:cNvCxnSpPr/>
+            <p:nvPr/>
+          </p:nvCxnSpPr>
+          <p:spPr>
+            <a:xfrm flipV="1">
+              <a:off x="3355038" y="3252055"/>
+              <a:ext cx="1386225" cy="204978"/>
+            </a:xfrm>
+            <a:prstGeom prst="straightConnector1">
+              <a:avLst/>
+            </a:prstGeom>
+            <a:ln>
+              <a:solidFill>
+                <a:srgbClr val="7030A0"/>
+              </a:solidFill>
+              <a:tailEnd type="stealth" w="lg" len="lg"/>
+            </a:ln>
+            <a:effectLst/>
+          </p:spPr>
+          <p:style>
+            <a:lnRef idx="2">
+              <a:schemeClr val="accent1"/>
+            </a:lnRef>
+            <a:fillRef idx="0">
+              <a:schemeClr val="accent1"/>
+            </a:fillRef>
+            <a:effectRef idx="1">
+              <a:schemeClr val="accent1"/>
+            </a:effectRef>
+            <a:fontRef idx="minor">
+              <a:schemeClr val="tx1"/>
+            </a:fontRef>
+          </p:style>
+        </p:cxnSp>
+        <p:cxnSp>
+          <p:nvCxnSpPr>
+            <p:cNvPr id="37" name="Straight Arrow Connector 36"/>
+            <p:cNvCxnSpPr/>
+            <p:nvPr/>
+          </p:nvCxnSpPr>
+          <p:spPr>
+            <a:xfrm flipV="1">
+              <a:off x="3355038" y="3383105"/>
+              <a:ext cx="2223267" cy="80789"/>
+            </a:xfrm>
+            <a:prstGeom prst="straightConnector1">
+              <a:avLst/>
+            </a:prstGeom>
+            <a:ln>
+              <a:solidFill>
+                <a:srgbClr val="7030A0"/>
+              </a:solidFill>
+              <a:tailEnd type="stealth" w="lg" len="lg"/>
+            </a:ln>
+            <a:effectLst/>
+          </p:spPr>
+          <p:style>
+            <a:lnRef idx="2">
+              <a:schemeClr val="accent1"/>
+            </a:lnRef>
+            <a:fillRef idx="0">
+              <a:schemeClr val="accent1"/>
+            </a:fillRef>
+            <a:effectRef idx="1">
+              <a:schemeClr val="accent1"/>
+            </a:effectRef>
+            <a:fontRef idx="minor">
+              <a:schemeClr val="tx1"/>
+            </a:fontRef>
+          </p:style>
+        </p:cxnSp>
+        <p:cxnSp>
+          <p:nvCxnSpPr>
+            <p:cNvPr id="39" name="Straight Arrow Connector 38"/>
+            <p:cNvCxnSpPr/>
+            <p:nvPr/>
+          </p:nvCxnSpPr>
+          <p:spPr>
+            <a:xfrm flipV="1">
+              <a:off x="5315703" y="2743346"/>
+              <a:ext cx="1697699" cy="358681"/>
+            </a:xfrm>
+            <a:prstGeom prst="straightConnector1">
+              <a:avLst/>
+            </a:prstGeom>
+            <a:ln>
+              <a:solidFill>
+                <a:srgbClr val="7030A0"/>
+              </a:solidFill>
+              <a:tailEnd type="stealth" w="lg" len="lg"/>
+            </a:ln>
+            <a:effectLst/>
+          </p:spPr>
+          <p:style>
+            <a:lnRef idx="2">
+              <a:schemeClr val="accent1"/>
+            </a:lnRef>
+            <a:fillRef idx="0">
+              <a:schemeClr val="accent1"/>
+            </a:fillRef>
+            <a:effectRef idx="1">
+              <a:schemeClr val="accent1"/>
+            </a:effectRef>
+            <a:fontRef idx="minor">
+              <a:schemeClr val="tx1"/>
+            </a:fontRef>
+          </p:style>
+        </p:cxnSp>
+        <p:cxnSp>
+          <p:nvCxnSpPr>
+            <p:cNvPr id="41" name="Straight Arrow Connector 40"/>
+            <p:cNvCxnSpPr/>
+            <p:nvPr/>
+          </p:nvCxnSpPr>
+          <p:spPr>
+            <a:xfrm flipV="1">
+              <a:off x="5335160" y="2767530"/>
+              <a:ext cx="2200465" cy="330062"/>
+            </a:xfrm>
+            <a:prstGeom prst="straightConnector1">
+              <a:avLst/>
+            </a:prstGeom>
+            <a:ln>
+              <a:solidFill>
+                <a:srgbClr val="7030A0"/>
+              </a:solidFill>
+              <a:tailEnd type="stealth" w="lg" len="lg"/>
+            </a:ln>
+            <a:effectLst/>
+          </p:spPr>
+          <p:style>
+            <a:lnRef idx="2">
+              <a:schemeClr val="accent1"/>
+            </a:lnRef>
+            <a:fillRef idx="0">
+              <a:schemeClr val="accent1"/>
+            </a:fillRef>
+            <a:effectRef idx="1">
+              <a:schemeClr val="accent1"/>
+            </a:effectRef>
+            <a:fontRef idx="minor">
+              <a:schemeClr val="tx1"/>
+            </a:fontRef>
+          </p:style>
+        </p:cxnSp>
+        <p:sp>
+          <p:nvSpPr>
+            <p:cNvPr id="43" name="TextBox 42"/>
+            <p:cNvSpPr txBox="1"/>
+            <p:nvPr/>
+          </p:nvSpPr>
+          <p:spPr>
+            <a:xfrm>
+              <a:off x="2570392" y="1142299"/>
+              <a:ext cx="1306769" cy="707886"/>
+            </a:xfrm>
+            <a:prstGeom prst="rect">
+              <a:avLst/>
+            </a:prstGeom>
+            <a:noFill/>
           </p:spPr>
           <p:txBody>
-            <a:bodyPr vert="horz" lIns="0" tIns="0" rIns="0" bIns="0" rtlCol="0" anchor="b" anchorCtr="0">
-              <a:normAutofit/>
+            <a:bodyPr wrap="none" rtlCol="0">
+              <a:spAutoFit/>
             </a:bodyPr>
-            <a:lstStyle>
-              <a:lvl1pPr algn="l" defTabSz="914400" rtl="0" eaLnBrk="1" latinLnBrk="0" hangingPunct="1">
-                <a:lnSpc>
-                  <a:spcPct val="90000"/>
-                </a:lnSpc>
-                <a:spcBef>
-                  <a:spcPct val="0"/>
-                </a:spcBef>
-                <a:buNone/>
-                <a:defRPr sz="2800" kern="1200">
+            <a:lstStyle/>
+            <a:p>
+              <a:pPr algn="ctr"/>
+              <a:r>
+                <a:rPr lang="en-US" sz="2000" b="1" dirty="0">
                   <a:solidFill>
-                    <a:srgbClr val="004C97"/>
+                    <a:srgbClr val="FF0000"/>
                   </a:solidFill>
-                  <a:latin typeface="+mj-lt"/>
-                  <a:ea typeface="+mj-ea"/>
-                  <a:cs typeface="+mj-cs"/>
-                </a:defRPr>
-              </a:lvl1pPr>
-            </a:lstStyle>
+                  <a:latin typeface="Times New Roman" panose="02020603050405020304" pitchFamily="18" charset="0"/>
+                  <a:cs typeface="Times New Roman" panose="02020603050405020304" pitchFamily="18" charset="0"/>
+                </a:rPr>
+                <a:t>primary</a:t>
+              </a:r>
+            </a:p>
             <a:p>
+              <a:pPr algn="ctr"/>
               <a:r>
-                <a:rPr lang="en-US" sz="1400" dirty="0" smtClean="0">
+                <a:rPr lang="en-US" sz="2000" b="1" dirty="0">
                   <a:solidFill>
-                    <a:schemeClr val="tx1"/>
+                    <a:srgbClr val="FF0000"/>
                   </a:solidFill>
-                  <a:latin typeface="PT Sans" charset="-52"/>
-                  <a:ea typeface="PT Sans" charset="-52"/>
-                  <a:cs typeface="PT Sans" charset="-52"/>
+                  <a:latin typeface="Times New Roman" panose="02020603050405020304" pitchFamily="18" charset="0"/>
+                  <a:cs typeface="Times New Roman" panose="02020603050405020304" pitchFamily="18" charset="0"/>
                 </a:rPr>
-                <a:t>equilibrium state</a:t>
+                <a:t>collimator</a:t>
               </a:r>
-              <a:endParaRPr lang="en-US" sz="1400" dirty="0">
-                <a:solidFill>
-                  <a:schemeClr val="tx1"/>
-                </a:solidFill>
-                <a:latin typeface="PT Sans" charset="-52"/>
-                <a:ea typeface="PT Sans" charset="-52"/>
-                <a:cs typeface="PT Sans" charset="-52"/>
-              </a:endParaRPr>
+            </a:p>
+          </p:txBody>
+        </p:sp>
+        <p:sp>
+          <p:nvSpPr>
+            <p:cNvPr id="44" name="TextBox 43"/>
+            <p:cNvSpPr txBox="1"/>
+            <p:nvPr/>
+          </p:nvSpPr>
+          <p:spPr>
+            <a:xfrm>
+              <a:off x="3885587" y="1145771"/>
+              <a:ext cx="1306768" cy="707886"/>
+            </a:xfrm>
+            <a:prstGeom prst="rect">
+              <a:avLst/>
+            </a:prstGeom>
+            <a:noFill/>
+          </p:spPr>
+          <p:txBody>
+            <a:bodyPr wrap="none" rtlCol="0">
+              <a:spAutoFit/>
+            </a:bodyPr>
+            <a:lstStyle/>
+            <a:p>
+              <a:pPr algn="ctr"/>
+              <a:r>
+                <a:rPr lang="en-US" sz="2000" b="1" dirty="0">
+                  <a:solidFill>
+                    <a:srgbClr val="00B050"/>
+                  </a:solidFill>
+                  <a:latin typeface="Times New Roman" panose="02020603050405020304" pitchFamily="18" charset="0"/>
+                  <a:cs typeface="Times New Roman" panose="02020603050405020304" pitchFamily="18" charset="0"/>
+                </a:rPr>
+                <a:t>secondary</a:t>
+              </a:r>
+            </a:p>
+            <a:p>
+              <a:pPr algn="ctr"/>
+              <a:r>
+                <a:rPr lang="en-US" sz="2000" b="1" dirty="0">
+                  <a:solidFill>
+                    <a:srgbClr val="00B050"/>
+                  </a:solidFill>
+                  <a:latin typeface="Times New Roman" panose="02020603050405020304" pitchFamily="18" charset="0"/>
+                  <a:cs typeface="Times New Roman" panose="02020603050405020304" pitchFamily="18" charset="0"/>
+                </a:rPr>
+                <a:t>collimator</a:t>
+              </a:r>
+            </a:p>
+          </p:txBody>
+        </p:sp>
+        <p:sp>
+          <p:nvSpPr>
+            <p:cNvPr id="45" name="TextBox 44"/>
+            <p:cNvSpPr txBox="1"/>
+            <p:nvPr/>
+          </p:nvSpPr>
+          <p:spPr>
+            <a:xfrm>
+              <a:off x="5473486" y="1149040"/>
+              <a:ext cx="1266693" cy="707886"/>
+            </a:xfrm>
+            <a:prstGeom prst="rect">
+              <a:avLst/>
+            </a:prstGeom>
+            <a:noFill/>
+          </p:spPr>
+          <p:txBody>
+            <a:bodyPr wrap="none" rtlCol="0">
+              <a:spAutoFit/>
+            </a:bodyPr>
+            <a:lstStyle/>
+            <a:p>
+              <a:pPr algn="ctr"/>
+              <a:r>
+                <a:rPr lang="en-US" sz="2000" b="1" dirty="0">
+                  <a:solidFill>
+                    <a:srgbClr val="0070C0"/>
+                  </a:solidFill>
+                  <a:latin typeface="Times New Roman" panose="02020603050405020304" pitchFamily="18" charset="0"/>
+                  <a:cs typeface="Times New Roman" panose="02020603050405020304" pitchFamily="18" charset="0"/>
+                </a:rPr>
+                <a:t>shower</a:t>
+              </a:r>
+            </a:p>
+            <a:p>
+              <a:pPr algn="ctr"/>
+              <a:r>
+                <a:rPr lang="en-US" sz="2000" b="1" dirty="0">
+                  <a:solidFill>
+                    <a:srgbClr val="0070C0"/>
+                  </a:solidFill>
+                  <a:latin typeface="Times New Roman" panose="02020603050405020304" pitchFamily="18" charset="0"/>
+                  <a:cs typeface="Times New Roman" panose="02020603050405020304" pitchFamily="18" charset="0"/>
+                </a:rPr>
+                <a:t>absorbers</a:t>
+              </a:r>
+            </a:p>
+          </p:txBody>
+        </p:sp>
+        <p:cxnSp>
+          <p:nvCxnSpPr>
+            <p:cNvPr id="61" name="Straight Connector 60"/>
+            <p:cNvCxnSpPr/>
+            <p:nvPr/>
+          </p:nvCxnSpPr>
+          <p:spPr>
+            <a:xfrm>
+              <a:off x="987871" y="4284933"/>
+              <a:ext cx="7360968" cy="9124"/>
+            </a:xfrm>
+            <a:prstGeom prst="line">
+              <a:avLst/>
+            </a:prstGeom>
+            <a:ln w="28575">
+              <a:solidFill>
+                <a:srgbClr val="FF0000"/>
+              </a:solidFill>
+              <a:prstDash val="sysDot"/>
+            </a:ln>
+            <a:effectLst/>
+          </p:spPr>
+          <p:style>
+            <a:lnRef idx="2">
+              <a:schemeClr val="accent1"/>
+            </a:lnRef>
+            <a:fillRef idx="0">
+              <a:schemeClr val="accent1"/>
+            </a:fillRef>
+            <a:effectRef idx="1">
+              <a:schemeClr val="accent1"/>
+            </a:effectRef>
+            <a:fontRef idx="minor">
+              <a:schemeClr val="tx1"/>
+            </a:fontRef>
+          </p:style>
+        </p:cxnSp>
+        <p:sp>
+          <p:nvSpPr>
+            <p:cNvPr id="58" name="TextBox 57"/>
+            <p:cNvSpPr txBox="1"/>
+            <p:nvPr/>
+          </p:nvSpPr>
+          <p:spPr>
+            <a:xfrm>
+              <a:off x="468192" y="4058780"/>
+              <a:ext cx="2012379" cy="384721"/>
+            </a:xfrm>
+            <a:prstGeom prst="rect">
+              <a:avLst/>
+            </a:prstGeom>
+            <a:noFill/>
+          </p:spPr>
+          <p:txBody>
+            <a:bodyPr wrap="square" rtlCol="0">
+              <a:spAutoFit/>
+            </a:bodyPr>
+            <a:lstStyle/>
+            <a:p>
+              <a:pPr algn="ctr"/>
+              <a:r>
+                <a:rPr lang="en-US" sz="1900" b="1" dirty="0">
+                  <a:solidFill>
+                    <a:schemeClr val="bg1"/>
+                  </a:solidFill>
+                  <a:latin typeface="Times New Roman" panose="02020603050405020304" pitchFamily="18" charset="0"/>
+                  <a:cs typeface="Times New Roman" panose="02020603050405020304" pitchFamily="18" charset="0"/>
+                </a:rPr>
+                <a:t>circulating beam</a:t>
+              </a:r>
             </a:p>
           </p:txBody>
         </p:sp>
@@ -4987,7 +5847,7 @@
     </p:spTree>
     <p:extLst>
       <p:ext uri="{BB962C8B-B14F-4D97-AF65-F5344CB8AC3E}">
-        <p14:creationId xmlns:p14="http://schemas.microsoft.com/office/powerpoint/2010/main" val="462713681"/>
+        <p14:creationId xmlns:p14="http://schemas.microsoft.com/office/powerpoint/2010/main" val="507704303"/>
       </p:ext>
     </p:extLst>
   </p:cSld>
@@ -4996,19 +5856,12 @@
   </p:clrMapOvr>
   <mc:AlternateContent xmlns:mc="http://schemas.openxmlformats.org/markup-compatibility/2006" xmlns:p14="http://schemas.microsoft.com/office/powerpoint/2010/main">
     <mc:Choice Requires="p14">
-      <p:transition spd="slow" p14:dur="2000" advTm="39496"/>
+      <p:transition spd="slow" p14:dur="2000" advTm="16373"/>
     </mc:Choice>
     <mc:Fallback xmlns="">
-      <p:transition spd="slow" advTm="39496"/>
+      <p:transition spd="slow" advTm="16373"/>
     </mc:Fallback>
   </mc:AlternateContent>
-  <p:timing>
-    <p:tnLst>
-      <p:par>
-        <p:cTn id="1" dur="indefinite" restart="never" nodeType="tmRoot"/>
-      </p:par>
-    </p:tnLst>
-  </p:timing>
 </p:sld>
 </file>
 
@@ -5031,6 +5884,28 @@
       </p:grpSpPr>
       <p:sp>
         <p:nvSpPr>
+          <p:cNvPr id="7" name="Title 6"/>
+          <p:cNvSpPr>
+            <a:spLocks noGrp="1"/>
+          </p:cNvSpPr>
+          <p:nvPr>
+            <p:ph type="title"/>
+          </p:nvPr>
+        </p:nvSpPr>
+        <p:spPr/>
+        <p:txBody>
+          <a:bodyPr/>
+          <a:lstStyle/>
+          <a:p>
+            <a:r>
+              <a:rPr lang="en-US" dirty="0"/>
+              <a:t>What is active halo control?</a:t>
+            </a:r>
+          </a:p>
+        </p:txBody>
+      </p:sp>
+      <p:sp>
+        <p:nvSpPr>
           <p:cNvPr id="4" name="Date Placeholder 3"/>
           <p:cNvSpPr>
             <a:spLocks noGrp="1"/>
@@ -5048,7 +5923,7 @@
               <a:defRPr/>
             </a:pPr>
             <a:r>
-              <a:rPr lang="en-US" smtClean="0"/>
+              <a:rPr lang="en-US"/>
               <a:t>17/05/2017</a:t>
             </a:r>
             <a:endParaRPr lang="en-US" dirty="0"/>
@@ -5074,7 +5949,7 @@
               <a:defRPr/>
             </a:pPr>
             <a:r>
-              <a:rPr lang="en-US" smtClean="0"/>
+              <a:rPr lang="en-US" dirty="0"/>
               <a:t>M. Fitterer | Hollow Electron Beam Collimation for HL-LHC - Effects on the Beam Core | IPAC’17</a:t>
             </a:r>
             <a:endParaRPr lang="en-US" b="1" dirty="0"/>
@@ -5112,198 +5987,1592 @@
       </p:sp>
       <p:grpSp>
         <p:nvGrpSpPr>
-          <p:cNvPr id="3" name="Group 2"/>
+          <p:cNvPr id="8" name="Group 7"/>
           <p:cNvGrpSpPr/>
           <p:nvPr/>
         </p:nvGrpSpPr>
         <p:grpSpPr>
           <a:xfrm>
-            <a:off x="3337545" y="1261674"/>
-            <a:ext cx="5340096" cy="4149616"/>
-            <a:chOff x="3337545" y="1261674"/>
-            <a:chExt cx="5340096" cy="4149616"/>
+            <a:off x="1992193" y="1137487"/>
+            <a:ext cx="7880647" cy="4351921"/>
+            <a:chOff x="468192" y="1137486"/>
+            <a:chExt cx="7880647" cy="4351921"/>
           </a:xfrm>
         </p:grpSpPr>
-        <p:pic>
-          <p:nvPicPr>
-            <p:cNvPr id="2" name="Picture 1"/>
-            <p:cNvPicPr>
-              <a:picLocks noChangeAspect="1"/>
-            </p:cNvPicPr>
+        <p:sp>
+          <p:nvSpPr>
+            <p:cNvPr id="48" name="Right Arrow 47"/>
+            <p:cNvSpPr/>
             <p:nvPr/>
-          </p:nvPicPr>
-          <p:blipFill>
-            <a:blip r:embed="rId3">
-              <a:extLst>
-                <a:ext uri="{28A0092B-C50C-407E-A947-70E740481C1C}">
-                  <a14:useLocalDpi xmlns:a14="http://schemas.microsoft.com/office/drawing/2010/main" val="0"/>
-                </a:ext>
-              </a:extLst>
-            </a:blip>
-            <a:stretch>
-              <a:fillRect/>
-            </a:stretch>
-          </p:blipFill>
+          </p:nvSpPr>
           <p:spPr>
             <a:xfrm>
-              <a:off x="3337545" y="1424506"/>
-              <a:ext cx="5340096" cy="3986784"/>
+              <a:off x="1589396" y="3422894"/>
+              <a:ext cx="884640" cy="1742242"/>
+            </a:xfrm>
+            <a:prstGeom prst="rightArrow">
+              <a:avLst>
+                <a:gd name="adj1" fmla="val 72672"/>
+                <a:gd name="adj2" fmla="val 71307"/>
+              </a:avLst>
+            </a:prstGeom>
+            <a:gradFill flip="none" rotWithShape="1">
+              <a:gsLst>
+                <a:gs pos="0">
+                  <a:srgbClr val="FF0000">
+                    <a:alpha val="0"/>
+                  </a:srgbClr>
+                </a:gs>
+                <a:gs pos="66000">
+                  <a:srgbClr val="FF0000">
+                    <a:alpha val="48000"/>
+                  </a:srgbClr>
+                </a:gs>
+                <a:gs pos="52000">
+                  <a:srgbClr val="FF0000"/>
+                </a:gs>
+                <a:gs pos="52000">
+                  <a:srgbClr val="FF0000"/>
+                </a:gs>
+                <a:gs pos="79000">
+                  <a:srgbClr val="FF0000">
+                    <a:alpha val="5000"/>
+                  </a:srgbClr>
+                </a:gs>
+                <a:gs pos="21000">
+                  <a:srgbClr val="FF0000">
+                    <a:alpha val="5000"/>
+                  </a:srgbClr>
+                </a:gs>
+                <a:gs pos="100000">
+                  <a:srgbClr val="FF0000">
+                    <a:alpha val="0"/>
+                  </a:srgbClr>
+                </a:gs>
+              </a:gsLst>
+              <a:lin ang="5400000" scaled="0"/>
+              <a:tileRect/>
+            </a:gradFill>
+            <a:ln>
+              <a:solidFill>
+                <a:schemeClr val="bg2">
+                  <a:alpha val="0"/>
+                </a:schemeClr>
+              </a:solidFill>
+            </a:ln>
+            <a:effectLst/>
+          </p:spPr>
+          <p:style>
+            <a:lnRef idx="1">
+              <a:schemeClr val="accent1"/>
+            </a:lnRef>
+            <a:fillRef idx="3">
+              <a:schemeClr val="accent1"/>
+            </a:fillRef>
+            <a:effectRef idx="2">
+              <a:schemeClr val="accent1"/>
+            </a:effectRef>
+            <a:fontRef idx="minor">
+              <a:schemeClr val="lt1"/>
+            </a:fontRef>
+          </p:style>
+          <p:txBody>
+            <a:bodyPr rtlCol="0" anchor="ctr"/>
+            <a:lstStyle/>
+            <a:p>
+              <a:pPr algn="ctr"/>
+              <a:endParaRPr lang="en-US"/>
+            </a:p>
+          </p:txBody>
+        </p:sp>
+        <p:cxnSp>
+          <p:nvCxnSpPr>
+            <p:cNvPr id="63" name="Straight Connector 62"/>
+            <p:cNvCxnSpPr/>
+            <p:nvPr/>
+          </p:nvCxnSpPr>
+          <p:spPr>
+            <a:xfrm flipV="1">
+              <a:off x="2534571" y="1142299"/>
+              <a:ext cx="9078" cy="3462604"/>
+            </a:xfrm>
+            <a:prstGeom prst="line">
+              <a:avLst/>
+            </a:prstGeom>
+            <a:ln>
+              <a:solidFill>
+                <a:schemeClr val="accent6">
+                  <a:lumMod val="50000"/>
+                </a:schemeClr>
+              </a:solidFill>
+              <a:prstDash val="sysDot"/>
+            </a:ln>
+            <a:effectLst/>
+          </p:spPr>
+          <p:style>
+            <a:lnRef idx="2">
+              <a:schemeClr val="accent1"/>
+            </a:lnRef>
+            <a:fillRef idx="0">
+              <a:schemeClr val="accent1"/>
+            </a:fillRef>
+            <a:effectRef idx="1">
+              <a:schemeClr val="accent1"/>
+            </a:effectRef>
+            <a:fontRef idx="minor">
+              <a:schemeClr val="tx1"/>
+            </a:fontRef>
+          </p:style>
+        </p:cxnSp>
+        <p:cxnSp>
+          <p:nvCxnSpPr>
+            <p:cNvPr id="66" name="Straight Connector 65"/>
+            <p:cNvCxnSpPr/>
+            <p:nvPr/>
+          </p:nvCxnSpPr>
+          <p:spPr>
+            <a:xfrm flipV="1">
+              <a:off x="6711530" y="1137486"/>
+              <a:ext cx="9078" cy="3462604"/>
+            </a:xfrm>
+            <a:prstGeom prst="line">
+              <a:avLst/>
+            </a:prstGeom>
+            <a:ln>
+              <a:solidFill>
+                <a:schemeClr val="accent6">
+                  <a:lumMod val="50000"/>
+                </a:schemeClr>
+              </a:solidFill>
+              <a:prstDash val="sysDot"/>
+            </a:ln>
+            <a:effectLst/>
+          </p:spPr>
+          <p:style>
+            <a:lnRef idx="2">
+              <a:schemeClr val="accent1"/>
+            </a:lnRef>
+            <a:fillRef idx="0">
+              <a:schemeClr val="accent1"/>
+            </a:fillRef>
+            <a:effectRef idx="1">
+              <a:schemeClr val="accent1"/>
+            </a:effectRef>
+            <a:fontRef idx="minor">
+              <a:schemeClr val="tx1"/>
+            </a:fontRef>
+          </p:style>
+        </p:cxnSp>
+        <p:sp>
+          <p:nvSpPr>
+            <p:cNvPr id="19" name="Rectangle 18"/>
+            <p:cNvSpPr/>
+            <p:nvPr/>
+          </p:nvSpPr>
+          <p:spPr>
+            <a:xfrm>
+              <a:off x="2956555" y="1966442"/>
+              <a:ext cx="330667" cy="1494017"/>
             </a:xfrm>
             <a:prstGeom prst="rect">
               <a:avLst/>
             </a:prstGeom>
+            <a:solidFill>
+              <a:schemeClr val="tx1">
+                <a:lumMod val="75000"/>
+                <a:lumOff val="25000"/>
+              </a:schemeClr>
+            </a:solidFill>
+            <a:ln>
+              <a:solidFill>
+                <a:schemeClr val="tx1">
+                  <a:lumMod val="75000"/>
+                  <a:lumOff val="25000"/>
+                </a:schemeClr>
+              </a:solidFill>
+            </a:ln>
+            <a:effectLst/>
           </p:spPr>
-        </p:pic>
+          <p:style>
+            <a:lnRef idx="1">
+              <a:schemeClr val="accent1"/>
+            </a:lnRef>
+            <a:fillRef idx="3">
+              <a:schemeClr val="accent1"/>
+            </a:fillRef>
+            <a:effectRef idx="2">
+              <a:schemeClr val="accent1"/>
+            </a:effectRef>
+            <a:fontRef idx="minor">
+              <a:schemeClr val="lt1"/>
+            </a:fontRef>
+          </p:style>
+          <p:txBody>
+            <a:bodyPr rtlCol="0" anchor="ctr"/>
+            <a:lstStyle/>
+            <a:p>
+              <a:pPr algn="ctr"/>
+              <a:endParaRPr lang="en-US"/>
+            </a:p>
+          </p:txBody>
+        </p:sp>
+        <p:sp>
+          <p:nvSpPr>
+            <p:cNvPr id="20" name="Rectangle 19"/>
+            <p:cNvSpPr/>
+            <p:nvPr/>
+          </p:nvSpPr>
+          <p:spPr>
+            <a:xfrm>
+              <a:off x="3809079" y="1972846"/>
+              <a:ext cx="609713" cy="1217279"/>
+            </a:xfrm>
+            <a:prstGeom prst="rect">
+              <a:avLst/>
+            </a:prstGeom>
+            <a:solidFill>
+              <a:schemeClr val="tx1">
+                <a:lumMod val="50000"/>
+                <a:lumOff val="50000"/>
+              </a:schemeClr>
+            </a:solidFill>
+            <a:ln>
+              <a:solidFill>
+                <a:schemeClr val="tx1">
+                  <a:lumMod val="50000"/>
+                  <a:lumOff val="50000"/>
+                </a:schemeClr>
+              </a:solidFill>
+            </a:ln>
+            <a:effectLst/>
+          </p:spPr>
+          <p:style>
+            <a:lnRef idx="1">
+              <a:schemeClr val="accent1"/>
+            </a:lnRef>
+            <a:fillRef idx="3">
+              <a:schemeClr val="accent1"/>
+            </a:fillRef>
+            <a:effectRef idx="2">
+              <a:schemeClr val="accent1"/>
+            </a:effectRef>
+            <a:fontRef idx="minor">
+              <a:schemeClr val="lt1"/>
+            </a:fontRef>
+          </p:style>
+          <p:txBody>
+            <a:bodyPr rtlCol="0" anchor="ctr"/>
+            <a:lstStyle/>
+            <a:p>
+              <a:pPr algn="ctr"/>
+              <a:endParaRPr lang="en-US"/>
+            </a:p>
+          </p:txBody>
+        </p:sp>
+        <p:sp>
+          <p:nvSpPr>
+            <p:cNvPr id="21" name="Rectangle 20"/>
+            <p:cNvSpPr/>
+            <p:nvPr/>
+          </p:nvSpPr>
+          <p:spPr>
+            <a:xfrm>
+              <a:off x="4645719" y="1972846"/>
+              <a:ext cx="609713" cy="1217278"/>
+            </a:xfrm>
+            <a:prstGeom prst="rect">
+              <a:avLst/>
+            </a:prstGeom>
+            <a:solidFill>
+              <a:schemeClr val="tx1">
+                <a:lumMod val="50000"/>
+                <a:lumOff val="50000"/>
+              </a:schemeClr>
+            </a:solidFill>
+            <a:ln>
+              <a:solidFill>
+                <a:schemeClr val="tx1">
+                  <a:lumMod val="50000"/>
+                  <a:lumOff val="50000"/>
+                </a:schemeClr>
+              </a:solidFill>
+            </a:ln>
+            <a:effectLst/>
+          </p:spPr>
+          <p:style>
+            <a:lnRef idx="1">
+              <a:schemeClr val="accent1"/>
+            </a:lnRef>
+            <a:fillRef idx="3">
+              <a:schemeClr val="accent1"/>
+            </a:fillRef>
+            <a:effectRef idx="2">
+              <a:schemeClr val="accent1"/>
+            </a:effectRef>
+            <a:fontRef idx="minor">
+              <a:schemeClr val="lt1"/>
+            </a:fontRef>
+          </p:style>
+          <p:txBody>
+            <a:bodyPr rtlCol="0" anchor="ctr"/>
+            <a:lstStyle/>
+            <a:p>
+              <a:pPr algn="ctr"/>
+              <a:endParaRPr lang="en-US"/>
+            </a:p>
+          </p:txBody>
+        </p:sp>
+        <p:sp>
+          <p:nvSpPr>
+            <p:cNvPr id="22" name="Rectangle 21"/>
+            <p:cNvSpPr/>
+            <p:nvPr/>
+          </p:nvSpPr>
+          <p:spPr>
+            <a:xfrm>
+              <a:off x="5784951" y="1972493"/>
+              <a:ext cx="588372" cy="565449"/>
+            </a:xfrm>
+            <a:prstGeom prst="rect">
+              <a:avLst/>
+            </a:prstGeom>
+            <a:solidFill>
+              <a:schemeClr val="bg2"/>
+            </a:solidFill>
+            <a:ln>
+              <a:solidFill>
+                <a:schemeClr val="bg2"/>
+              </a:solidFill>
+            </a:ln>
+            <a:effectLst/>
+          </p:spPr>
+          <p:style>
+            <a:lnRef idx="1">
+              <a:schemeClr val="accent1"/>
+            </a:lnRef>
+            <a:fillRef idx="3">
+              <a:schemeClr val="accent1"/>
+            </a:fillRef>
+            <a:effectRef idx="2">
+              <a:schemeClr val="accent1"/>
+            </a:effectRef>
+            <a:fontRef idx="minor">
+              <a:schemeClr val="lt1"/>
+            </a:fontRef>
+          </p:style>
+          <p:txBody>
+            <a:bodyPr rtlCol="0" anchor="ctr"/>
+            <a:lstStyle/>
+            <a:p>
+              <a:pPr algn="ctr"/>
+              <a:endParaRPr lang="en-US"/>
+            </a:p>
+          </p:txBody>
+        </p:sp>
+        <p:sp>
+          <p:nvSpPr>
+            <p:cNvPr id="3" name="Rectangle 2"/>
+            <p:cNvSpPr/>
+            <p:nvPr/>
+          </p:nvSpPr>
+          <p:spPr>
+            <a:xfrm>
+              <a:off x="932641" y="1897862"/>
+              <a:ext cx="1600291" cy="68580"/>
+            </a:xfrm>
+            <a:prstGeom prst="rect">
+              <a:avLst/>
+            </a:prstGeom>
+            <a:solidFill>
+              <a:srgbClr val="0070C0"/>
+            </a:solidFill>
+            <a:ln>
+              <a:solidFill>
+                <a:srgbClr val="0070C0"/>
+              </a:solidFill>
+            </a:ln>
+            <a:effectLst/>
+          </p:spPr>
+          <p:style>
+            <a:lnRef idx="1">
+              <a:schemeClr val="accent1"/>
+            </a:lnRef>
+            <a:fillRef idx="3">
+              <a:schemeClr val="accent1"/>
+            </a:fillRef>
+            <a:effectRef idx="2">
+              <a:schemeClr val="accent1"/>
+            </a:effectRef>
+            <a:fontRef idx="minor">
+              <a:schemeClr val="lt1"/>
+            </a:fontRef>
+          </p:style>
+          <p:txBody>
+            <a:bodyPr rtlCol="0" anchor="ctr"/>
+            <a:lstStyle/>
+            <a:p>
+              <a:pPr algn="ctr"/>
+              <a:endParaRPr lang="en-US"/>
+            </a:p>
+          </p:txBody>
+        </p:sp>
+        <p:sp>
+          <p:nvSpPr>
+            <p:cNvPr id="17" name="Rectangle 16"/>
+            <p:cNvSpPr/>
+            <p:nvPr/>
+          </p:nvSpPr>
+          <p:spPr>
+            <a:xfrm>
+              <a:off x="2532932" y="1897862"/>
+              <a:ext cx="4168853" cy="68580"/>
+            </a:xfrm>
+            <a:prstGeom prst="rect">
+              <a:avLst/>
+            </a:prstGeom>
+            <a:solidFill>
+              <a:srgbClr val="FF0000"/>
+            </a:solidFill>
+            <a:ln>
+              <a:solidFill>
+                <a:srgbClr val="FF0000"/>
+              </a:solidFill>
+            </a:ln>
+            <a:effectLst/>
+          </p:spPr>
+          <p:style>
+            <a:lnRef idx="1">
+              <a:schemeClr val="accent1"/>
+            </a:lnRef>
+            <a:fillRef idx="3">
+              <a:schemeClr val="accent1"/>
+            </a:fillRef>
+            <a:effectRef idx="2">
+              <a:schemeClr val="accent1"/>
+            </a:effectRef>
+            <a:fontRef idx="minor">
+              <a:schemeClr val="lt1"/>
+            </a:fontRef>
+          </p:style>
+          <p:txBody>
+            <a:bodyPr rtlCol="0" anchor="ctr"/>
+            <a:lstStyle/>
+            <a:p>
+              <a:pPr algn="ctr"/>
+              <a:endParaRPr lang="en-US"/>
+            </a:p>
+          </p:txBody>
+        </p:sp>
+        <p:sp>
+          <p:nvSpPr>
+            <p:cNvPr id="18" name="Rectangle 17"/>
+            <p:cNvSpPr/>
+            <p:nvPr/>
+          </p:nvSpPr>
+          <p:spPr>
+            <a:xfrm>
+              <a:off x="6713215" y="1897862"/>
+              <a:ext cx="1600291" cy="68580"/>
+            </a:xfrm>
+            <a:prstGeom prst="rect">
+              <a:avLst/>
+            </a:prstGeom>
+            <a:solidFill>
+              <a:srgbClr val="0070C0"/>
+            </a:solidFill>
+            <a:ln>
+              <a:solidFill>
+                <a:srgbClr val="0070C0"/>
+              </a:solidFill>
+            </a:ln>
+            <a:effectLst/>
+          </p:spPr>
+          <p:style>
+            <a:lnRef idx="1">
+              <a:schemeClr val="accent1"/>
+            </a:lnRef>
+            <a:fillRef idx="3">
+              <a:schemeClr val="accent1"/>
+            </a:fillRef>
+            <a:effectRef idx="2">
+              <a:schemeClr val="accent1"/>
+            </a:effectRef>
+            <a:fontRef idx="minor">
+              <a:schemeClr val="lt1"/>
+            </a:fontRef>
+          </p:style>
+          <p:txBody>
+            <a:bodyPr rtlCol="0" anchor="ctr"/>
+            <a:lstStyle/>
+            <a:p>
+              <a:pPr algn="ctr"/>
+              <a:endParaRPr lang="en-US"/>
+            </a:p>
+          </p:txBody>
+        </p:sp>
+        <p:cxnSp>
+          <p:nvCxnSpPr>
+            <p:cNvPr id="10" name="Straight Arrow Connector 9"/>
+            <p:cNvCxnSpPr/>
+            <p:nvPr/>
+          </p:nvCxnSpPr>
+          <p:spPr>
+            <a:xfrm flipV="1">
+              <a:off x="3378662" y="2755112"/>
+              <a:ext cx="342900" cy="435012"/>
+            </a:xfrm>
+            <a:prstGeom prst="straightConnector1">
+              <a:avLst/>
+            </a:prstGeom>
+            <a:ln>
+              <a:solidFill>
+                <a:srgbClr val="00B050"/>
+              </a:solidFill>
+              <a:tailEnd type="triangle"/>
+            </a:ln>
+            <a:effectLst/>
+          </p:spPr>
+          <p:style>
+            <a:lnRef idx="2">
+              <a:schemeClr val="accent1"/>
+            </a:lnRef>
+            <a:fillRef idx="0">
+              <a:schemeClr val="accent1"/>
+            </a:fillRef>
+            <a:effectRef idx="1">
+              <a:schemeClr val="accent1"/>
+            </a:effectRef>
+            <a:fontRef idx="minor">
+              <a:schemeClr val="tx1"/>
+            </a:fontRef>
+          </p:style>
+        </p:cxnSp>
+        <p:cxnSp>
+          <p:nvCxnSpPr>
+            <p:cNvPr id="23" name="Straight Arrow Connector 22"/>
+            <p:cNvCxnSpPr/>
+            <p:nvPr/>
+          </p:nvCxnSpPr>
+          <p:spPr>
+            <a:xfrm flipV="1">
+              <a:off x="3367945" y="2972618"/>
+              <a:ext cx="427075" cy="265183"/>
+            </a:xfrm>
+            <a:prstGeom prst="straightConnector1">
+              <a:avLst/>
+            </a:prstGeom>
+            <a:ln>
+              <a:solidFill>
+                <a:srgbClr val="00B050"/>
+              </a:solidFill>
+              <a:tailEnd type="triangle"/>
+            </a:ln>
+            <a:effectLst/>
+          </p:spPr>
+          <p:style>
+            <a:lnRef idx="2">
+              <a:schemeClr val="accent1"/>
+            </a:lnRef>
+            <a:fillRef idx="0">
+              <a:schemeClr val="accent1"/>
+            </a:fillRef>
+            <a:effectRef idx="1">
+              <a:schemeClr val="accent1"/>
+            </a:effectRef>
+            <a:fontRef idx="minor">
+              <a:schemeClr val="tx1"/>
+            </a:fontRef>
+          </p:style>
+        </p:cxnSp>
+        <p:cxnSp>
+          <p:nvCxnSpPr>
+            <p:cNvPr id="25" name="Straight Arrow Connector 24"/>
+            <p:cNvCxnSpPr/>
+            <p:nvPr/>
+          </p:nvCxnSpPr>
+          <p:spPr>
+            <a:xfrm flipV="1">
+              <a:off x="3325858" y="3178022"/>
+              <a:ext cx="384987" cy="168533"/>
+            </a:xfrm>
+            <a:prstGeom prst="straightConnector1">
+              <a:avLst/>
+            </a:prstGeom>
+            <a:ln>
+              <a:solidFill>
+                <a:srgbClr val="00B050"/>
+              </a:solidFill>
+              <a:tailEnd type="triangle"/>
+            </a:ln>
+            <a:effectLst/>
+          </p:spPr>
+          <p:style>
+            <a:lnRef idx="2">
+              <a:schemeClr val="accent1"/>
+            </a:lnRef>
+            <a:fillRef idx="0">
+              <a:schemeClr val="accent1"/>
+            </a:fillRef>
+            <a:effectRef idx="1">
+              <a:schemeClr val="accent1"/>
+            </a:effectRef>
+            <a:fontRef idx="minor">
+              <a:schemeClr val="tx1"/>
+            </a:fontRef>
+          </p:style>
+        </p:cxnSp>
+        <p:cxnSp>
+          <p:nvCxnSpPr>
+            <p:cNvPr id="27" name="Straight Arrow Connector 26"/>
+            <p:cNvCxnSpPr/>
+            <p:nvPr/>
+          </p:nvCxnSpPr>
+          <p:spPr>
+            <a:xfrm flipV="1">
+              <a:off x="4994744" y="2069000"/>
+              <a:ext cx="342900" cy="435012"/>
+            </a:xfrm>
+            <a:prstGeom prst="straightConnector1">
+              <a:avLst/>
+            </a:prstGeom>
+            <a:ln>
+              <a:solidFill>
+                <a:srgbClr val="00B050"/>
+              </a:solidFill>
+              <a:tailEnd type="triangle"/>
+            </a:ln>
+            <a:effectLst/>
+          </p:spPr>
+          <p:style>
+            <a:lnRef idx="2">
+              <a:schemeClr val="accent1"/>
+            </a:lnRef>
+            <a:fillRef idx="0">
+              <a:schemeClr val="accent1"/>
+            </a:fillRef>
+            <a:effectRef idx="1">
+              <a:schemeClr val="accent1"/>
+            </a:effectRef>
+            <a:fontRef idx="minor">
+              <a:schemeClr val="tx1"/>
+            </a:fontRef>
+          </p:style>
+        </p:cxnSp>
+        <p:cxnSp>
+          <p:nvCxnSpPr>
+            <p:cNvPr id="28" name="Straight Arrow Connector 27"/>
+            <p:cNvCxnSpPr/>
+            <p:nvPr/>
+          </p:nvCxnSpPr>
+          <p:spPr>
+            <a:xfrm flipV="1">
+              <a:off x="4984027" y="2286506"/>
+              <a:ext cx="427075" cy="265183"/>
+            </a:xfrm>
+            <a:prstGeom prst="straightConnector1">
+              <a:avLst/>
+            </a:prstGeom>
+            <a:ln>
+              <a:solidFill>
+                <a:srgbClr val="00B050"/>
+              </a:solidFill>
+              <a:tailEnd type="triangle"/>
+            </a:ln>
+            <a:effectLst/>
+          </p:spPr>
+          <p:style>
+            <a:lnRef idx="2">
+              <a:schemeClr val="accent1"/>
+            </a:lnRef>
+            <a:fillRef idx="0">
+              <a:schemeClr val="accent1"/>
+            </a:fillRef>
+            <a:effectRef idx="1">
+              <a:schemeClr val="accent1"/>
+            </a:effectRef>
+            <a:fontRef idx="minor">
+              <a:schemeClr val="tx1"/>
+            </a:fontRef>
+          </p:style>
+        </p:cxnSp>
+        <p:cxnSp>
+          <p:nvCxnSpPr>
+            <p:cNvPr id="29" name="Straight Arrow Connector 28"/>
+            <p:cNvCxnSpPr/>
+            <p:nvPr/>
+          </p:nvCxnSpPr>
+          <p:spPr>
+            <a:xfrm flipV="1">
+              <a:off x="4941940" y="2491910"/>
+              <a:ext cx="384987" cy="168533"/>
+            </a:xfrm>
+            <a:prstGeom prst="straightConnector1">
+              <a:avLst/>
+            </a:prstGeom>
+            <a:ln>
+              <a:solidFill>
+                <a:srgbClr val="00B050"/>
+              </a:solidFill>
+              <a:tailEnd type="triangle"/>
+            </a:ln>
+            <a:effectLst/>
+          </p:spPr>
+          <p:style>
+            <a:lnRef idx="2">
+              <a:schemeClr val="accent1"/>
+            </a:lnRef>
+            <a:fillRef idx="0">
+              <a:schemeClr val="accent1"/>
+            </a:fillRef>
+            <a:effectRef idx="1">
+              <a:schemeClr val="accent1"/>
+            </a:effectRef>
+            <a:fontRef idx="minor">
+              <a:schemeClr val="tx1"/>
+            </a:fontRef>
+          </p:style>
+        </p:cxnSp>
+        <p:cxnSp>
+          <p:nvCxnSpPr>
+            <p:cNvPr id="30" name="Straight Arrow Connector 29"/>
+            <p:cNvCxnSpPr/>
+            <p:nvPr/>
+          </p:nvCxnSpPr>
+          <p:spPr>
+            <a:xfrm flipV="1">
+              <a:off x="5375485" y="2267398"/>
+              <a:ext cx="342900" cy="435012"/>
+            </a:xfrm>
+            <a:prstGeom prst="straightConnector1">
+              <a:avLst/>
+            </a:prstGeom>
+            <a:ln>
+              <a:solidFill>
+                <a:srgbClr val="00B050"/>
+              </a:solidFill>
+              <a:tailEnd type="triangle"/>
+            </a:ln>
+            <a:effectLst/>
+          </p:spPr>
+          <p:style>
+            <a:lnRef idx="2">
+              <a:schemeClr val="accent1"/>
+            </a:lnRef>
+            <a:fillRef idx="0">
+              <a:schemeClr val="accent1"/>
+            </a:fillRef>
+            <a:effectRef idx="1">
+              <a:schemeClr val="accent1"/>
+            </a:effectRef>
+            <a:fontRef idx="minor">
+              <a:schemeClr val="tx1"/>
+            </a:fontRef>
+          </p:style>
+        </p:cxnSp>
+        <p:cxnSp>
+          <p:nvCxnSpPr>
+            <p:cNvPr id="31" name="Straight Arrow Connector 30"/>
+            <p:cNvCxnSpPr/>
+            <p:nvPr/>
+          </p:nvCxnSpPr>
+          <p:spPr>
+            <a:xfrm flipV="1">
+              <a:off x="5364768" y="2484904"/>
+              <a:ext cx="427075" cy="265183"/>
+            </a:xfrm>
+            <a:prstGeom prst="straightConnector1">
+              <a:avLst/>
+            </a:prstGeom>
+            <a:ln>
+              <a:solidFill>
+                <a:srgbClr val="00B050"/>
+              </a:solidFill>
+              <a:tailEnd type="triangle"/>
+            </a:ln>
+            <a:effectLst/>
+          </p:spPr>
+          <p:style>
+            <a:lnRef idx="2">
+              <a:schemeClr val="accent1"/>
+            </a:lnRef>
+            <a:fillRef idx="0">
+              <a:schemeClr val="accent1"/>
+            </a:fillRef>
+            <a:effectRef idx="1">
+              <a:schemeClr val="accent1"/>
+            </a:effectRef>
+            <a:fontRef idx="minor">
+              <a:schemeClr val="tx1"/>
+            </a:fontRef>
+          </p:style>
+        </p:cxnSp>
+        <p:cxnSp>
+          <p:nvCxnSpPr>
+            <p:cNvPr id="32" name="Straight Arrow Connector 31"/>
+            <p:cNvCxnSpPr/>
+            <p:nvPr/>
+          </p:nvCxnSpPr>
+          <p:spPr>
+            <a:xfrm flipV="1">
+              <a:off x="5322681" y="2690308"/>
+              <a:ext cx="384987" cy="168533"/>
+            </a:xfrm>
+            <a:prstGeom prst="straightConnector1">
+              <a:avLst/>
+            </a:prstGeom>
+            <a:ln>
+              <a:solidFill>
+                <a:srgbClr val="00B050"/>
+              </a:solidFill>
+              <a:tailEnd type="triangle"/>
+            </a:ln>
+            <a:effectLst/>
+          </p:spPr>
+          <p:style>
+            <a:lnRef idx="2">
+              <a:schemeClr val="accent1"/>
+            </a:lnRef>
+            <a:fillRef idx="0">
+              <a:schemeClr val="accent1"/>
+            </a:fillRef>
+            <a:effectRef idx="1">
+              <a:schemeClr val="accent1"/>
+            </a:effectRef>
+            <a:fontRef idx="minor">
+              <a:schemeClr val="tx1"/>
+            </a:fontRef>
+          </p:style>
+        </p:cxnSp>
+        <p:cxnSp>
+          <p:nvCxnSpPr>
+            <p:cNvPr id="33" name="Straight Arrow Connector 32"/>
+            <p:cNvCxnSpPr/>
+            <p:nvPr/>
+          </p:nvCxnSpPr>
+          <p:spPr>
+            <a:xfrm flipV="1">
+              <a:off x="3335338" y="3262288"/>
+              <a:ext cx="717726" cy="208891"/>
+            </a:xfrm>
+            <a:prstGeom prst="straightConnector1">
+              <a:avLst/>
+            </a:prstGeom>
+            <a:ln>
+              <a:solidFill>
+                <a:srgbClr val="7030A0"/>
+              </a:solidFill>
+              <a:tailEnd type="stealth" w="lg" len="lg"/>
+            </a:ln>
+            <a:effectLst/>
+          </p:spPr>
+          <p:style>
+            <a:lnRef idx="2">
+              <a:schemeClr val="accent1"/>
+            </a:lnRef>
+            <a:fillRef idx="0">
+              <a:schemeClr val="accent1"/>
+            </a:fillRef>
+            <a:effectRef idx="1">
+              <a:schemeClr val="accent1"/>
+            </a:effectRef>
+            <a:fontRef idx="minor">
+              <a:schemeClr val="tx1"/>
+            </a:fontRef>
+          </p:style>
+        </p:cxnSp>
+        <p:cxnSp>
+          <p:nvCxnSpPr>
+            <p:cNvPr id="35" name="Straight Arrow Connector 34"/>
+            <p:cNvCxnSpPr/>
+            <p:nvPr/>
+          </p:nvCxnSpPr>
+          <p:spPr>
+            <a:xfrm flipV="1">
+              <a:off x="3355038" y="3252055"/>
+              <a:ext cx="1386225" cy="204978"/>
+            </a:xfrm>
+            <a:prstGeom prst="straightConnector1">
+              <a:avLst/>
+            </a:prstGeom>
+            <a:ln>
+              <a:solidFill>
+                <a:srgbClr val="7030A0"/>
+              </a:solidFill>
+              <a:tailEnd type="stealth" w="lg" len="lg"/>
+            </a:ln>
+            <a:effectLst/>
+          </p:spPr>
+          <p:style>
+            <a:lnRef idx="2">
+              <a:schemeClr val="accent1"/>
+            </a:lnRef>
+            <a:fillRef idx="0">
+              <a:schemeClr val="accent1"/>
+            </a:fillRef>
+            <a:effectRef idx="1">
+              <a:schemeClr val="accent1"/>
+            </a:effectRef>
+            <a:fontRef idx="minor">
+              <a:schemeClr val="tx1"/>
+            </a:fontRef>
+          </p:style>
+        </p:cxnSp>
+        <p:cxnSp>
+          <p:nvCxnSpPr>
+            <p:cNvPr id="37" name="Straight Arrow Connector 36"/>
+            <p:cNvCxnSpPr/>
+            <p:nvPr/>
+          </p:nvCxnSpPr>
+          <p:spPr>
+            <a:xfrm flipV="1">
+              <a:off x="3355038" y="3383105"/>
+              <a:ext cx="2223267" cy="80789"/>
+            </a:xfrm>
+            <a:prstGeom prst="straightConnector1">
+              <a:avLst/>
+            </a:prstGeom>
+            <a:ln>
+              <a:solidFill>
+                <a:srgbClr val="7030A0"/>
+              </a:solidFill>
+              <a:tailEnd type="stealth" w="lg" len="lg"/>
+            </a:ln>
+            <a:effectLst/>
+          </p:spPr>
+          <p:style>
+            <a:lnRef idx="2">
+              <a:schemeClr val="accent1"/>
+            </a:lnRef>
+            <a:fillRef idx="0">
+              <a:schemeClr val="accent1"/>
+            </a:fillRef>
+            <a:effectRef idx="1">
+              <a:schemeClr val="accent1"/>
+            </a:effectRef>
+            <a:fontRef idx="minor">
+              <a:schemeClr val="tx1"/>
+            </a:fontRef>
+          </p:style>
+        </p:cxnSp>
+        <p:cxnSp>
+          <p:nvCxnSpPr>
+            <p:cNvPr id="39" name="Straight Arrow Connector 38"/>
+            <p:cNvCxnSpPr/>
+            <p:nvPr/>
+          </p:nvCxnSpPr>
+          <p:spPr>
+            <a:xfrm flipV="1">
+              <a:off x="5315703" y="2743346"/>
+              <a:ext cx="1697699" cy="358681"/>
+            </a:xfrm>
+            <a:prstGeom prst="straightConnector1">
+              <a:avLst/>
+            </a:prstGeom>
+            <a:ln>
+              <a:solidFill>
+                <a:srgbClr val="7030A0"/>
+              </a:solidFill>
+              <a:tailEnd type="stealth" w="lg" len="lg"/>
+            </a:ln>
+            <a:effectLst/>
+          </p:spPr>
+          <p:style>
+            <a:lnRef idx="2">
+              <a:schemeClr val="accent1"/>
+            </a:lnRef>
+            <a:fillRef idx="0">
+              <a:schemeClr val="accent1"/>
+            </a:fillRef>
+            <a:effectRef idx="1">
+              <a:schemeClr val="accent1"/>
+            </a:effectRef>
+            <a:fontRef idx="minor">
+              <a:schemeClr val="tx1"/>
+            </a:fontRef>
+          </p:style>
+        </p:cxnSp>
+        <p:cxnSp>
+          <p:nvCxnSpPr>
+            <p:cNvPr id="41" name="Straight Arrow Connector 40"/>
+            <p:cNvCxnSpPr/>
+            <p:nvPr/>
+          </p:nvCxnSpPr>
+          <p:spPr>
+            <a:xfrm flipV="1">
+              <a:off x="5335160" y="2767530"/>
+              <a:ext cx="2200465" cy="330062"/>
+            </a:xfrm>
+            <a:prstGeom prst="straightConnector1">
+              <a:avLst/>
+            </a:prstGeom>
+            <a:ln>
+              <a:solidFill>
+                <a:srgbClr val="7030A0"/>
+              </a:solidFill>
+              <a:tailEnd type="stealth" w="lg" len="lg"/>
+            </a:ln>
+            <a:effectLst/>
+          </p:spPr>
+          <p:style>
+            <a:lnRef idx="2">
+              <a:schemeClr val="accent1"/>
+            </a:lnRef>
+            <a:fillRef idx="0">
+              <a:schemeClr val="accent1"/>
+            </a:fillRef>
+            <a:effectRef idx="1">
+              <a:schemeClr val="accent1"/>
+            </a:effectRef>
+            <a:fontRef idx="minor">
+              <a:schemeClr val="tx1"/>
+            </a:fontRef>
+          </p:style>
+        </p:cxnSp>
+        <p:sp>
+          <p:nvSpPr>
+            <p:cNvPr id="43" name="TextBox 42"/>
+            <p:cNvSpPr txBox="1"/>
+            <p:nvPr/>
+          </p:nvSpPr>
+          <p:spPr>
+            <a:xfrm>
+              <a:off x="2570392" y="1142299"/>
+              <a:ext cx="1306769" cy="707886"/>
+            </a:xfrm>
+            <a:prstGeom prst="rect">
+              <a:avLst/>
+            </a:prstGeom>
+            <a:noFill/>
+          </p:spPr>
+          <p:txBody>
+            <a:bodyPr wrap="none" rtlCol="0">
+              <a:spAutoFit/>
+            </a:bodyPr>
+            <a:lstStyle/>
+            <a:p>
+              <a:pPr algn="ctr"/>
+              <a:r>
+                <a:rPr lang="en-US" sz="2000" b="1" dirty="0">
+                  <a:solidFill>
+                    <a:srgbClr val="FF0000"/>
+                  </a:solidFill>
+                  <a:latin typeface="Times New Roman" panose="02020603050405020304" pitchFamily="18" charset="0"/>
+                  <a:cs typeface="Times New Roman" panose="02020603050405020304" pitchFamily="18" charset="0"/>
+                </a:rPr>
+                <a:t>primary</a:t>
+              </a:r>
+            </a:p>
+            <a:p>
+              <a:pPr algn="ctr"/>
+              <a:r>
+                <a:rPr lang="en-US" sz="2000" b="1" dirty="0">
+                  <a:solidFill>
+                    <a:srgbClr val="FF0000"/>
+                  </a:solidFill>
+                  <a:latin typeface="Times New Roman" panose="02020603050405020304" pitchFamily="18" charset="0"/>
+                  <a:cs typeface="Times New Roman" panose="02020603050405020304" pitchFamily="18" charset="0"/>
+                </a:rPr>
+                <a:t>collimator</a:t>
+              </a:r>
+            </a:p>
+          </p:txBody>
+        </p:sp>
+        <p:sp>
+          <p:nvSpPr>
+            <p:cNvPr id="44" name="TextBox 43"/>
+            <p:cNvSpPr txBox="1"/>
+            <p:nvPr/>
+          </p:nvSpPr>
+          <p:spPr>
+            <a:xfrm>
+              <a:off x="3885587" y="1145771"/>
+              <a:ext cx="1306768" cy="707886"/>
+            </a:xfrm>
+            <a:prstGeom prst="rect">
+              <a:avLst/>
+            </a:prstGeom>
+            <a:noFill/>
+          </p:spPr>
+          <p:txBody>
+            <a:bodyPr wrap="none" rtlCol="0">
+              <a:spAutoFit/>
+            </a:bodyPr>
+            <a:lstStyle/>
+            <a:p>
+              <a:pPr algn="ctr"/>
+              <a:r>
+                <a:rPr lang="en-US" sz="2000" b="1" dirty="0">
+                  <a:solidFill>
+                    <a:srgbClr val="00B050"/>
+                  </a:solidFill>
+                  <a:latin typeface="Times New Roman" panose="02020603050405020304" pitchFamily="18" charset="0"/>
+                  <a:cs typeface="Times New Roman" panose="02020603050405020304" pitchFamily="18" charset="0"/>
+                </a:rPr>
+                <a:t>secondary</a:t>
+              </a:r>
+            </a:p>
+            <a:p>
+              <a:pPr algn="ctr"/>
+              <a:r>
+                <a:rPr lang="en-US" sz="2000" b="1" dirty="0">
+                  <a:solidFill>
+                    <a:srgbClr val="00B050"/>
+                  </a:solidFill>
+                  <a:latin typeface="Times New Roman" panose="02020603050405020304" pitchFamily="18" charset="0"/>
+                  <a:cs typeface="Times New Roman" panose="02020603050405020304" pitchFamily="18" charset="0"/>
+                </a:rPr>
+                <a:t>collimator</a:t>
+              </a:r>
+            </a:p>
+          </p:txBody>
+        </p:sp>
+        <p:sp>
+          <p:nvSpPr>
+            <p:cNvPr id="45" name="TextBox 44"/>
+            <p:cNvSpPr txBox="1"/>
+            <p:nvPr/>
+          </p:nvSpPr>
+          <p:spPr>
+            <a:xfrm>
+              <a:off x="5473486" y="1149040"/>
+              <a:ext cx="1266693" cy="707886"/>
+            </a:xfrm>
+            <a:prstGeom prst="rect">
+              <a:avLst/>
+            </a:prstGeom>
+            <a:noFill/>
+          </p:spPr>
+          <p:txBody>
+            <a:bodyPr wrap="none" rtlCol="0">
+              <a:spAutoFit/>
+            </a:bodyPr>
+            <a:lstStyle/>
+            <a:p>
+              <a:pPr algn="ctr"/>
+              <a:r>
+                <a:rPr lang="en-US" sz="2000" b="1" dirty="0">
+                  <a:solidFill>
+                    <a:srgbClr val="0070C0"/>
+                  </a:solidFill>
+                  <a:latin typeface="Times New Roman" panose="02020603050405020304" pitchFamily="18" charset="0"/>
+                  <a:cs typeface="Times New Roman" panose="02020603050405020304" pitchFamily="18" charset="0"/>
+                </a:rPr>
+                <a:t>shower</a:t>
+              </a:r>
+            </a:p>
+            <a:p>
+              <a:pPr algn="ctr"/>
+              <a:r>
+                <a:rPr lang="en-US" sz="2000" b="1" dirty="0">
+                  <a:solidFill>
+                    <a:srgbClr val="0070C0"/>
+                  </a:solidFill>
+                  <a:latin typeface="Times New Roman" panose="02020603050405020304" pitchFamily="18" charset="0"/>
+                  <a:cs typeface="Times New Roman" panose="02020603050405020304" pitchFamily="18" charset="0"/>
+                </a:rPr>
+                <a:t>absorbers</a:t>
+              </a:r>
+            </a:p>
+          </p:txBody>
+        </p:sp>
+        <p:sp>
+          <p:nvSpPr>
+            <p:cNvPr id="59" name="Right Arrow 58"/>
+            <p:cNvSpPr/>
+            <p:nvPr/>
+          </p:nvSpPr>
+          <p:spPr>
+            <a:xfrm>
+              <a:off x="558854" y="3422894"/>
+              <a:ext cx="1030542" cy="1742242"/>
+            </a:xfrm>
+            <a:prstGeom prst="rightArrow">
+              <a:avLst>
+                <a:gd name="adj1" fmla="val 72672"/>
+                <a:gd name="adj2" fmla="val 0"/>
+              </a:avLst>
+            </a:prstGeom>
+            <a:gradFill flip="none" rotWithShape="1">
+              <a:gsLst>
+                <a:gs pos="0">
+                  <a:srgbClr val="FF0000">
+                    <a:alpha val="0"/>
+                  </a:srgbClr>
+                </a:gs>
+                <a:gs pos="68000">
+                  <a:srgbClr val="FF0000">
+                    <a:alpha val="48000"/>
+                  </a:srgbClr>
+                </a:gs>
+                <a:gs pos="52000">
+                  <a:srgbClr val="FF0000"/>
+                </a:gs>
+                <a:gs pos="34000">
+                  <a:srgbClr val="FF0000">
+                    <a:alpha val="48000"/>
+                  </a:srgbClr>
+                </a:gs>
+                <a:gs pos="100000">
+                  <a:srgbClr val="FF0000">
+                    <a:alpha val="0"/>
+                  </a:srgbClr>
+                </a:gs>
+              </a:gsLst>
+              <a:lin ang="5400000" scaled="0"/>
+              <a:tileRect/>
+            </a:gradFill>
+            <a:ln>
+              <a:solidFill>
+                <a:schemeClr val="bg2">
+                  <a:alpha val="0"/>
+                </a:schemeClr>
+              </a:solidFill>
+            </a:ln>
+            <a:effectLst/>
+          </p:spPr>
+          <p:style>
+            <a:lnRef idx="1">
+              <a:schemeClr val="accent1"/>
+            </a:lnRef>
+            <a:fillRef idx="3">
+              <a:schemeClr val="accent1"/>
+            </a:fillRef>
+            <a:effectRef idx="2">
+              <a:schemeClr val="accent1"/>
+            </a:effectRef>
+            <a:fontRef idx="minor">
+              <a:schemeClr val="lt1"/>
+            </a:fontRef>
+          </p:style>
+          <p:txBody>
+            <a:bodyPr rtlCol="0" anchor="ctr"/>
+            <a:lstStyle/>
+            <a:p>
+              <a:pPr algn="ctr"/>
+              <a:endParaRPr lang="en-US"/>
+            </a:p>
+          </p:txBody>
+        </p:sp>
+        <p:cxnSp>
+          <p:nvCxnSpPr>
+            <p:cNvPr id="61" name="Straight Connector 60"/>
+            <p:cNvCxnSpPr/>
+            <p:nvPr/>
+          </p:nvCxnSpPr>
+          <p:spPr>
+            <a:xfrm>
+              <a:off x="987871" y="4284933"/>
+              <a:ext cx="7360968" cy="9124"/>
+            </a:xfrm>
+            <a:prstGeom prst="line">
+              <a:avLst/>
+            </a:prstGeom>
+            <a:ln w="28575">
+              <a:solidFill>
+                <a:srgbClr val="FF0000"/>
+              </a:solidFill>
+              <a:prstDash val="sysDot"/>
+            </a:ln>
+            <a:effectLst/>
+          </p:spPr>
+          <p:style>
+            <a:lnRef idx="2">
+              <a:schemeClr val="accent1"/>
+            </a:lnRef>
+            <a:fillRef idx="0">
+              <a:schemeClr val="accent1"/>
+            </a:fillRef>
+            <a:effectRef idx="1">
+              <a:schemeClr val="accent1"/>
+            </a:effectRef>
+            <a:fontRef idx="minor">
+              <a:schemeClr val="tx1"/>
+            </a:fontRef>
+          </p:style>
+        </p:cxnSp>
         <p:grpSp>
           <p:nvGrpSpPr>
-            <p:cNvPr id="23" name="Group 22"/>
+            <p:cNvPr id="2" name="Group 1"/>
             <p:cNvGrpSpPr/>
             <p:nvPr/>
           </p:nvGrpSpPr>
           <p:grpSpPr>
             <a:xfrm>
-              <a:off x="5434776" y="1261674"/>
-              <a:ext cx="1134686" cy="1660552"/>
-              <a:chOff x="5434776" y="1261674"/>
-              <a:chExt cx="1134686" cy="1660552"/>
+              <a:off x="990916" y="2183999"/>
+              <a:ext cx="966932" cy="3305408"/>
+              <a:chOff x="990916" y="2252579"/>
+              <a:chExt cx="966932" cy="3305408"/>
             </a:xfrm>
           </p:grpSpPr>
           <p:sp>
             <p:nvSpPr>
-              <p:cNvPr id="27" name="Title 6"/>
-              <p:cNvSpPr txBox="1">
-                <a:spLocks/>
-              </p:cNvSpPr>
+              <p:cNvPr id="40" name="Rectangle 39"/>
+              <p:cNvSpPr/>
               <p:nvPr/>
             </p:nvSpPr>
             <p:spPr>
-              <a:xfrm rot="16200000">
-                <a:off x="4873831" y="1822619"/>
-                <a:ext cx="1549768" cy="427877"/>
+              <a:xfrm>
+                <a:off x="1303789" y="2997251"/>
+                <a:ext cx="288207" cy="889317"/>
               </a:xfrm>
               <a:prstGeom prst="rect">
                 <a:avLst/>
               </a:prstGeom>
+              <a:solidFill>
+                <a:srgbClr val="FFC000"/>
+              </a:solidFill>
+              <a:ln>
+                <a:solidFill>
+                  <a:srgbClr val="FFC000"/>
+                </a:solidFill>
+              </a:ln>
+              <a:effectLst/>
             </p:spPr>
+            <p:style>
+              <a:lnRef idx="1">
+                <a:schemeClr val="accent1"/>
+              </a:lnRef>
+              <a:fillRef idx="3">
+                <a:schemeClr val="accent1"/>
+              </a:fillRef>
+              <a:effectRef idx="2">
+                <a:schemeClr val="accent1"/>
+              </a:effectRef>
+              <a:fontRef idx="minor">
+                <a:schemeClr val="lt1"/>
+              </a:fontRef>
+            </p:style>
             <p:txBody>
-              <a:bodyPr vert="horz" lIns="0" tIns="0" rIns="0" bIns="0" rtlCol="0" anchor="b" anchorCtr="0">
-                <a:normAutofit/>
-              </a:bodyPr>
-              <a:lstStyle>
-                <a:lvl1pPr algn="l" defTabSz="914400" rtl="0" eaLnBrk="1" latinLnBrk="0" hangingPunct="1">
-                  <a:lnSpc>
-                    <a:spcPct val="90000"/>
-                  </a:lnSpc>
-                  <a:spcBef>
-                    <a:spcPct val="0"/>
-                  </a:spcBef>
-                  <a:buNone/>
-                  <a:defRPr sz="2800" kern="1200">
-                    <a:solidFill>
-                      <a:srgbClr val="004C97"/>
-                    </a:solidFill>
-                    <a:latin typeface="+mj-lt"/>
-                    <a:ea typeface="+mj-ea"/>
-                    <a:cs typeface="+mj-cs"/>
-                  </a:defRPr>
-                </a:lvl1pPr>
-              </a:lstStyle>
+              <a:bodyPr rtlCol="0" anchor="ctr"/>
+              <a:lstStyle/>
               <a:p>
-                <a:r>
-                  <a:rPr lang="en-US" sz="1400" dirty="0" smtClean="0">
-                    <a:solidFill>
-                      <a:schemeClr val="accent1">
-                        <a:lumMod val="75000"/>
-                      </a:schemeClr>
-                    </a:solidFill>
-                    <a:latin typeface="PT Sans" charset="-52"/>
-                    <a:ea typeface="PT Sans" charset="-52"/>
-                    <a:cs typeface="PT Sans" charset="-52"/>
-                  </a:rPr>
-                  <a:t>fast adjustment</a:t>
-                </a:r>
-                <a:endParaRPr lang="en-US" sz="1400" dirty="0">
-                  <a:solidFill>
-                    <a:schemeClr val="accent1">
-                      <a:lumMod val="75000"/>
-                    </a:schemeClr>
-                  </a:solidFill>
-                  <a:latin typeface="PT Sans" charset="-52"/>
-                  <a:ea typeface="PT Sans" charset="-52"/>
-                  <a:cs typeface="PT Sans" charset="-52"/>
-                </a:endParaRPr>
+                <a:pPr algn="ctr"/>
+                <a:endParaRPr lang="en-US"/>
               </a:p>
             </p:txBody>
           </p:sp>
           <p:sp>
             <p:nvSpPr>
-              <p:cNvPr id="29" name="Title 6"/>
-              <p:cNvSpPr txBox="1">
-                <a:spLocks/>
-              </p:cNvSpPr>
+              <p:cNvPr id="42" name="TextBox 41"/>
+              <p:cNvSpPr txBox="1"/>
               <p:nvPr/>
             </p:nvSpPr>
             <p:spPr>
-              <a:xfrm rot="16200000">
-                <a:off x="5580640" y="1933403"/>
-                <a:ext cx="1549768" cy="427877"/>
+              <a:xfrm>
+                <a:off x="990916" y="2252579"/>
+                <a:ext cx="966932" cy="707886"/>
               </a:xfrm>
               <a:prstGeom prst="rect">
                 <a:avLst/>
               </a:prstGeom>
+              <a:noFill/>
             </p:spPr>
             <p:txBody>
-              <a:bodyPr vert="horz" lIns="0" tIns="0" rIns="0" bIns="0" rtlCol="0" anchor="b" anchorCtr="0">
-                <a:normAutofit/>
+              <a:bodyPr wrap="none" rtlCol="0">
+                <a:spAutoFit/>
               </a:bodyPr>
-              <a:lstStyle>
-                <a:lvl1pPr algn="l" defTabSz="914400" rtl="0" eaLnBrk="1" latinLnBrk="0" hangingPunct="1">
-                  <a:lnSpc>
-                    <a:spcPct val="90000"/>
-                  </a:lnSpc>
-                  <a:spcBef>
-                    <a:spcPct val="0"/>
-                  </a:spcBef>
-                  <a:buNone/>
-                  <a:defRPr sz="2800" kern="1200">
+              <a:lstStyle/>
+              <a:p>
+                <a:pPr algn="ctr"/>
+                <a:r>
+                  <a:rPr lang="en-US" sz="2000" b="1" dirty="0">
                     <a:solidFill>
-                      <a:srgbClr val="004C97"/>
+                      <a:srgbClr val="FFC000"/>
                     </a:solidFill>
-                    <a:latin typeface="+mj-lt"/>
-                    <a:ea typeface="+mj-ea"/>
-                    <a:cs typeface="+mj-cs"/>
-                  </a:defRPr>
-                </a:lvl1pPr>
-              </a:lstStyle>
+                    <a:latin typeface="Times New Roman" panose="02020603050405020304" pitchFamily="18" charset="0"/>
+                    <a:cs typeface="Times New Roman" panose="02020603050405020304" pitchFamily="18" charset="0"/>
+                  </a:rPr>
+                  <a:t>Hollow</a:t>
+                </a:r>
+              </a:p>
               <a:p>
+                <a:pPr algn="ctr"/>
                 <a:r>
-                  <a:rPr lang="en-US" sz="1400" dirty="0" smtClean="0">
+                  <a:rPr lang="en-US" sz="2000" b="1" dirty="0">
                     <a:solidFill>
-                      <a:schemeClr val="tx1"/>
+                      <a:srgbClr val="FFC000"/>
                     </a:solidFill>
-                    <a:latin typeface="PT Sans" charset="-52"/>
-                    <a:ea typeface="PT Sans" charset="-52"/>
-                    <a:cs typeface="PT Sans" charset="-52"/>
+                    <a:latin typeface="Times New Roman" panose="02020603050405020304" pitchFamily="18" charset="0"/>
+                    <a:cs typeface="Times New Roman" panose="02020603050405020304" pitchFamily="18" charset="0"/>
                   </a:rPr>
-                  <a:t>equilibrium state</a:t>
+                  <a:t>e-lens</a:t>
                 </a:r>
-                <a:endParaRPr lang="en-US" sz="1400" dirty="0">
-                  <a:solidFill>
-                    <a:schemeClr val="tx1"/>
-                  </a:solidFill>
-                  <a:latin typeface="PT Sans" charset="-52"/>
-                  <a:ea typeface="PT Sans" charset="-52"/>
-                  <a:cs typeface="PT Sans" charset="-52"/>
-                </a:endParaRPr>
+              </a:p>
+            </p:txBody>
+          </p:sp>
+          <p:sp>
+            <p:nvSpPr>
+              <p:cNvPr id="47" name="Rectangle 46"/>
+              <p:cNvSpPr/>
+              <p:nvPr/>
+            </p:nvSpPr>
+            <p:spPr>
+              <a:xfrm>
+                <a:off x="1303790" y="4668670"/>
+                <a:ext cx="288932" cy="889317"/>
+              </a:xfrm>
+              <a:prstGeom prst="rect">
+                <a:avLst/>
+              </a:prstGeom>
+              <a:solidFill>
+                <a:srgbClr val="FFC000"/>
+              </a:solidFill>
+              <a:ln>
+                <a:solidFill>
+                  <a:srgbClr val="FFC000"/>
+                </a:solidFill>
+              </a:ln>
+              <a:effectLst/>
+            </p:spPr>
+            <p:style>
+              <a:lnRef idx="1">
+                <a:schemeClr val="accent1"/>
+              </a:lnRef>
+              <a:fillRef idx="3">
+                <a:schemeClr val="accent1"/>
+              </a:fillRef>
+              <a:effectRef idx="2">
+                <a:schemeClr val="accent1"/>
+              </a:effectRef>
+              <a:fontRef idx="minor">
+                <a:schemeClr val="lt1"/>
+              </a:fontRef>
+            </p:style>
+            <p:txBody>
+              <a:bodyPr rtlCol="0" anchor="ctr"/>
+              <a:lstStyle/>
+              <a:p>
+                <a:pPr algn="ctr"/>
+                <a:endParaRPr lang="en-US"/>
               </a:p>
             </p:txBody>
           </p:sp>
         </p:grpSp>
+        <p:sp>
+          <p:nvSpPr>
+            <p:cNvPr id="49" name="Freeform 48"/>
+            <p:cNvSpPr/>
+            <p:nvPr/>
+          </p:nvSpPr>
+          <p:spPr>
+            <a:xfrm>
+              <a:off x="1939448" y="3178021"/>
+              <a:ext cx="820193" cy="472995"/>
+            </a:xfrm>
+            <a:custGeom>
+              <a:avLst/>
+              <a:gdLst>
+                <a:gd name="connsiteX0" fmla="*/ 0 w 1143000"/>
+                <a:gd name="connsiteY0" fmla="*/ 662940 h 662940"/>
+                <a:gd name="connsiteX1" fmla="*/ 617220 w 1143000"/>
+                <a:gd name="connsiteY1" fmla="*/ 525780 h 662940"/>
+                <a:gd name="connsiteX2" fmla="*/ 1143000 w 1143000"/>
+                <a:gd name="connsiteY2" fmla="*/ 0 h 662940"/>
+              </a:gdLst>
+              <a:ahLst/>
+              <a:cxnLst>
+                <a:cxn ang="0">
+                  <a:pos x="connsiteX0" y="connsiteY0"/>
+                </a:cxn>
+                <a:cxn ang="0">
+                  <a:pos x="connsiteX1" y="connsiteY1"/>
+                </a:cxn>
+                <a:cxn ang="0">
+                  <a:pos x="connsiteX2" y="connsiteY2"/>
+                </a:cxn>
+              </a:cxnLst>
+              <a:rect l="l" t="t" r="r" b="b"/>
+              <a:pathLst>
+                <a:path w="1143000" h="662940">
+                  <a:moveTo>
+                    <a:pt x="0" y="662940"/>
+                  </a:moveTo>
+                  <a:cubicBezTo>
+                    <a:pt x="213360" y="649605"/>
+                    <a:pt x="426720" y="636270"/>
+                    <a:pt x="617220" y="525780"/>
+                  </a:cubicBezTo>
+                  <a:cubicBezTo>
+                    <a:pt x="807720" y="415290"/>
+                    <a:pt x="1055370" y="110490"/>
+                    <a:pt x="1143000" y="0"/>
+                  </a:cubicBezTo>
+                </a:path>
+              </a:pathLst>
+            </a:custGeom>
+            <a:noFill/>
+            <a:ln w="25400">
+              <a:solidFill>
+                <a:srgbClr val="FF0000"/>
+              </a:solidFill>
+              <a:tailEnd type="stealth" w="lg" len="lg"/>
+            </a:ln>
+            <a:effectLst/>
+          </p:spPr>
+          <p:style>
+            <a:lnRef idx="1">
+              <a:schemeClr val="accent1"/>
+            </a:lnRef>
+            <a:fillRef idx="3">
+              <a:schemeClr val="accent1"/>
+            </a:fillRef>
+            <a:effectRef idx="2">
+              <a:schemeClr val="accent1"/>
+            </a:effectRef>
+            <a:fontRef idx="minor">
+              <a:schemeClr val="lt1"/>
+            </a:fontRef>
+          </p:style>
+          <p:txBody>
+            <a:bodyPr rtlCol="0" anchor="ctr"/>
+            <a:lstStyle/>
+            <a:p>
+              <a:pPr algn="ctr"/>
+              <a:endParaRPr lang="en-US"/>
+            </a:p>
+          </p:txBody>
+        </p:sp>
+        <p:sp>
+          <p:nvSpPr>
+            <p:cNvPr id="58" name="TextBox 57"/>
+            <p:cNvSpPr txBox="1"/>
+            <p:nvPr/>
+          </p:nvSpPr>
+          <p:spPr>
+            <a:xfrm>
+              <a:off x="468192" y="4058780"/>
+              <a:ext cx="2012379" cy="384721"/>
+            </a:xfrm>
+            <a:prstGeom prst="rect">
+              <a:avLst/>
+            </a:prstGeom>
+            <a:noFill/>
+          </p:spPr>
+          <p:txBody>
+            <a:bodyPr wrap="square" rtlCol="0">
+              <a:spAutoFit/>
+            </a:bodyPr>
+            <a:lstStyle/>
+            <a:p>
+              <a:pPr algn="ctr"/>
+              <a:r>
+                <a:rPr lang="en-US" sz="1900" b="1" dirty="0">
+                  <a:solidFill>
+                    <a:schemeClr val="bg1"/>
+                  </a:solidFill>
+                  <a:latin typeface="Times New Roman" panose="02020603050405020304" pitchFamily="18" charset="0"/>
+                  <a:cs typeface="Times New Roman" panose="02020603050405020304" pitchFamily="18" charset="0"/>
+                </a:rPr>
+                <a:t>circulating beam</a:t>
+              </a:r>
+            </a:p>
+          </p:txBody>
+        </p:sp>
       </p:grpSp>
     </p:spTree>
     <p:extLst>
       <p:ext uri="{BB962C8B-B14F-4D97-AF65-F5344CB8AC3E}">
-        <p14:creationId xmlns:p14="http://schemas.microsoft.com/office/powerpoint/2010/main" val="2036387601"/>
+        <p14:creationId xmlns:p14="http://schemas.microsoft.com/office/powerpoint/2010/main" val="3445462404"/>
       </p:ext>
     </p:extLst>
   </p:cSld>
@@ -5312,335 +7581,12 @@
   </p:clrMapOvr>
   <mc:AlternateContent xmlns:mc="http://schemas.openxmlformats.org/markup-compatibility/2006" xmlns:p14="http://schemas.microsoft.com/office/powerpoint/2010/main">
     <mc:Choice Requires="p14">
-      <p:transition spd="slow" p14:dur="2000" advTm="39496"/>
+      <p:transition spd="slow" p14:dur="2000" advTm="12913"/>
     </mc:Choice>
     <mc:Fallback xmlns="">
-      <p:transition spd="slow" advTm="39496"/>
+      <p:transition spd="slow" advTm="12913"/>
     </mc:Fallback>
   </mc:AlternateContent>
-  <p:timing>
-    <p:tnLst>
-      <p:par>
-        <p:cTn id="1" dur="indefinite" restart="never" nodeType="tmRoot"/>
-      </p:par>
-    </p:tnLst>
-  </p:timing>
-</p:sld>
-</file>
-
-<file path=ppt/slides/slide4.xml><?xml version="1.0" encoding="utf-8"?>
-<p:sld xmlns:a="http://schemas.openxmlformats.org/drawingml/2006/main" xmlns:r="http://schemas.openxmlformats.org/officeDocument/2006/relationships" xmlns:p="http://schemas.openxmlformats.org/presentationml/2006/main">
-  <p:cSld>
-    <p:spTree>
-      <p:nvGrpSpPr>
-        <p:cNvPr id="1" name=""/>
-        <p:cNvGrpSpPr/>
-        <p:nvPr/>
-      </p:nvGrpSpPr>
-      <p:grpSpPr>
-        <a:xfrm>
-          <a:off x="0" y="0"/>
-          <a:ext cx="0" cy="0"/>
-          <a:chOff x="0" y="0"/>
-          <a:chExt cx="0" cy="0"/>
-        </a:xfrm>
-      </p:grpSpPr>
-      <p:sp>
-        <p:nvSpPr>
-          <p:cNvPr id="4" name="Date Placeholder 3"/>
-          <p:cNvSpPr>
-            <a:spLocks noGrp="1"/>
-          </p:cNvSpPr>
-          <p:nvPr>
-            <p:ph type="dt" sz="half" idx="2"/>
-          </p:nvPr>
-        </p:nvSpPr>
-        <p:spPr/>
-        <p:txBody>
-          <a:bodyPr/>
-          <a:lstStyle/>
-          <a:p>
-            <a:pPr>
-              <a:defRPr/>
-            </a:pPr>
-            <a:r>
-              <a:rPr lang="en-US" smtClean="0"/>
-              <a:t>17/05/2017</a:t>
-            </a:r>
-            <a:endParaRPr lang="en-US" dirty="0"/>
-          </a:p>
-        </p:txBody>
-      </p:sp>
-      <p:sp>
-        <p:nvSpPr>
-          <p:cNvPr id="5" name="Footer Placeholder 4"/>
-          <p:cNvSpPr>
-            <a:spLocks noGrp="1"/>
-          </p:cNvSpPr>
-          <p:nvPr>
-            <p:ph type="ftr" sz="quarter" idx="3"/>
-          </p:nvPr>
-        </p:nvSpPr>
-        <p:spPr/>
-        <p:txBody>
-          <a:bodyPr/>
-          <a:lstStyle/>
-          <a:p>
-            <a:pPr>
-              <a:defRPr/>
-            </a:pPr>
-            <a:r>
-              <a:rPr lang="en-US" smtClean="0"/>
-              <a:t>M. Fitterer | Hollow Electron Beam Collimation for HL-LHC - Effects on the Beam Core | IPAC’17</a:t>
-            </a:r>
-            <a:endParaRPr lang="en-US" b="1" dirty="0"/>
-          </a:p>
-        </p:txBody>
-      </p:sp>
-      <p:sp>
-        <p:nvSpPr>
-          <p:cNvPr id="6" name="Slide Number Placeholder 5"/>
-          <p:cNvSpPr>
-            <a:spLocks noGrp="1"/>
-          </p:cNvSpPr>
-          <p:nvPr>
-            <p:ph type="sldNum" sz="quarter" idx="4"/>
-          </p:nvPr>
-        </p:nvSpPr>
-        <p:spPr/>
-        <p:txBody>
-          <a:bodyPr/>
-          <a:lstStyle/>
-          <a:p>
-            <a:pPr>
-              <a:defRPr/>
-            </a:pPr>
-            <a:fld id="{148C009B-CB69-E04A-B9B3-34B26D69E9CF}" type="slidenum">
-              <a:rPr lang="en-US" smtClean="0"/>
-              <a:pPr>
-                <a:defRPr/>
-              </a:pPr>
-              <a:t>4</a:t>
-            </a:fld>
-            <a:endParaRPr lang="en-US" dirty="0"/>
-          </a:p>
-        </p:txBody>
-      </p:sp>
-      <p:grpSp>
-        <p:nvGrpSpPr>
-          <p:cNvPr id="8" name="Group 7"/>
-          <p:cNvGrpSpPr/>
-          <p:nvPr/>
-        </p:nvGrpSpPr>
-        <p:grpSpPr>
-          <a:xfrm>
-            <a:off x="3454400" y="1261674"/>
-            <a:ext cx="5266944" cy="4160210"/>
-            <a:chOff x="3454400" y="1261674"/>
-            <a:chExt cx="5266944" cy="4160210"/>
-          </a:xfrm>
-        </p:grpSpPr>
-        <p:pic>
-          <p:nvPicPr>
-            <p:cNvPr id="7" name="Picture 6"/>
-            <p:cNvPicPr>
-              <a:picLocks noChangeAspect="1"/>
-            </p:cNvPicPr>
-            <p:nvPr/>
-          </p:nvPicPr>
-          <p:blipFill>
-            <a:blip r:embed="rId3">
-              <a:extLst>
-                <a:ext uri="{28A0092B-C50C-407E-A947-70E740481C1C}">
-                  <a14:useLocalDpi xmlns:a14="http://schemas.microsoft.com/office/drawing/2010/main" val="0"/>
-                </a:ext>
-              </a:extLst>
-            </a:blip>
-            <a:stretch>
-              <a:fillRect/>
-            </a:stretch>
-          </p:blipFill>
-          <p:spPr>
-            <a:xfrm>
-              <a:off x="3454400" y="1435100"/>
-              <a:ext cx="5266944" cy="3986784"/>
-            </a:xfrm>
-            <a:prstGeom prst="rect">
-              <a:avLst/>
-            </a:prstGeom>
-          </p:spPr>
-        </p:pic>
-        <p:grpSp>
-          <p:nvGrpSpPr>
-            <p:cNvPr id="23" name="Group 22"/>
-            <p:cNvGrpSpPr/>
-            <p:nvPr/>
-          </p:nvGrpSpPr>
-          <p:grpSpPr>
-            <a:xfrm>
-              <a:off x="5434776" y="1261674"/>
-              <a:ext cx="1134686" cy="1660552"/>
-              <a:chOff x="5434776" y="1261674"/>
-              <a:chExt cx="1134686" cy="1660552"/>
-            </a:xfrm>
-          </p:grpSpPr>
-          <p:sp>
-            <p:nvSpPr>
-              <p:cNvPr id="27" name="Title 6"/>
-              <p:cNvSpPr txBox="1">
-                <a:spLocks/>
-              </p:cNvSpPr>
-              <p:nvPr/>
-            </p:nvSpPr>
-            <p:spPr>
-              <a:xfrm rot="16200000">
-                <a:off x="4873831" y="1822619"/>
-                <a:ext cx="1549768" cy="427877"/>
-              </a:xfrm>
-              <a:prstGeom prst="rect">
-                <a:avLst/>
-              </a:prstGeom>
-            </p:spPr>
-            <p:txBody>
-              <a:bodyPr vert="horz" lIns="0" tIns="0" rIns="0" bIns="0" rtlCol="0" anchor="b" anchorCtr="0">
-                <a:normAutofit/>
-              </a:bodyPr>
-              <a:lstStyle>
-                <a:lvl1pPr algn="l" defTabSz="914400" rtl="0" eaLnBrk="1" latinLnBrk="0" hangingPunct="1">
-                  <a:lnSpc>
-                    <a:spcPct val="90000"/>
-                  </a:lnSpc>
-                  <a:spcBef>
-                    <a:spcPct val="0"/>
-                  </a:spcBef>
-                  <a:buNone/>
-                  <a:defRPr sz="2800" kern="1200">
-                    <a:solidFill>
-                      <a:srgbClr val="004C97"/>
-                    </a:solidFill>
-                    <a:latin typeface="+mj-lt"/>
-                    <a:ea typeface="+mj-ea"/>
-                    <a:cs typeface="+mj-cs"/>
-                  </a:defRPr>
-                </a:lvl1pPr>
-              </a:lstStyle>
-              <a:p>
-                <a:r>
-                  <a:rPr lang="en-US" sz="1400" dirty="0" smtClean="0">
-                    <a:solidFill>
-                      <a:schemeClr val="accent1">
-                        <a:lumMod val="75000"/>
-                      </a:schemeClr>
-                    </a:solidFill>
-                    <a:latin typeface="PT Sans" charset="-52"/>
-                    <a:ea typeface="PT Sans" charset="-52"/>
-                    <a:cs typeface="PT Sans" charset="-52"/>
-                  </a:rPr>
-                  <a:t>fast adjustment</a:t>
-                </a:r>
-                <a:endParaRPr lang="en-US" sz="1400" dirty="0">
-                  <a:solidFill>
-                    <a:schemeClr val="accent1">
-                      <a:lumMod val="75000"/>
-                    </a:schemeClr>
-                  </a:solidFill>
-                  <a:latin typeface="PT Sans" charset="-52"/>
-                  <a:ea typeface="PT Sans" charset="-52"/>
-                  <a:cs typeface="PT Sans" charset="-52"/>
-                </a:endParaRPr>
-              </a:p>
-            </p:txBody>
-          </p:sp>
-          <p:sp>
-            <p:nvSpPr>
-              <p:cNvPr id="29" name="Title 6"/>
-              <p:cNvSpPr txBox="1">
-                <a:spLocks/>
-              </p:cNvSpPr>
-              <p:nvPr/>
-            </p:nvSpPr>
-            <p:spPr>
-              <a:xfrm rot="16200000">
-                <a:off x="5580640" y="1933403"/>
-                <a:ext cx="1549768" cy="427877"/>
-              </a:xfrm>
-              <a:prstGeom prst="rect">
-                <a:avLst/>
-              </a:prstGeom>
-            </p:spPr>
-            <p:txBody>
-              <a:bodyPr vert="horz" lIns="0" tIns="0" rIns="0" bIns="0" rtlCol="0" anchor="b" anchorCtr="0">
-                <a:normAutofit/>
-              </a:bodyPr>
-              <a:lstStyle>
-                <a:lvl1pPr algn="l" defTabSz="914400" rtl="0" eaLnBrk="1" latinLnBrk="0" hangingPunct="1">
-                  <a:lnSpc>
-                    <a:spcPct val="90000"/>
-                  </a:lnSpc>
-                  <a:spcBef>
-                    <a:spcPct val="0"/>
-                  </a:spcBef>
-                  <a:buNone/>
-                  <a:defRPr sz="2800" kern="1200">
-                    <a:solidFill>
-                      <a:srgbClr val="004C97"/>
-                    </a:solidFill>
-                    <a:latin typeface="+mj-lt"/>
-                    <a:ea typeface="+mj-ea"/>
-                    <a:cs typeface="+mj-cs"/>
-                  </a:defRPr>
-                </a:lvl1pPr>
-              </a:lstStyle>
-              <a:p>
-                <a:r>
-                  <a:rPr lang="en-US" sz="1400" dirty="0" smtClean="0">
-                    <a:solidFill>
-                      <a:schemeClr val="tx1"/>
-                    </a:solidFill>
-                    <a:latin typeface="PT Sans" charset="-52"/>
-                    <a:ea typeface="PT Sans" charset="-52"/>
-                    <a:cs typeface="PT Sans" charset="-52"/>
-                  </a:rPr>
-                  <a:t>equilibrium state</a:t>
-                </a:r>
-                <a:endParaRPr lang="en-US" sz="1400" dirty="0">
-                  <a:solidFill>
-                    <a:schemeClr val="tx1"/>
-                  </a:solidFill>
-                  <a:latin typeface="PT Sans" charset="-52"/>
-                  <a:ea typeface="PT Sans" charset="-52"/>
-                  <a:cs typeface="PT Sans" charset="-52"/>
-                </a:endParaRPr>
-              </a:p>
-            </p:txBody>
-          </p:sp>
-        </p:grpSp>
-      </p:grpSp>
-    </p:spTree>
-    <p:extLst>
-      <p:ext uri="{BB962C8B-B14F-4D97-AF65-F5344CB8AC3E}">
-        <p14:creationId xmlns:p14="http://schemas.microsoft.com/office/powerpoint/2010/main" val="303144653"/>
-      </p:ext>
-    </p:extLst>
-  </p:cSld>
-  <p:clrMapOvr>
-    <a:masterClrMapping/>
-  </p:clrMapOvr>
-  <mc:AlternateContent xmlns:mc="http://schemas.openxmlformats.org/markup-compatibility/2006" xmlns:p14="http://schemas.microsoft.com/office/powerpoint/2010/main">
-    <mc:Choice Requires="p14">
-      <p:transition spd="slow" p14:dur="2000" advTm="39496"/>
-    </mc:Choice>
-    <mc:Fallback xmlns="">
-      <p:transition spd="slow" advTm="39496"/>
-    </mc:Fallback>
-  </mc:AlternateContent>
-  <p:timing>
-    <p:tnLst>
-      <p:par>
-        <p:cTn id="1" dur="indefinite" restart="never" nodeType="tmRoot"/>
-      </p:par>
-    </p:tnLst>
-  </p:timing>
 </p:sld>
 </file>
 

</xml_diff>